<commit_message>
presentation: update presentation, add screenshots
</commit_message>
<xml_diff>
--- a/presentation/prezentace-sukenik.pptx
+++ b/presentation/prezentace-sukenik.pptx
@@ -5,7 +5,7 @@
     <p:sldMasterId id="2147483672" r:id="rId1"/>
   </p:sldMasterIdLst>
   <p:notesMasterIdLst>
-    <p:notesMasterId r:id="rId21"/>
+    <p:notesMasterId r:id="rId22"/>
   </p:notesMasterIdLst>
   <p:sldIdLst>
     <p:sldId id="256" r:id="rId2"/>
@@ -27,6 +27,7 @@
     <p:sldId id="278" r:id="rId18"/>
     <p:sldId id="262" r:id="rId19"/>
     <p:sldId id="263" r:id="rId20"/>
+    <p:sldId id="279" r:id="rId21"/>
   </p:sldIdLst>
   <p:sldSz cx="12192000" cy="6858000"/>
   <p:notesSz cx="6858000" cy="9144000"/>
@@ -6448,17 +6449,17 @@
       </dgm:t>
     </dgm:pt>
     <dgm:pt modelId="{2D8015AF-C2B3-4CED-A65B-4E0246F0A31D}">
-      <dgm:prSet/>
+      <dgm:prSet custT="1"/>
       <dgm:spPr/>
       <dgm:t>
         <a:bodyPr/>
         <a:lstStyle/>
         <a:p>
           <a:r>
-            <a:rPr lang="cs-CZ"/>
+            <a:rPr lang="cs-CZ" sz="2200" dirty="0"/>
             <a:t>nastudování a praktické využití frameworků</a:t>
           </a:r>
-          <a:endParaRPr lang="en-US"/>
+          <a:endParaRPr lang="en-US" sz="2200" dirty="0"/>
         </a:p>
       </dgm:t>
     </dgm:pt>
@@ -6469,7 +6470,7 @@
         <a:bodyPr/>
         <a:lstStyle/>
         <a:p>
-          <a:endParaRPr lang="en-US"/>
+          <a:endParaRPr lang="en-US" sz="2200"/>
         </a:p>
       </dgm:t>
     </dgm:pt>
@@ -6480,22 +6481,22 @@
         <a:bodyPr/>
         <a:lstStyle/>
         <a:p>
-          <a:endParaRPr lang="en-US"/>
+          <a:endParaRPr lang="en-US" sz="2200"/>
         </a:p>
       </dgm:t>
     </dgm:pt>
     <dgm:pt modelId="{7C54A0A4-F217-4529-A8D1-76C029E8D380}">
-      <dgm:prSet/>
+      <dgm:prSet custT="1"/>
       <dgm:spPr/>
       <dgm:t>
         <a:bodyPr/>
         <a:lstStyle/>
         <a:p>
           <a:r>
-            <a:rPr lang="cs-CZ"/>
+            <a:rPr lang="cs-CZ" sz="2200"/>
             <a:t>vytvoření webových aplikací</a:t>
           </a:r>
-          <a:endParaRPr lang="en-US"/>
+          <a:endParaRPr lang="en-US" sz="2200"/>
         </a:p>
       </dgm:t>
     </dgm:pt>
@@ -6506,7 +6507,7 @@
         <a:bodyPr/>
         <a:lstStyle/>
         <a:p>
-          <a:endParaRPr lang="en-US"/>
+          <a:endParaRPr lang="en-US" sz="2200"/>
         </a:p>
       </dgm:t>
     </dgm:pt>
@@ -6517,22 +6518,22 @@
         <a:bodyPr/>
         <a:lstStyle/>
         <a:p>
-          <a:endParaRPr lang="en-US"/>
+          <a:endParaRPr lang="en-US" sz="2200"/>
         </a:p>
       </dgm:t>
     </dgm:pt>
     <dgm:pt modelId="{92B8E979-8E46-4ABD-972A-6255CCC63ED1}">
-      <dgm:prSet/>
+      <dgm:prSet custT="1"/>
       <dgm:spPr/>
       <dgm:t>
         <a:bodyPr/>
         <a:lstStyle/>
         <a:p>
           <a:r>
-            <a:rPr lang="cs-CZ"/>
+            <a:rPr lang="cs-CZ" sz="2200"/>
             <a:t>teoretické i praktické porovnání</a:t>
           </a:r>
-          <a:endParaRPr lang="en-US"/>
+          <a:endParaRPr lang="en-US" sz="2200"/>
         </a:p>
       </dgm:t>
     </dgm:pt>
@@ -6543,7 +6544,7 @@
         <a:bodyPr/>
         <a:lstStyle/>
         <a:p>
-          <a:endParaRPr lang="en-US"/>
+          <a:endParaRPr lang="en-US" sz="2200"/>
         </a:p>
       </dgm:t>
     </dgm:pt>
@@ -6554,22 +6555,22 @@
         <a:bodyPr/>
         <a:lstStyle/>
         <a:p>
-          <a:endParaRPr lang="en-US"/>
+          <a:endParaRPr lang="en-US" sz="2200"/>
         </a:p>
       </dgm:t>
     </dgm:pt>
     <dgm:pt modelId="{42738C51-FD57-422C-9908-B700F4FCE623}">
-      <dgm:prSet/>
+      <dgm:prSet custT="1"/>
       <dgm:spPr/>
       <dgm:t>
         <a:bodyPr/>
         <a:lstStyle/>
         <a:p>
           <a:r>
-            <a:rPr lang="cs-CZ" dirty="0"/>
+            <a:rPr lang="cs-CZ" sz="2200" dirty="0"/>
             <a:t>podpora pro výběr vhodného nástroje</a:t>
           </a:r>
-          <a:endParaRPr lang="en-US" dirty="0"/>
+          <a:endParaRPr lang="en-US" sz="2200" dirty="0"/>
         </a:p>
       </dgm:t>
     </dgm:pt>
@@ -6580,7 +6581,7 @@
         <a:bodyPr/>
         <a:lstStyle/>
         <a:p>
-          <a:endParaRPr lang="en-US"/>
+          <a:endParaRPr lang="en-US" sz="2200"/>
         </a:p>
       </dgm:t>
     </dgm:pt>
@@ -6591,22 +6592,22 @@
         <a:bodyPr/>
         <a:lstStyle/>
         <a:p>
-          <a:endParaRPr lang="en-US"/>
+          <a:endParaRPr lang="en-US" sz="2200"/>
         </a:p>
       </dgm:t>
     </dgm:pt>
     <dgm:pt modelId="{19A80E74-0EF5-4406-9D05-2E97ADB082C6}">
-      <dgm:prSet/>
+      <dgm:prSet custT="1"/>
       <dgm:spPr/>
       <dgm:t>
         <a:bodyPr/>
         <a:lstStyle/>
         <a:p>
           <a:r>
-            <a:rPr lang="cs-CZ"/>
+            <a:rPr lang="cs-CZ" sz="2200"/>
             <a:t>nalezení univerzálního frameworku</a:t>
           </a:r>
-          <a:endParaRPr lang="en-US"/>
+          <a:endParaRPr lang="en-US" sz="2200"/>
         </a:p>
       </dgm:t>
     </dgm:pt>
@@ -6617,7 +6618,7 @@
         <a:bodyPr/>
         <a:lstStyle/>
         <a:p>
-          <a:endParaRPr lang="en-US"/>
+          <a:endParaRPr lang="en-US" sz="2200"/>
         </a:p>
       </dgm:t>
     </dgm:pt>
@@ -6628,7 +6629,7 @@
         <a:bodyPr/>
         <a:lstStyle/>
         <a:p>
-          <a:endParaRPr lang="en-US"/>
+          <a:endParaRPr lang="en-US" sz="2200"/>
         </a:p>
       </dgm:t>
     </dgm:pt>
@@ -6876,7 +6877,7 @@
       </dgm:t>
     </dgm:pt>
     <dgm:pt modelId="{53622FC3-1DC8-4ADF-9CC6-0DA1E7DC04CB}">
-      <dgm:prSet/>
+      <dgm:prSet custT="1"/>
       <dgm:spPr/>
       <dgm:t>
         <a:bodyPr/>
@@ -6886,10 +6887,10 @@
             <a:defRPr cap="all"/>
           </a:pPr>
           <a:r>
-            <a:rPr lang="cs-CZ" cap="none" dirty="0"/>
+            <a:rPr lang="cs-CZ" sz="2600" cap="none" dirty="0"/>
             <a:t>Analýza frameworků</a:t>
           </a:r>
-          <a:endParaRPr lang="en-US" cap="none" dirty="0"/>
+          <a:endParaRPr lang="en-US" sz="2600" cap="none" dirty="0"/>
         </a:p>
       </dgm:t>
     </dgm:pt>
@@ -8356,17 +8357,17 @@
       </dgm:t>
     </dgm:pt>
     <dgm:pt modelId="{92BF8559-4336-421B-868E-5F4727F578D6}">
-      <dgm:prSet/>
+      <dgm:prSet custT="1"/>
       <dgm:spPr/>
       <dgm:t>
         <a:bodyPr/>
         <a:lstStyle/>
         <a:p>
           <a:r>
-            <a:rPr lang="cs-CZ"/>
+            <a:rPr lang="cs-CZ" sz="2600" dirty="0"/>
             <a:t>přidání testovacích scénářů aplikace</a:t>
           </a:r>
-          <a:endParaRPr lang="en-US"/>
+          <a:endParaRPr lang="en-US" sz="2600" dirty="0"/>
         </a:p>
       </dgm:t>
     </dgm:pt>
@@ -8393,25 +8394,25 @@
       </dgm:t>
     </dgm:pt>
     <dgm:pt modelId="{B7D53E7F-8F46-4E70-B496-2AAC8D09961F}">
-      <dgm:prSet/>
+      <dgm:prSet custT="1"/>
       <dgm:spPr/>
       <dgm:t>
         <a:bodyPr/>
         <a:lstStyle/>
         <a:p>
           <a:r>
-            <a:rPr lang="cs-CZ" dirty="0"/>
+            <a:rPr lang="cs-CZ" sz="2600" dirty="0"/>
             <a:t>rozšíření práce o </a:t>
           </a:r>
           <a:r>
-            <a:rPr lang="cs-CZ" dirty="0" err="1"/>
+            <a:rPr lang="cs-CZ" sz="2600" dirty="0" err="1"/>
             <a:t>backend</a:t>
           </a:r>
           <a:r>
-            <a:rPr lang="cs-CZ" dirty="0"/>
+            <a:rPr lang="cs-CZ" sz="2600" dirty="0"/>
             <a:t> systém</a:t>
           </a:r>
-          <a:endParaRPr lang="en-US" dirty="0"/>
+          <a:endParaRPr lang="en-US" sz="2600" dirty="0"/>
         </a:p>
       </dgm:t>
     </dgm:pt>
@@ -8511,24 +8512,24 @@
     </dgm:pt>
   </dgm:ptLst>
   <dgm:cxnLst>
+    <dgm:cxn modelId="{C4D97708-C8D4-4F29-996F-233B81F91456}" type="presOf" srcId="{B7D53E7F-8F46-4E70-B496-2AAC8D09961F}" destId="{A3644D74-B38C-4BA4-9E54-9B9E503C3BA6}" srcOrd="0" destOrd="0" presId="urn:microsoft.com/office/officeart/2005/8/layout/list1"/>
     <dgm:cxn modelId="{32F12B18-2250-4559-8F0C-7B924221B539}" srcId="{465AE973-24B7-4123-BF89-AA3DEF610874}" destId="{B7D53E7F-8F46-4E70-B496-2AAC8D09961F}" srcOrd="1" destOrd="0" parTransId="{9B16F28E-211A-4552-9F57-1EF340D699D3}" sibTransId="{0444DB96-B9ED-4FF9-8C2D-1AC4861AFDA3}"/>
-    <dgm:cxn modelId="{3F65482A-81D5-40C4-88F2-D9728579E4E3}" type="presOf" srcId="{92BF8559-4336-421B-868E-5F4727F578D6}" destId="{D2075BBB-2777-48F6-AAB9-6619513D63A3}" srcOrd="1" destOrd="0" presId="urn:microsoft.com/office/officeart/2005/8/layout/list1"/>
-    <dgm:cxn modelId="{95CA4F31-8A1C-458A-B8E1-EF2146DA69F5}" type="presOf" srcId="{92BF8559-4336-421B-868E-5F4727F578D6}" destId="{7F4C7ED4-B0E3-4A14-9F51-6C5BDEDCFFAC}" srcOrd="0" destOrd="0" presId="urn:microsoft.com/office/officeart/2005/8/layout/list1"/>
-    <dgm:cxn modelId="{A9BE3B82-7963-415E-9232-1F8CADDA7DF9}" type="presOf" srcId="{465AE973-24B7-4123-BF89-AA3DEF610874}" destId="{305D807C-9D89-412F-A5E5-4D67894CDA3D}" srcOrd="0" destOrd="0" presId="urn:microsoft.com/office/officeart/2005/8/layout/list1"/>
-    <dgm:cxn modelId="{C302468A-0759-4C6C-ABEA-E9233EDAC26B}" type="presOf" srcId="{B7D53E7F-8F46-4E70-B496-2AAC8D09961F}" destId="{A3644D74-B38C-4BA4-9E54-9B9E503C3BA6}" srcOrd="0" destOrd="0" presId="urn:microsoft.com/office/officeart/2005/8/layout/list1"/>
-    <dgm:cxn modelId="{15BF2193-8E0D-448D-9232-2205A3AC4886}" type="presOf" srcId="{B7D53E7F-8F46-4E70-B496-2AAC8D09961F}" destId="{0D941EF1-F54F-42C0-A79F-D978D714F939}" srcOrd="1" destOrd="0" presId="urn:microsoft.com/office/officeart/2005/8/layout/list1"/>
+    <dgm:cxn modelId="{278EFC1F-70F1-46A9-B063-717DD7127F03}" type="presOf" srcId="{92BF8559-4336-421B-868E-5F4727F578D6}" destId="{D2075BBB-2777-48F6-AAB9-6619513D63A3}" srcOrd="1" destOrd="0" presId="urn:microsoft.com/office/officeart/2005/8/layout/list1"/>
+    <dgm:cxn modelId="{EEC22A29-3DF5-42F1-B909-D91D7362AAD0}" type="presOf" srcId="{92BF8559-4336-421B-868E-5F4727F578D6}" destId="{7F4C7ED4-B0E3-4A14-9F51-6C5BDEDCFFAC}" srcOrd="0" destOrd="0" presId="urn:microsoft.com/office/officeart/2005/8/layout/list1"/>
+    <dgm:cxn modelId="{C919854F-3A1E-4355-90FA-722A28543095}" type="presOf" srcId="{465AE973-24B7-4123-BF89-AA3DEF610874}" destId="{305D807C-9D89-412F-A5E5-4D67894CDA3D}" srcOrd="0" destOrd="0" presId="urn:microsoft.com/office/officeart/2005/8/layout/list1"/>
+    <dgm:cxn modelId="{CDFCF99C-0BD5-44CA-80CC-A8AB3CE1BB28}" type="presOf" srcId="{B7D53E7F-8F46-4E70-B496-2AAC8D09961F}" destId="{0D941EF1-F54F-42C0-A79F-D978D714F939}" srcOrd="1" destOrd="0" presId="urn:microsoft.com/office/officeart/2005/8/layout/list1"/>
     <dgm:cxn modelId="{50FF92DA-F707-4072-B0F9-94DAEA0871B4}" srcId="{465AE973-24B7-4123-BF89-AA3DEF610874}" destId="{92BF8559-4336-421B-868E-5F4727F578D6}" srcOrd="0" destOrd="0" parTransId="{85506FC0-03B1-4F3A-8CEB-67ED81CD1359}" sibTransId="{CEA669B9-B2D2-4FFB-BE53-3B0F9D42ABF0}"/>
-    <dgm:cxn modelId="{E7AECC13-843F-409E-8009-D4526EC812BE}" type="presParOf" srcId="{305D807C-9D89-412F-A5E5-4D67894CDA3D}" destId="{72D4568A-B761-425C-8E4A-8680BE16D6E8}" srcOrd="0" destOrd="0" presId="urn:microsoft.com/office/officeart/2005/8/layout/list1"/>
-    <dgm:cxn modelId="{7DB41634-9F6F-484B-ADAB-F05B3C542A03}" type="presParOf" srcId="{72D4568A-B761-425C-8E4A-8680BE16D6E8}" destId="{7F4C7ED4-B0E3-4A14-9F51-6C5BDEDCFFAC}" srcOrd="0" destOrd="0" presId="urn:microsoft.com/office/officeart/2005/8/layout/list1"/>
-    <dgm:cxn modelId="{4CD11658-3142-4C74-BD47-4EB5993450C6}" type="presParOf" srcId="{72D4568A-B761-425C-8E4A-8680BE16D6E8}" destId="{D2075BBB-2777-48F6-AAB9-6619513D63A3}" srcOrd="1" destOrd="0" presId="urn:microsoft.com/office/officeart/2005/8/layout/list1"/>
-    <dgm:cxn modelId="{C1880395-2B2E-4BBF-935A-DBA064CBD6EB}" type="presParOf" srcId="{305D807C-9D89-412F-A5E5-4D67894CDA3D}" destId="{0640A285-D52E-4753-BCC2-9A32CC3CEBD1}" srcOrd="1" destOrd="0" presId="urn:microsoft.com/office/officeart/2005/8/layout/list1"/>
-    <dgm:cxn modelId="{1C965826-FF38-429A-89ED-4C673EF5A2E4}" type="presParOf" srcId="{305D807C-9D89-412F-A5E5-4D67894CDA3D}" destId="{A4749DAB-2265-43E2-B767-B6E13F22A14A}" srcOrd="2" destOrd="0" presId="urn:microsoft.com/office/officeart/2005/8/layout/list1"/>
-    <dgm:cxn modelId="{1F069A28-BFB1-4BEB-AA1C-C384E162D5EB}" type="presParOf" srcId="{305D807C-9D89-412F-A5E5-4D67894CDA3D}" destId="{3A41E659-B034-4208-811C-EB1A137DDD2F}" srcOrd="3" destOrd="0" presId="urn:microsoft.com/office/officeart/2005/8/layout/list1"/>
-    <dgm:cxn modelId="{C01D93B6-7024-48DE-90E5-837E74D94C33}" type="presParOf" srcId="{305D807C-9D89-412F-A5E5-4D67894CDA3D}" destId="{3C66C15C-1DFC-4304-841A-CA5FF47CD398}" srcOrd="4" destOrd="0" presId="urn:microsoft.com/office/officeart/2005/8/layout/list1"/>
-    <dgm:cxn modelId="{8E61481B-45D4-4584-80FA-28804A143DF9}" type="presParOf" srcId="{3C66C15C-1DFC-4304-841A-CA5FF47CD398}" destId="{A3644D74-B38C-4BA4-9E54-9B9E503C3BA6}" srcOrd="0" destOrd="0" presId="urn:microsoft.com/office/officeart/2005/8/layout/list1"/>
-    <dgm:cxn modelId="{0E181775-B7E1-43F8-8068-FD4ADA89DFF0}" type="presParOf" srcId="{3C66C15C-1DFC-4304-841A-CA5FF47CD398}" destId="{0D941EF1-F54F-42C0-A79F-D978D714F939}" srcOrd="1" destOrd="0" presId="urn:microsoft.com/office/officeart/2005/8/layout/list1"/>
-    <dgm:cxn modelId="{BBE6C8A1-F606-40ED-BFD2-8196CADEB689}" type="presParOf" srcId="{305D807C-9D89-412F-A5E5-4D67894CDA3D}" destId="{62579CF5-2B73-4B2F-A005-8D9C3B239910}" srcOrd="5" destOrd="0" presId="urn:microsoft.com/office/officeart/2005/8/layout/list1"/>
-    <dgm:cxn modelId="{1330F39A-4196-4D9B-B86C-E3548669CBAB}" type="presParOf" srcId="{305D807C-9D89-412F-A5E5-4D67894CDA3D}" destId="{442FBD83-97FA-4B6C-8E31-C698B2FC4313}" srcOrd="6" destOrd="0" presId="urn:microsoft.com/office/officeart/2005/8/layout/list1"/>
+    <dgm:cxn modelId="{86F243C5-279F-4DE3-9EBB-31A090066566}" type="presParOf" srcId="{305D807C-9D89-412F-A5E5-4D67894CDA3D}" destId="{72D4568A-B761-425C-8E4A-8680BE16D6E8}" srcOrd="0" destOrd="0" presId="urn:microsoft.com/office/officeart/2005/8/layout/list1"/>
+    <dgm:cxn modelId="{71980AD2-AA8A-4DB9-9672-B2C8C990EA4E}" type="presParOf" srcId="{72D4568A-B761-425C-8E4A-8680BE16D6E8}" destId="{7F4C7ED4-B0E3-4A14-9F51-6C5BDEDCFFAC}" srcOrd="0" destOrd="0" presId="urn:microsoft.com/office/officeart/2005/8/layout/list1"/>
+    <dgm:cxn modelId="{A44EF415-FD43-49D7-9E94-D6AA87B03CEF}" type="presParOf" srcId="{72D4568A-B761-425C-8E4A-8680BE16D6E8}" destId="{D2075BBB-2777-48F6-AAB9-6619513D63A3}" srcOrd="1" destOrd="0" presId="urn:microsoft.com/office/officeart/2005/8/layout/list1"/>
+    <dgm:cxn modelId="{DC4CC895-A0A6-4B7C-9949-4A5837DC0979}" type="presParOf" srcId="{305D807C-9D89-412F-A5E5-4D67894CDA3D}" destId="{0640A285-D52E-4753-BCC2-9A32CC3CEBD1}" srcOrd="1" destOrd="0" presId="urn:microsoft.com/office/officeart/2005/8/layout/list1"/>
+    <dgm:cxn modelId="{67309DB9-2DB7-43F5-BA73-4FD8806C2C64}" type="presParOf" srcId="{305D807C-9D89-412F-A5E5-4D67894CDA3D}" destId="{A4749DAB-2265-43E2-B767-B6E13F22A14A}" srcOrd="2" destOrd="0" presId="urn:microsoft.com/office/officeart/2005/8/layout/list1"/>
+    <dgm:cxn modelId="{FB36D764-DCA3-4101-BE97-209412A3F0B5}" type="presParOf" srcId="{305D807C-9D89-412F-A5E5-4D67894CDA3D}" destId="{3A41E659-B034-4208-811C-EB1A137DDD2F}" srcOrd="3" destOrd="0" presId="urn:microsoft.com/office/officeart/2005/8/layout/list1"/>
+    <dgm:cxn modelId="{EABDF833-E628-4A5B-9F2E-849DCA6FABC3}" type="presParOf" srcId="{305D807C-9D89-412F-A5E5-4D67894CDA3D}" destId="{3C66C15C-1DFC-4304-841A-CA5FF47CD398}" srcOrd="4" destOrd="0" presId="urn:microsoft.com/office/officeart/2005/8/layout/list1"/>
+    <dgm:cxn modelId="{8BA90665-3443-474F-A930-9464E2E33C39}" type="presParOf" srcId="{3C66C15C-1DFC-4304-841A-CA5FF47CD398}" destId="{A3644D74-B38C-4BA4-9E54-9B9E503C3BA6}" srcOrd="0" destOrd="0" presId="urn:microsoft.com/office/officeart/2005/8/layout/list1"/>
+    <dgm:cxn modelId="{75A1DBED-F547-46D4-BF34-515C0052884E}" type="presParOf" srcId="{3C66C15C-1DFC-4304-841A-CA5FF47CD398}" destId="{0D941EF1-F54F-42C0-A79F-D978D714F939}" srcOrd="1" destOrd="0" presId="urn:microsoft.com/office/officeart/2005/8/layout/list1"/>
+    <dgm:cxn modelId="{0F8E4373-2076-41C5-B4B4-653F7B6241F6}" type="presParOf" srcId="{305D807C-9D89-412F-A5E5-4D67894CDA3D}" destId="{62579CF5-2B73-4B2F-A005-8D9C3B239910}" srcOrd="5" destOrd="0" presId="urn:microsoft.com/office/officeart/2005/8/layout/list1"/>
+    <dgm:cxn modelId="{20FDB5BA-A67D-4C25-BC24-2748CA1E57CB}" type="presParOf" srcId="{305D807C-9D89-412F-A5E5-4D67894CDA3D}" destId="{442FBD83-97FA-4B6C-8E31-C698B2FC4313}" srcOrd="6" destOrd="0" presId="urn:microsoft.com/office/officeart/2005/8/layout/list1"/>
   </dgm:cxnLst>
   <dgm:bg/>
   <dgm:whole/>
@@ -8555,17 +8556,25 @@
       </dgm:t>
     </dgm:pt>
     <dgm:pt modelId="{46CE7D2D-CB8E-44AE-9E86-BA1AA1548AE7}">
-      <dgm:prSet/>
+      <dgm:prSet custT="1"/>
       <dgm:spPr/>
       <dgm:t>
         <a:bodyPr/>
         <a:lstStyle/>
         <a:p>
           <a:r>
-            <a:rPr lang="cs-CZ"/>
-            <a:t>analýza současných možností frontendového vývoje</a:t>
+            <a:rPr lang="cs-CZ" sz="2200" dirty="0"/>
+            <a:t>analýza současných možností </a:t>
           </a:r>
-          <a:endParaRPr lang="en-US"/>
+          <a:r>
+            <a:rPr lang="cs-CZ" sz="2200" dirty="0" err="1"/>
+            <a:t>frontendového</a:t>
+          </a:r>
+          <a:r>
+            <a:rPr lang="cs-CZ" sz="2200" dirty="0"/>
+            <a:t> vývoje</a:t>
+          </a:r>
+          <a:endParaRPr lang="en-US" sz="2200" dirty="0"/>
         </a:p>
       </dgm:t>
     </dgm:pt>
@@ -8576,7 +8585,7 @@
         <a:bodyPr/>
         <a:lstStyle/>
         <a:p>
-          <a:endParaRPr lang="en-US"/>
+          <a:endParaRPr lang="en-US" sz="2200"/>
         </a:p>
       </dgm:t>
     </dgm:pt>
@@ -8587,22 +8596,22 @@
         <a:bodyPr/>
         <a:lstStyle/>
         <a:p>
-          <a:endParaRPr lang="en-US"/>
+          <a:endParaRPr lang="en-US" sz="2200"/>
         </a:p>
       </dgm:t>
     </dgm:pt>
     <dgm:pt modelId="{230D7467-9C0A-453D-963B-6355D1AAB6A4}">
-      <dgm:prSet/>
+      <dgm:prSet custT="1"/>
       <dgm:spPr/>
       <dgm:t>
         <a:bodyPr/>
         <a:lstStyle/>
         <a:p>
           <a:r>
-            <a:rPr lang="cs-CZ"/>
+            <a:rPr lang="cs-CZ" sz="2200" dirty="0"/>
             <a:t>implementace aplikace ve vybraných frameworcích</a:t>
           </a:r>
-          <a:endParaRPr lang="en-US"/>
+          <a:endParaRPr lang="en-US" sz="2200" dirty="0"/>
         </a:p>
       </dgm:t>
     </dgm:pt>
@@ -8613,7 +8622,7 @@
         <a:bodyPr/>
         <a:lstStyle/>
         <a:p>
-          <a:endParaRPr lang="en-US"/>
+          <a:endParaRPr lang="en-US" sz="2200"/>
         </a:p>
       </dgm:t>
     </dgm:pt>
@@ -8624,22 +8633,22 @@
         <a:bodyPr/>
         <a:lstStyle/>
         <a:p>
-          <a:endParaRPr lang="en-US"/>
+          <a:endParaRPr lang="en-US" sz="2200"/>
         </a:p>
       </dgm:t>
     </dgm:pt>
     <dgm:pt modelId="{A100E453-0B12-43B8-93DD-613CA0DF5732}">
-      <dgm:prSet/>
+      <dgm:prSet custT="1"/>
       <dgm:spPr/>
       <dgm:t>
         <a:bodyPr/>
         <a:lstStyle/>
         <a:p>
           <a:r>
-            <a:rPr lang="cs-CZ"/>
+            <a:rPr lang="cs-CZ" sz="2200" dirty="0"/>
             <a:t>porovnání z hlediska teorie, praxe</a:t>
           </a:r>
-          <a:endParaRPr lang="en-US"/>
+          <a:endParaRPr lang="en-US" sz="2200" dirty="0"/>
         </a:p>
       </dgm:t>
     </dgm:pt>
@@ -8650,7 +8659,7 @@
         <a:bodyPr/>
         <a:lstStyle/>
         <a:p>
-          <a:endParaRPr lang="en-US"/>
+          <a:endParaRPr lang="en-US" sz="2200"/>
         </a:p>
       </dgm:t>
     </dgm:pt>
@@ -8661,22 +8670,22 @@
         <a:bodyPr/>
         <a:lstStyle/>
         <a:p>
-          <a:endParaRPr lang="en-US"/>
+          <a:endParaRPr lang="en-US" sz="2200"/>
         </a:p>
       </dgm:t>
     </dgm:pt>
     <dgm:pt modelId="{BAF025C0-B781-46F0-803F-D16E5652C8BA}">
-      <dgm:prSet/>
+      <dgm:prSet custT="1"/>
       <dgm:spPr/>
       <dgm:t>
         <a:bodyPr/>
         <a:lstStyle/>
         <a:p>
           <a:r>
-            <a:rPr lang="cs-CZ"/>
+            <a:rPr lang="cs-CZ" sz="2200" dirty="0"/>
             <a:t>přehled a usnadnění výběru nástroje</a:t>
           </a:r>
-          <a:endParaRPr lang="en-US"/>
+          <a:endParaRPr lang="en-US" sz="2200" dirty="0"/>
         </a:p>
       </dgm:t>
     </dgm:pt>
@@ -8687,7 +8696,7 @@
         <a:bodyPr/>
         <a:lstStyle/>
         <a:p>
-          <a:endParaRPr lang="en-US"/>
+          <a:endParaRPr lang="en-US" sz="2200"/>
         </a:p>
       </dgm:t>
     </dgm:pt>
@@ -8698,22 +8707,22 @@
         <a:bodyPr/>
         <a:lstStyle/>
         <a:p>
-          <a:endParaRPr lang="en-US"/>
+          <a:endParaRPr lang="en-US" sz="2200"/>
         </a:p>
       </dgm:t>
     </dgm:pt>
     <dgm:pt modelId="{C854D283-8CB4-4BAD-BB56-207E78F00B8D}">
-      <dgm:prSet/>
+      <dgm:prSet custT="1"/>
       <dgm:spPr/>
       <dgm:t>
         <a:bodyPr/>
         <a:lstStyle/>
         <a:p>
           <a:r>
-            <a:rPr lang="cs-CZ"/>
+            <a:rPr lang="cs-CZ" sz="2200"/>
             <a:t>univerzální, nejlepší framework neexistuje</a:t>
           </a:r>
-          <a:endParaRPr lang="en-US"/>
+          <a:endParaRPr lang="en-US" sz="2200"/>
         </a:p>
       </dgm:t>
     </dgm:pt>
@@ -8724,7 +8733,7 @@
         <a:bodyPr/>
         <a:lstStyle/>
         <a:p>
-          <a:endParaRPr lang="en-US"/>
+          <a:endParaRPr lang="en-US" sz="2200"/>
         </a:p>
       </dgm:t>
     </dgm:pt>
@@ -8735,7 +8744,7 @@
         <a:bodyPr/>
         <a:lstStyle/>
         <a:p>
-          <a:endParaRPr lang="en-US"/>
+          <a:endParaRPr lang="en-US" sz="2200"/>
         </a:p>
       </dgm:t>
     </dgm:pt>
@@ -9073,8 +9082,8 @@
       </dsp:nvSpPr>
       <dsp:spPr>
         <a:xfrm>
-          <a:off x="0" y="262059"/>
-          <a:ext cx="10058399" cy="428400"/>
+          <a:off x="0" y="348409"/>
+          <a:ext cx="10058399" cy="453600"/>
         </a:xfrm>
         <a:prstGeom prst="rect">
           <a:avLst/>
@@ -9121,8 +9130,8 @@
       </dsp:nvSpPr>
       <dsp:spPr>
         <a:xfrm>
-          <a:off x="502920" y="11139"/>
-          <a:ext cx="7040880" cy="501840"/>
+          <a:off x="502920" y="82729"/>
+          <a:ext cx="7040880" cy="531360"/>
         </a:xfrm>
         <a:prstGeom prst="roundRect">
           <a:avLst/>
@@ -9168,7 +9177,7 @@
         </a:bodyPr>
         <a:lstStyle/>
         <a:p>
-          <a:pPr marL="0" lvl="0" indent="0" algn="l" defTabSz="755650">
+          <a:pPr marL="0" lvl="0" indent="0" algn="l" defTabSz="977900">
             <a:lnSpc>
               <a:spcPct val="90000"/>
             </a:lnSpc>
@@ -9181,15 +9190,15 @@
             <a:buNone/>
           </a:pPr>
           <a:r>
-            <a:rPr lang="cs-CZ" sz="1700" kern="1200"/>
+            <a:rPr lang="cs-CZ" sz="2200" kern="1200" dirty="0"/>
             <a:t>nastudování a praktické využití frameworků</a:t>
           </a:r>
-          <a:endParaRPr lang="en-US" sz="1700" kern="1200"/>
+          <a:endParaRPr lang="en-US" sz="2200" kern="1200" dirty="0"/>
         </a:p>
       </dsp:txBody>
       <dsp:txXfrm>
-        <a:off x="527418" y="35637"/>
-        <a:ext cx="6991884" cy="452844"/>
+        <a:off x="528859" y="108668"/>
+        <a:ext cx="6989002" cy="479482"/>
       </dsp:txXfrm>
     </dsp:sp>
     <dsp:sp modelId="{D6A45868-3F94-4A3E-80FF-E42EBE9F965D}">
@@ -9199,8 +9208,8 @@
       </dsp:nvSpPr>
       <dsp:spPr>
         <a:xfrm>
-          <a:off x="0" y="1033179"/>
-          <a:ext cx="10058399" cy="428400"/>
+          <a:off x="0" y="1164889"/>
+          <a:ext cx="10058399" cy="453600"/>
         </a:xfrm>
         <a:prstGeom prst="rect">
           <a:avLst/>
@@ -9247,8 +9256,8 @@
       </dsp:nvSpPr>
       <dsp:spPr>
         <a:xfrm>
-          <a:off x="502920" y="782259"/>
-          <a:ext cx="7040880" cy="501840"/>
+          <a:off x="502920" y="899209"/>
+          <a:ext cx="7040880" cy="531360"/>
         </a:xfrm>
         <a:prstGeom prst="roundRect">
           <a:avLst/>
@@ -9294,7 +9303,7 @@
         </a:bodyPr>
         <a:lstStyle/>
         <a:p>
-          <a:pPr marL="0" lvl="0" indent="0" algn="l" defTabSz="755650">
+          <a:pPr marL="0" lvl="0" indent="0" algn="l" defTabSz="977900">
             <a:lnSpc>
               <a:spcPct val="90000"/>
             </a:lnSpc>
@@ -9307,15 +9316,15 @@
             <a:buNone/>
           </a:pPr>
           <a:r>
-            <a:rPr lang="cs-CZ" sz="1700" kern="1200"/>
+            <a:rPr lang="cs-CZ" sz="2200" kern="1200"/>
             <a:t>vytvoření webových aplikací</a:t>
           </a:r>
-          <a:endParaRPr lang="en-US" sz="1700" kern="1200"/>
+          <a:endParaRPr lang="en-US" sz="2200" kern="1200"/>
         </a:p>
       </dsp:txBody>
       <dsp:txXfrm>
-        <a:off x="527418" y="806757"/>
-        <a:ext cx="6991884" cy="452844"/>
+        <a:off x="528859" y="925148"/>
+        <a:ext cx="6989002" cy="479482"/>
       </dsp:txXfrm>
     </dsp:sp>
     <dsp:sp modelId="{C2ECD79E-D77B-4D08-902B-B40BC277167C}">
@@ -9325,8 +9334,8 @@
       </dsp:nvSpPr>
       <dsp:spPr>
         <a:xfrm>
-          <a:off x="0" y="1804300"/>
-          <a:ext cx="10058399" cy="428400"/>
+          <a:off x="0" y="1981369"/>
+          <a:ext cx="10058399" cy="453600"/>
         </a:xfrm>
         <a:prstGeom prst="rect">
           <a:avLst/>
@@ -9373,8 +9382,8 @@
       </dsp:nvSpPr>
       <dsp:spPr>
         <a:xfrm>
-          <a:off x="502920" y="1553379"/>
-          <a:ext cx="7040880" cy="501840"/>
+          <a:off x="502920" y="1715689"/>
+          <a:ext cx="7040880" cy="531360"/>
         </a:xfrm>
         <a:prstGeom prst="roundRect">
           <a:avLst/>
@@ -9420,7 +9429,7 @@
         </a:bodyPr>
         <a:lstStyle/>
         <a:p>
-          <a:pPr marL="0" lvl="0" indent="0" algn="l" defTabSz="755650">
+          <a:pPr marL="0" lvl="0" indent="0" algn="l" defTabSz="977900">
             <a:lnSpc>
               <a:spcPct val="90000"/>
             </a:lnSpc>
@@ -9433,15 +9442,15 @@
             <a:buNone/>
           </a:pPr>
           <a:r>
-            <a:rPr lang="cs-CZ" sz="1700" kern="1200"/>
+            <a:rPr lang="cs-CZ" sz="2200" kern="1200"/>
             <a:t>teoretické i praktické porovnání</a:t>
           </a:r>
-          <a:endParaRPr lang="en-US" sz="1700" kern="1200"/>
+          <a:endParaRPr lang="en-US" sz="2200" kern="1200"/>
         </a:p>
       </dsp:txBody>
       <dsp:txXfrm>
-        <a:off x="527418" y="1577877"/>
-        <a:ext cx="6991884" cy="452844"/>
+        <a:off x="528859" y="1741628"/>
+        <a:ext cx="6989002" cy="479482"/>
       </dsp:txXfrm>
     </dsp:sp>
     <dsp:sp modelId="{1C9309F1-6CFF-4CE5-BF52-2BCE6080AFE8}">
@@ -9451,8 +9460,8 @@
       </dsp:nvSpPr>
       <dsp:spPr>
         <a:xfrm>
-          <a:off x="0" y="2575420"/>
-          <a:ext cx="10058399" cy="428400"/>
+          <a:off x="0" y="2797849"/>
+          <a:ext cx="10058399" cy="453600"/>
         </a:xfrm>
         <a:prstGeom prst="rect">
           <a:avLst/>
@@ -9499,8 +9508,8 @@
       </dsp:nvSpPr>
       <dsp:spPr>
         <a:xfrm>
-          <a:off x="502920" y="2324500"/>
-          <a:ext cx="7040880" cy="501840"/>
+          <a:off x="502920" y="2532169"/>
+          <a:ext cx="7040880" cy="531360"/>
         </a:xfrm>
         <a:prstGeom prst="roundRect">
           <a:avLst/>
@@ -9546,7 +9555,7 @@
         </a:bodyPr>
         <a:lstStyle/>
         <a:p>
-          <a:pPr marL="0" lvl="0" indent="0" algn="l" defTabSz="755650">
+          <a:pPr marL="0" lvl="0" indent="0" algn="l" defTabSz="977900">
             <a:lnSpc>
               <a:spcPct val="90000"/>
             </a:lnSpc>
@@ -9559,15 +9568,15 @@
             <a:buNone/>
           </a:pPr>
           <a:r>
-            <a:rPr lang="cs-CZ" sz="1700" kern="1200" dirty="0"/>
+            <a:rPr lang="cs-CZ" sz="2200" kern="1200" dirty="0"/>
             <a:t>podpora pro výběr vhodného nástroje</a:t>
           </a:r>
-          <a:endParaRPr lang="en-US" sz="1700" kern="1200" dirty="0"/>
+          <a:endParaRPr lang="en-US" sz="2200" kern="1200" dirty="0"/>
         </a:p>
       </dsp:txBody>
       <dsp:txXfrm>
-        <a:off x="527418" y="2348998"/>
-        <a:ext cx="6991884" cy="452844"/>
+        <a:off x="528859" y="2558108"/>
+        <a:ext cx="6989002" cy="479482"/>
       </dsp:txXfrm>
     </dsp:sp>
     <dsp:sp modelId="{FEFEBAB3-54C6-4811-A7BE-E95CB85D0BB1}">
@@ -9577,8 +9586,8 @@
       </dsp:nvSpPr>
       <dsp:spPr>
         <a:xfrm>
-          <a:off x="0" y="3346540"/>
-          <a:ext cx="10058399" cy="428400"/>
+          <a:off x="0" y="3614329"/>
+          <a:ext cx="10058399" cy="453600"/>
         </a:xfrm>
         <a:prstGeom prst="rect">
           <a:avLst/>
@@ -9625,8 +9634,8 @@
       </dsp:nvSpPr>
       <dsp:spPr>
         <a:xfrm>
-          <a:off x="502920" y="3095620"/>
-          <a:ext cx="7040880" cy="501840"/>
+          <a:off x="502920" y="3348649"/>
+          <a:ext cx="7040880" cy="531360"/>
         </a:xfrm>
         <a:prstGeom prst="roundRect">
           <a:avLst/>
@@ -9672,7 +9681,7 @@
         </a:bodyPr>
         <a:lstStyle/>
         <a:p>
-          <a:pPr marL="0" lvl="0" indent="0" algn="l" defTabSz="755650">
+          <a:pPr marL="0" lvl="0" indent="0" algn="l" defTabSz="977900">
             <a:lnSpc>
               <a:spcPct val="90000"/>
             </a:lnSpc>
@@ -9685,15 +9694,15 @@
             <a:buNone/>
           </a:pPr>
           <a:r>
-            <a:rPr lang="cs-CZ" sz="1700" kern="1200"/>
+            <a:rPr lang="cs-CZ" sz="2200" kern="1200"/>
             <a:t>nalezení univerzálního frameworku</a:t>
           </a:r>
-          <a:endParaRPr lang="en-US" sz="1700" kern="1200"/>
+          <a:endParaRPr lang="en-US" sz="2200" kern="1200"/>
         </a:p>
       </dsp:txBody>
       <dsp:txXfrm>
-        <a:off x="527418" y="3120118"/>
-        <a:ext cx="6991884" cy="452844"/>
+        <a:off x="528859" y="3374588"/>
+        <a:ext cx="6989002" cy="479482"/>
       </dsp:txXfrm>
     </dsp:sp>
   </dsp:spTree>
@@ -9715,7 +9724,7 @@
       </dsp:nvSpPr>
       <dsp:spPr>
         <a:xfrm>
-          <a:off x="774129" y="709809"/>
+          <a:off x="774129" y="698559"/>
           <a:ext cx="1255425" cy="1255425"/>
         </a:xfrm>
         <a:prstGeom prst="ellipse">
@@ -9754,7 +9763,7 @@
       </dsp:nvSpPr>
       <dsp:spPr>
         <a:xfrm>
-          <a:off x="1041679" y="977359"/>
+          <a:off x="1041679" y="966109"/>
           <a:ext cx="720326" cy="720326"/>
         </a:xfrm>
         <a:prstGeom prst="rect">
@@ -9803,8 +9812,8 @@
       </dsp:nvSpPr>
       <dsp:spPr>
         <a:xfrm>
-          <a:off x="372805" y="2356270"/>
-          <a:ext cx="2058075" cy="720000"/>
+          <a:off x="372805" y="2345020"/>
+          <a:ext cx="2058075" cy="742500"/>
         </a:xfrm>
         <a:prstGeom prst="rect">
           <a:avLst/>
@@ -9833,7 +9842,7 @@
         </a:bodyPr>
         <a:lstStyle/>
         <a:p>
-          <a:pPr marL="0" lvl="0" indent="0" algn="ctr" defTabSz="1111250">
+          <a:pPr marL="0" lvl="0" indent="0" algn="ctr" defTabSz="1155700">
             <a:lnSpc>
               <a:spcPct val="90000"/>
             </a:lnSpc>
@@ -9847,15 +9856,15 @@
             <a:defRPr cap="all"/>
           </a:pPr>
           <a:r>
-            <a:rPr lang="cs-CZ" sz="2500" kern="1200" cap="none" dirty="0"/>
+            <a:rPr lang="cs-CZ" sz="2600" kern="1200" cap="none" dirty="0"/>
             <a:t>Analýza frameworků</a:t>
           </a:r>
-          <a:endParaRPr lang="en-US" sz="2500" kern="1200" cap="none" dirty="0"/>
+          <a:endParaRPr lang="en-US" sz="2600" kern="1200" cap="none" dirty="0"/>
         </a:p>
       </dsp:txBody>
       <dsp:txXfrm>
-        <a:off x="372805" y="2356270"/>
-        <a:ext cx="2058075" cy="720000"/>
+        <a:off x="372805" y="2345020"/>
+        <a:ext cx="2058075" cy="742500"/>
       </dsp:txXfrm>
     </dsp:sp>
     <dsp:sp modelId="{CD8C36CA-F094-4F33-B71B-CC367A3BA29D}">
@@ -9865,7 +9874,7 @@
       </dsp:nvSpPr>
       <dsp:spPr>
         <a:xfrm>
-          <a:off x="3192368" y="709809"/>
+          <a:off x="3192368" y="698559"/>
           <a:ext cx="1255425" cy="1255425"/>
         </a:xfrm>
         <a:prstGeom prst="ellipse">
@@ -9904,7 +9913,7 @@
       </dsp:nvSpPr>
       <dsp:spPr>
         <a:xfrm>
-          <a:off x="3459917" y="977359"/>
+          <a:off x="3459917" y="966109"/>
           <a:ext cx="720326" cy="720326"/>
         </a:xfrm>
         <a:prstGeom prst="rect">
@@ -9953,8 +9962,8 @@
       </dsp:nvSpPr>
       <dsp:spPr>
         <a:xfrm>
-          <a:off x="2791043" y="2356270"/>
-          <a:ext cx="2058075" cy="720000"/>
+          <a:off x="2791043" y="2345020"/>
+          <a:ext cx="2058075" cy="742500"/>
         </a:xfrm>
         <a:prstGeom prst="rect">
           <a:avLst/>
@@ -9983,7 +9992,7 @@
         </a:bodyPr>
         <a:lstStyle/>
         <a:p>
-          <a:pPr marL="0" lvl="0" indent="0" algn="ctr" defTabSz="1111250">
+          <a:pPr marL="0" lvl="0" indent="0" algn="ctr" defTabSz="1155700">
             <a:lnSpc>
               <a:spcPct val="90000"/>
             </a:lnSpc>
@@ -9997,15 +10006,15 @@
             <a:defRPr cap="all"/>
           </a:pPr>
           <a:r>
-            <a:rPr lang="cs-CZ" sz="2500" kern="1200" cap="none" dirty="0"/>
+            <a:rPr lang="cs-CZ" sz="2600" kern="1200" cap="none" dirty="0"/>
             <a:t>Návrh aplikace</a:t>
           </a:r>
-          <a:endParaRPr lang="en-US" sz="2500" kern="1200" cap="none" dirty="0"/>
+          <a:endParaRPr lang="en-US" sz="2600" kern="1200" cap="none" dirty="0"/>
         </a:p>
       </dsp:txBody>
       <dsp:txXfrm>
-        <a:off x="2791043" y="2356270"/>
-        <a:ext cx="2058075" cy="720000"/>
+        <a:off x="2791043" y="2345020"/>
+        <a:ext cx="2058075" cy="742500"/>
       </dsp:txXfrm>
     </dsp:sp>
     <dsp:sp modelId="{5597C856-4400-4B1D-A9CC-2545DEAD60CB}">
@@ -10015,7 +10024,7 @@
       </dsp:nvSpPr>
       <dsp:spPr>
         <a:xfrm>
-          <a:off x="5610606" y="709809"/>
+          <a:off x="5610606" y="698559"/>
           <a:ext cx="1255425" cy="1255425"/>
         </a:xfrm>
         <a:prstGeom prst="ellipse">
@@ -10054,7 +10063,7 @@
       </dsp:nvSpPr>
       <dsp:spPr>
         <a:xfrm>
-          <a:off x="5878155" y="977359"/>
+          <a:off x="5878155" y="966109"/>
           <a:ext cx="720326" cy="720326"/>
         </a:xfrm>
         <a:prstGeom prst="rect">
@@ -10103,8 +10112,8 @@
       </dsp:nvSpPr>
       <dsp:spPr>
         <a:xfrm>
-          <a:off x="5209281" y="2356270"/>
-          <a:ext cx="2058075" cy="720000"/>
+          <a:off x="5209281" y="2345020"/>
+          <a:ext cx="2058075" cy="742500"/>
         </a:xfrm>
         <a:prstGeom prst="rect">
           <a:avLst/>
@@ -10133,7 +10142,7 @@
         </a:bodyPr>
         <a:lstStyle/>
         <a:p>
-          <a:pPr marL="0" lvl="0" indent="0" algn="ctr" defTabSz="1111250">
+          <a:pPr marL="0" lvl="0" indent="0" algn="ctr" defTabSz="1155700">
             <a:lnSpc>
               <a:spcPct val="90000"/>
             </a:lnSpc>
@@ -10147,15 +10156,15 @@
             <a:defRPr cap="all"/>
           </a:pPr>
           <a:r>
-            <a:rPr lang="cs-CZ" sz="2500" kern="1200" cap="none" dirty="0"/>
+            <a:rPr lang="cs-CZ" sz="2600" kern="1200" cap="none" dirty="0"/>
             <a:t>Testování frameworků</a:t>
           </a:r>
-          <a:endParaRPr lang="en-US" sz="2500" kern="1200" cap="none" dirty="0"/>
+          <a:endParaRPr lang="en-US" sz="2600" kern="1200" cap="none" dirty="0"/>
         </a:p>
       </dsp:txBody>
       <dsp:txXfrm>
-        <a:off x="5209281" y="2356270"/>
-        <a:ext cx="2058075" cy="720000"/>
+        <a:off x="5209281" y="2345020"/>
+        <a:ext cx="2058075" cy="742500"/>
       </dsp:txXfrm>
     </dsp:sp>
     <dsp:sp modelId="{A8C0B22A-6345-43F1-B92B-6F5698125BBB}">
@@ -10165,7 +10174,7 @@
       </dsp:nvSpPr>
       <dsp:spPr>
         <a:xfrm>
-          <a:off x="8028844" y="709809"/>
+          <a:off x="8028844" y="698559"/>
           <a:ext cx="1255425" cy="1255425"/>
         </a:xfrm>
         <a:prstGeom prst="ellipse">
@@ -10204,7 +10213,7 @@
       </dsp:nvSpPr>
       <dsp:spPr>
         <a:xfrm>
-          <a:off x="8296394" y="977359"/>
+          <a:off x="8296394" y="966109"/>
           <a:ext cx="720326" cy="720326"/>
         </a:xfrm>
         <a:prstGeom prst="rect">
@@ -10253,8 +10262,8 @@
       </dsp:nvSpPr>
       <dsp:spPr>
         <a:xfrm>
-          <a:off x="7627519" y="2356270"/>
-          <a:ext cx="2058075" cy="720000"/>
+          <a:off x="7627519" y="2345020"/>
+          <a:ext cx="2058075" cy="742500"/>
         </a:xfrm>
         <a:prstGeom prst="rect">
           <a:avLst/>
@@ -10283,7 +10292,7 @@
         </a:bodyPr>
         <a:lstStyle/>
         <a:p>
-          <a:pPr marL="0" lvl="0" indent="0" algn="ctr" defTabSz="1111250">
+          <a:pPr marL="0" lvl="0" indent="0" algn="ctr" defTabSz="1155700">
             <a:lnSpc>
               <a:spcPct val="90000"/>
             </a:lnSpc>
@@ -10297,15 +10306,15 @@
             <a:defRPr cap="all"/>
           </a:pPr>
           <a:r>
-            <a:rPr lang="cs-CZ" sz="2500" kern="1200" cap="none" dirty="0"/>
+            <a:rPr lang="cs-CZ" sz="2600" kern="1200" cap="none" dirty="0"/>
             <a:t>Shrnutí</a:t>
           </a:r>
-          <a:endParaRPr lang="en-US" sz="2500" kern="1200" cap="none" dirty="0"/>
+          <a:endParaRPr lang="en-US" sz="2600" kern="1200" cap="none" dirty="0"/>
         </a:p>
       </dsp:txBody>
       <dsp:txXfrm>
-        <a:off x="7627519" y="2356270"/>
-        <a:ext cx="2058075" cy="720000"/>
+        <a:off x="7627519" y="2345020"/>
+        <a:ext cx="2058075" cy="742500"/>
       </dsp:txXfrm>
     </dsp:sp>
   </dsp:spTree>
@@ -11081,7 +11090,7 @@
       <dsp:spPr>
         <a:xfrm>
           <a:off x="0" y="0"/>
-          <a:ext cx="7744967" cy="724204"/>
+          <a:ext cx="7744967" cy="761641"/>
         </a:xfrm>
         <a:prstGeom prst="roundRect">
           <a:avLst>
@@ -11157,8 +11166,8 @@
         </a:p>
       </dsp:txBody>
       <dsp:txXfrm>
-        <a:off x="21211" y="21211"/>
-        <a:ext cx="6878763" cy="681782"/>
+        <a:off x="22308" y="22308"/>
+        <a:ext cx="6833984" cy="717025"/>
       </dsp:txXfrm>
     </dsp:sp>
     <dsp:sp modelId="{9B15BF01-7674-4EEC-A05B-F66EC9DB16E6}">
@@ -11168,8 +11177,8 @@
       </dsp:nvSpPr>
       <dsp:spPr>
         <a:xfrm>
-          <a:off x="578358" y="824788"/>
-          <a:ext cx="7744967" cy="724204"/>
+          <a:off x="578358" y="867424"/>
+          <a:ext cx="7744967" cy="761641"/>
         </a:xfrm>
         <a:prstGeom prst="roundRect">
           <a:avLst>
@@ -11237,8 +11246,8 @@
         </a:p>
       </dsp:txBody>
       <dsp:txXfrm>
-        <a:off x="599569" y="845999"/>
-        <a:ext cx="6653454" cy="681782"/>
+        <a:off x="600666" y="889732"/>
+        <a:ext cx="6626927" cy="717025"/>
       </dsp:txXfrm>
     </dsp:sp>
     <dsp:sp modelId="{E9082324-9765-4447-9DDB-179BB43CBC75}">
@@ -11248,8 +11257,8 @@
       </dsp:nvSpPr>
       <dsp:spPr>
         <a:xfrm>
-          <a:off x="1156716" y="1649577"/>
-          <a:ext cx="7744967" cy="724204"/>
+          <a:off x="1156716" y="1734849"/>
+          <a:ext cx="7744967" cy="761641"/>
         </a:xfrm>
         <a:prstGeom prst="roundRect">
           <a:avLst>
@@ -11317,8 +11326,8 @@
         </a:p>
       </dsp:txBody>
       <dsp:txXfrm>
-        <a:off x="1177927" y="1670788"/>
-        <a:ext cx="6653454" cy="681782"/>
+        <a:off x="1179024" y="1757157"/>
+        <a:ext cx="6626927" cy="717025"/>
       </dsp:txXfrm>
     </dsp:sp>
     <dsp:sp modelId="{C653735E-D0BD-4045-BCD0-987DE4F9E1DC}">
@@ -11328,8 +11337,8 @@
       </dsp:nvSpPr>
       <dsp:spPr>
         <a:xfrm>
-          <a:off x="1735073" y="2474366"/>
-          <a:ext cx="7744967" cy="724204"/>
+          <a:off x="1735073" y="2602274"/>
+          <a:ext cx="7744967" cy="761641"/>
         </a:xfrm>
         <a:prstGeom prst="roundRect">
           <a:avLst>
@@ -11397,8 +11406,8 @@
         </a:p>
       </dsp:txBody>
       <dsp:txXfrm>
-        <a:off x="1756284" y="2495577"/>
-        <a:ext cx="6653454" cy="681782"/>
+        <a:off x="1757381" y="2624582"/>
+        <a:ext cx="6626927" cy="717025"/>
       </dsp:txXfrm>
     </dsp:sp>
     <dsp:sp modelId="{8DC91F60-9408-4699-A25E-CE83FAD8F4AC}">
@@ -11408,8 +11417,8 @@
       </dsp:nvSpPr>
       <dsp:spPr>
         <a:xfrm>
-          <a:off x="2313432" y="3299155"/>
-          <a:ext cx="7744967" cy="724204"/>
+          <a:off x="2313432" y="3469699"/>
+          <a:ext cx="7744967" cy="761641"/>
         </a:xfrm>
         <a:prstGeom prst="roundRect">
           <a:avLst>
@@ -11477,8 +11486,8 @@
         </a:p>
       </dsp:txBody>
       <dsp:txXfrm>
-        <a:off x="2334643" y="3320366"/>
-        <a:ext cx="6653454" cy="681782"/>
+        <a:off x="2335740" y="3492007"/>
+        <a:ext cx="6626927" cy="717025"/>
       </dsp:txXfrm>
     </dsp:sp>
     <dsp:sp modelId="{DBB6975B-6BF1-4A16-B139-07523F93794F}">
@@ -11488,8 +11497,8 @@
       </dsp:nvSpPr>
       <dsp:spPr>
         <a:xfrm>
-          <a:off x="7274234" y="529071"/>
-          <a:ext cx="470733" cy="470733"/>
+          <a:off x="7249901" y="556421"/>
+          <a:ext cx="495066" cy="495066"/>
         </a:xfrm>
         <a:prstGeom prst="downArrow">
           <a:avLst>
@@ -11535,12 +11544,12 @@
         <a:fontRef idx="minor"/>
       </dsp:style>
       <dsp:txBody>
-        <a:bodyPr spcFirstLastPara="0" vert="horz" wrap="square" lIns="26670" tIns="26670" rIns="26670" bIns="26670" numCol="1" spcCol="1270" anchor="ctr" anchorCtr="0">
+        <a:bodyPr spcFirstLastPara="0" vert="horz" wrap="square" lIns="27940" tIns="27940" rIns="27940" bIns="27940" numCol="1" spcCol="1270" anchor="ctr" anchorCtr="0">
           <a:noAutofit/>
         </a:bodyPr>
         <a:lstStyle/>
         <a:p>
-          <a:pPr marL="0" lvl="0" indent="0" algn="ctr" defTabSz="933450">
+          <a:pPr marL="0" lvl="0" indent="0" algn="ctr" defTabSz="977900">
             <a:lnSpc>
               <a:spcPct val="90000"/>
             </a:lnSpc>
@@ -11552,12 +11561,12 @@
             </a:spcAft>
             <a:buNone/>
           </a:pPr>
-          <a:endParaRPr lang="en-US" sz="2100" kern="1200"/>
+          <a:endParaRPr lang="en-US" sz="2200" kern="1200"/>
         </a:p>
       </dsp:txBody>
       <dsp:txXfrm>
-        <a:off x="7380149" y="529071"/>
-        <a:ext cx="258903" cy="354227"/>
+        <a:off x="7361291" y="556421"/>
+        <a:ext cx="272286" cy="372537"/>
       </dsp:txXfrm>
     </dsp:sp>
     <dsp:sp modelId="{36CB1608-771E-455D-AABA-5EF20320D795}">
@@ -11567,8 +11576,8 @@
       </dsp:nvSpPr>
       <dsp:spPr>
         <a:xfrm>
-          <a:off x="7852592" y="1353860"/>
-          <a:ext cx="470733" cy="470733"/>
+          <a:off x="7828259" y="1423846"/>
+          <a:ext cx="495066" cy="495066"/>
         </a:xfrm>
         <a:prstGeom prst="downArrow">
           <a:avLst>
@@ -11614,12 +11623,12 @@
         <a:fontRef idx="minor"/>
       </dsp:style>
       <dsp:txBody>
-        <a:bodyPr spcFirstLastPara="0" vert="horz" wrap="square" lIns="26670" tIns="26670" rIns="26670" bIns="26670" numCol="1" spcCol="1270" anchor="ctr" anchorCtr="0">
+        <a:bodyPr spcFirstLastPara="0" vert="horz" wrap="square" lIns="27940" tIns="27940" rIns="27940" bIns="27940" numCol="1" spcCol="1270" anchor="ctr" anchorCtr="0">
           <a:noAutofit/>
         </a:bodyPr>
         <a:lstStyle/>
         <a:p>
-          <a:pPr marL="0" lvl="0" indent="0" algn="ctr" defTabSz="933450">
+          <a:pPr marL="0" lvl="0" indent="0" algn="ctr" defTabSz="977900">
             <a:lnSpc>
               <a:spcPct val="90000"/>
             </a:lnSpc>
@@ -11631,12 +11640,12 @@
             </a:spcAft>
             <a:buNone/>
           </a:pPr>
-          <a:endParaRPr lang="en-US" sz="2100" kern="1200"/>
+          <a:endParaRPr lang="en-US" sz="2200" kern="1200"/>
         </a:p>
       </dsp:txBody>
       <dsp:txXfrm>
-        <a:off x="7958507" y="1353860"/>
-        <a:ext cx="258903" cy="354227"/>
+        <a:off x="7939649" y="1423846"/>
+        <a:ext cx="272286" cy="372537"/>
       </dsp:txXfrm>
     </dsp:sp>
     <dsp:sp modelId="{54F88269-7A45-44F3-A9AB-1984A84AA858}">
@@ -11646,8 +11655,8 @@
       </dsp:nvSpPr>
       <dsp:spPr>
         <a:xfrm>
-          <a:off x="8430950" y="2166579"/>
-          <a:ext cx="470733" cy="470733"/>
+          <a:off x="8406617" y="2278577"/>
+          <a:ext cx="495066" cy="495066"/>
         </a:xfrm>
         <a:prstGeom prst="downArrow">
           <a:avLst>
@@ -11693,12 +11702,12 @@
         <a:fontRef idx="minor"/>
       </dsp:style>
       <dsp:txBody>
-        <a:bodyPr spcFirstLastPara="0" vert="horz" wrap="square" lIns="26670" tIns="26670" rIns="26670" bIns="26670" numCol="1" spcCol="1270" anchor="ctr" anchorCtr="0">
+        <a:bodyPr spcFirstLastPara="0" vert="horz" wrap="square" lIns="27940" tIns="27940" rIns="27940" bIns="27940" numCol="1" spcCol="1270" anchor="ctr" anchorCtr="0">
           <a:noAutofit/>
         </a:bodyPr>
         <a:lstStyle/>
         <a:p>
-          <a:pPr marL="0" lvl="0" indent="0" algn="ctr" defTabSz="933450">
+          <a:pPr marL="0" lvl="0" indent="0" algn="ctr" defTabSz="977900">
             <a:lnSpc>
               <a:spcPct val="90000"/>
             </a:lnSpc>
@@ -11710,12 +11719,12 @@
             </a:spcAft>
             <a:buNone/>
           </a:pPr>
-          <a:endParaRPr lang="en-US" sz="2100" kern="1200"/>
+          <a:endParaRPr lang="en-US" sz="2200" kern="1200"/>
         </a:p>
       </dsp:txBody>
       <dsp:txXfrm>
-        <a:off x="8536865" y="2166579"/>
-        <a:ext cx="258903" cy="354227"/>
+        <a:off x="8518007" y="2278577"/>
+        <a:ext cx="272286" cy="372537"/>
       </dsp:txXfrm>
     </dsp:sp>
     <dsp:sp modelId="{095B93E6-2B4A-4516-A016-CAD80B6EA814}">
@@ -11725,8 +11734,8 @@
       </dsp:nvSpPr>
       <dsp:spPr>
         <a:xfrm>
-          <a:off x="9009308" y="2999414"/>
-          <a:ext cx="470733" cy="470733"/>
+          <a:off x="8984975" y="3154464"/>
+          <a:ext cx="495066" cy="495066"/>
         </a:xfrm>
         <a:prstGeom prst="downArrow">
           <a:avLst>
@@ -11772,12 +11781,12 @@
         <a:fontRef idx="minor"/>
       </dsp:style>
       <dsp:txBody>
-        <a:bodyPr spcFirstLastPara="0" vert="horz" wrap="square" lIns="26670" tIns="26670" rIns="26670" bIns="26670" numCol="1" spcCol="1270" anchor="ctr" anchorCtr="0">
+        <a:bodyPr spcFirstLastPara="0" vert="horz" wrap="square" lIns="27940" tIns="27940" rIns="27940" bIns="27940" numCol="1" spcCol="1270" anchor="ctr" anchorCtr="0">
           <a:noAutofit/>
         </a:bodyPr>
         <a:lstStyle/>
         <a:p>
-          <a:pPr marL="0" lvl="0" indent="0" algn="ctr" defTabSz="933450">
+          <a:pPr marL="0" lvl="0" indent="0" algn="ctr" defTabSz="977900">
             <a:lnSpc>
               <a:spcPct val="90000"/>
             </a:lnSpc>
@@ -11789,12 +11798,12 @@
             </a:spcAft>
             <a:buNone/>
           </a:pPr>
-          <a:endParaRPr lang="en-US" sz="2100" kern="1200"/>
+          <a:endParaRPr lang="en-US" sz="2200" kern="1200"/>
         </a:p>
       </dsp:txBody>
       <dsp:txXfrm>
-        <a:off x="9115223" y="2999414"/>
-        <a:ext cx="258903" cy="354227"/>
+        <a:off x="9096365" y="3154464"/>
+        <a:ext cx="272286" cy="372537"/>
       </dsp:txXfrm>
     </dsp:sp>
   </dsp:spTree>
@@ -11816,8 +11825,8 @@
       </dsp:nvSpPr>
       <dsp:spPr>
         <a:xfrm>
-          <a:off x="0" y="944440"/>
-          <a:ext cx="10058399" cy="856800"/>
+          <a:off x="0" y="665440"/>
+          <a:ext cx="10058399" cy="1108800"/>
         </a:xfrm>
         <a:prstGeom prst="rect">
           <a:avLst/>
@@ -11864,8 +11873,8 @@
       </dsp:nvSpPr>
       <dsp:spPr>
         <a:xfrm>
-          <a:off x="502920" y="442600"/>
-          <a:ext cx="7040880" cy="1003680"/>
+          <a:off x="502920" y="15999"/>
+          <a:ext cx="7040880" cy="1298880"/>
         </a:xfrm>
         <a:prstGeom prst="roundRect">
           <a:avLst/>
@@ -11911,7 +11920,7 @@
         </a:bodyPr>
         <a:lstStyle/>
         <a:p>
-          <a:pPr marL="0" lvl="0" indent="0" algn="l" defTabSz="1511300">
+          <a:pPr marL="0" lvl="0" indent="0" algn="l" defTabSz="1155700">
             <a:lnSpc>
               <a:spcPct val="90000"/>
             </a:lnSpc>
@@ -11924,15 +11933,15 @@
             <a:buNone/>
           </a:pPr>
           <a:r>
-            <a:rPr lang="cs-CZ" sz="3400" kern="1200"/>
+            <a:rPr lang="cs-CZ" sz="2600" kern="1200" dirty="0"/>
             <a:t>přidání testovacích scénářů aplikace</a:t>
           </a:r>
-          <a:endParaRPr lang="en-US" sz="3400" kern="1200"/>
+          <a:endParaRPr lang="en-US" sz="2600" kern="1200" dirty="0"/>
         </a:p>
       </dsp:txBody>
       <dsp:txXfrm>
-        <a:off x="551916" y="491596"/>
-        <a:ext cx="6942888" cy="905688"/>
+        <a:off x="566326" y="79405"/>
+        <a:ext cx="6914068" cy="1172068"/>
       </dsp:txXfrm>
     </dsp:sp>
     <dsp:sp modelId="{442FBD83-97FA-4B6C-8E31-C698B2FC4313}">
@@ -11942,8 +11951,8 @@
       </dsp:nvSpPr>
       <dsp:spPr>
         <a:xfrm>
-          <a:off x="0" y="2486680"/>
-          <a:ext cx="10058399" cy="856800"/>
+          <a:off x="0" y="2661280"/>
+          <a:ext cx="10058399" cy="1108800"/>
         </a:xfrm>
         <a:prstGeom prst="rect">
           <a:avLst/>
@@ -11990,8 +11999,8 @@
       </dsp:nvSpPr>
       <dsp:spPr>
         <a:xfrm>
-          <a:off x="502920" y="1984840"/>
-          <a:ext cx="7040880" cy="1003680"/>
+          <a:off x="502920" y="2011840"/>
+          <a:ext cx="7040880" cy="1298880"/>
         </a:xfrm>
         <a:prstGeom prst="roundRect">
           <a:avLst/>
@@ -12037,7 +12046,7 @@
         </a:bodyPr>
         <a:lstStyle/>
         <a:p>
-          <a:pPr marL="0" lvl="0" indent="0" algn="l" defTabSz="1511300">
+          <a:pPr marL="0" lvl="0" indent="0" algn="l" defTabSz="1155700">
             <a:lnSpc>
               <a:spcPct val="90000"/>
             </a:lnSpc>
@@ -12050,23 +12059,23 @@
             <a:buNone/>
           </a:pPr>
           <a:r>
-            <a:rPr lang="cs-CZ" sz="3400" kern="1200" dirty="0"/>
+            <a:rPr lang="cs-CZ" sz="2600" kern="1200" dirty="0"/>
             <a:t>rozšíření práce o </a:t>
           </a:r>
           <a:r>
-            <a:rPr lang="cs-CZ" sz="3400" kern="1200" dirty="0" err="1"/>
+            <a:rPr lang="cs-CZ" sz="2600" kern="1200" dirty="0" err="1"/>
             <a:t>backend</a:t>
           </a:r>
           <a:r>
-            <a:rPr lang="cs-CZ" sz="3400" kern="1200" dirty="0"/>
+            <a:rPr lang="cs-CZ" sz="2600" kern="1200" dirty="0"/>
             <a:t> systém</a:t>
           </a:r>
-          <a:endParaRPr lang="en-US" sz="3400" kern="1200" dirty="0"/>
+          <a:endParaRPr lang="en-US" sz="2600" kern="1200" dirty="0"/>
         </a:p>
       </dsp:txBody>
       <dsp:txXfrm>
-        <a:off x="551916" y="2033836"/>
-        <a:ext cx="6942888" cy="905688"/>
+        <a:off x="566326" y="2075246"/>
+        <a:ext cx="6914068" cy="1172068"/>
       </dsp:txXfrm>
     </dsp:sp>
   </dsp:spTree>
@@ -12088,8 +12097,8 @@
       </dsp:nvSpPr>
       <dsp:spPr>
         <a:xfrm>
-          <a:off x="0" y="2957"/>
-          <a:ext cx="10058399" cy="630027"/>
+          <a:off x="0" y="3186"/>
+          <a:ext cx="10058399" cy="678761"/>
         </a:xfrm>
         <a:prstGeom prst="roundRect">
           <a:avLst>
@@ -12130,8 +12139,8 @@
       </dsp:nvSpPr>
       <dsp:spPr>
         <a:xfrm>
-          <a:off x="190583" y="144714"/>
-          <a:ext cx="346515" cy="346515"/>
+          <a:off x="205325" y="155907"/>
+          <a:ext cx="373318" cy="373318"/>
         </a:xfrm>
         <a:prstGeom prst="rect">
           <a:avLst/>
@@ -12177,8 +12186,8 @@
       </dsp:nvSpPr>
       <dsp:spPr>
         <a:xfrm>
-          <a:off x="727681" y="2957"/>
-          <a:ext cx="9330718" cy="630027"/>
+          <a:off x="783969" y="3186"/>
+          <a:ext cx="9274430" cy="678761"/>
         </a:xfrm>
         <a:prstGeom prst="rect">
           <a:avLst/>
@@ -12202,12 +12211,12 @@
         <a:fontRef idx="minor"/>
       </dsp:style>
       <dsp:txBody>
-        <a:bodyPr spcFirstLastPara="0" vert="horz" wrap="square" lIns="66678" tIns="66678" rIns="66678" bIns="66678" numCol="1" spcCol="1270" anchor="ctr" anchorCtr="0">
+        <a:bodyPr spcFirstLastPara="0" vert="horz" wrap="square" lIns="71836" tIns="71836" rIns="71836" bIns="71836" numCol="1" spcCol="1270" anchor="ctr" anchorCtr="0">
           <a:noAutofit/>
         </a:bodyPr>
         <a:lstStyle/>
         <a:p>
-          <a:pPr marL="0" lvl="0" indent="0" algn="l" defTabSz="844550">
+          <a:pPr marL="0" lvl="0" indent="0" algn="l" defTabSz="977900">
             <a:lnSpc>
               <a:spcPct val="90000"/>
             </a:lnSpc>
@@ -12220,15 +12229,23 @@
             <a:buNone/>
           </a:pPr>
           <a:r>
-            <a:rPr lang="cs-CZ" sz="1900" kern="1200"/>
-            <a:t>analýza současných možností frontendového vývoje</a:t>
+            <a:rPr lang="cs-CZ" sz="2200" kern="1200" dirty="0"/>
+            <a:t>analýza současných možností </a:t>
           </a:r>
-          <a:endParaRPr lang="en-US" sz="1900" kern="1200"/>
+          <a:r>
+            <a:rPr lang="cs-CZ" sz="2200" kern="1200" dirty="0" err="1"/>
+            <a:t>frontendového</a:t>
+          </a:r>
+          <a:r>
+            <a:rPr lang="cs-CZ" sz="2200" kern="1200" dirty="0"/>
+            <a:t> vývoje</a:t>
+          </a:r>
+          <a:endParaRPr lang="en-US" sz="2200" kern="1200" dirty="0"/>
         </a:p>
       </dsp:txBody>
       <dsp:txXfrm>
-        <a:off x="727681" y="2957"/>
-        <a:ext cx="9330718" cy="630027"/>
+        <a:off x="783969" y="3186"/>
+        <a:ext cx="9274430" cy="678761"/>
       </dsp:txXfrm>
     </dsp:sp>
     <dsp:sp modelId="{D453F016-9B92-41BD-ACFC-89296A208106}">
@@ -12238,8 +12255,8 @@
       </dsp:nvSpPr>
       <dsp:spPr>
         <a:xfrm>
-          <a:off x="0" y="790492"/>
-          <a:ext cx="10058399" cy="630027"/>
+          <a:off x="0" y="851638"/>
+          <a:ext cx="10058399" cy="678761"/>
         </a:xfrm>
         <a:prstGeom prst="roundRect">
           <a:avLst>
@@ -12280,8 +12297,8 @@
       </dsp:nvSpPr>
       <dsp:spPr>
         <a:xfrm>
-          <a:off x="190583" y="932248"/>
-          <a:ext cx="346515" cy="346515"/>
+          <a:off x="205325" y="1004359"/>
+          <a:ext cx="373318" cy="373318"/>
         </a:xfrm>
         <a:prstGeom prst="rect">
           <a:avLst/>
@@ -12327,8 +12344,8 @@
       </dsp:nvSpPr>
       <dsp:spPr>
         <a:xfrm>
-          <a:off x="727681" y="790492"/>
-          <a:ext cx="9330718" cy="630027"/>
+          <a:off x="783969" y="851638"/>
+          <a:ext cx="9274430" cy="678761"/>
         </a:xfrm>
         <a:prstGeom prst="rect">
           <a:avLst/>
@@ -12352,12 +12369,12 @@
         <a:fontRef idx="minor"/>
       </dsp:style>
       <dsp:txBody>
-        <a:bodyPr spcFirstLastPara="0" vert="horz" wrap="square" lIns="66678" tIns="66678" rIns="66678" bIns="66678" numCol="1" spcCol="1270" anchor="ctr" anchorCtr="0">
+        <a:bodyPr spcFirstLastPara="0" vert="horz" wrap="square" lIns="71836" tIns="71836" rIns="71836" bIns="71836" numCol="1" spcCol="1270" anchor="ctr" anchorCtr="0">
           <a:noAutofit/>
         </a:bodyPr>
         <a:lstStyle/>
         <a:p>
-          <a:pPr marL="0" lvl="0" indent="0" algn="l" defTabSz="844550">
+          <a:pPr marL="0" lvl="0" indent="0" algn="l" defTabSz="977900">
             <a:lnSpc>
               <a:spcPct val="90000"/>
             </a:lnSpc>
@@ -12370,15 +12387,15 @@
             <a:buNone/>
           </a:pPr>
           <a:r>
-            <a:rPr lang="cs-CZ" sz="1900" kern="1200"/>
+            <a:rPr lang="cs-CZ" sz="2200" kern="1200" dirty="0"/>
             <a:t>implementace aplikace ve vybraných frameworcích</a:t>
           </a:r>
-          <a:endParaRPr lang="en-US" sz="1900" kern="1200"/>
+          <a:endParaRPr lang="en-US" sz="2200" kern="1200" dirty="0"/>
         </a:p>
       </dsp:txBody>
       <dsp:txXfrm>
-        <a:off x="727681" y="790492"/>
-        <a:ext cx="9330718" cy="630027"/>
+        <a:off x="783969" y="851638"/>
+        <a:ext cx="9274430" cy="678761"/>
       </dsp:txXfrm>
     </dsp:sp>
     <dsp:sp modelId="{155F70E4-9658-45CC-8270-CBA19A8B4A4D}">
@@ -12388,8 +12405,8 @@
       </dsp:nvSpPr>
       <dsp:spPr>
         <a:xfrm>
-          <a:off x="0" y="1578026"/>
-          <a:ext cx="10058399" cy="630027"/>
+          <a:off x="0" y="1700089"/>
+          <a:ext cx="10058399" cy="678761"/>
         </a:xfrm>
         <a:prstGeom prst="roundRect">
           <a:avLst>
@@ -12430,8 +12447,8 @@
       </dsp:nvSpPr>
       <dsp:spPr>
         <a:xfrm>
-          <a:off x="190583" y="1719782"/>
-          <a:ext cx="346515" cy="346515"/>
+          <a:off x="205325" y="1852811"/>
+          <a:ext cx="373318" cy="373318"/>
         </a:xfrm>
         <a:prstGeom prst="rect">
           <a:avLst/>
@@ -12479,8 +12496,8 @@
       </dsp:nvSpPr>
       <dsp:spPr>
         <a:xfrm>
-          <a:off x="727681" y="1578026"/>
-          <a:ext cx="9330718" cy="630027"/>
+          <a:off x="783969" y="1700089"/>
+          <a:ext cx="9274430" cy="678761"/>
         </a:xfrm>
         <a:prstGeom prst="rect">
           <a:avLst/>
@@ -12504,12 +12521,12 @@
         <a:fontRef idx="minor"/>
       </dsp:style>
       <dsp:txBody>
-        <a:bodyPr spcFirstLastPara="0" vert="horz" wrap="square" lIns="66678" tIns="66678" rIns="66678" bIns="66678" numCol="1" spcCol="1270" anchor="ctr" anchorCtr="0">
+        <a:bodyPr spcFirstLastPara="0" vert="horz" wrap="square" lIns="71836" tIns="71836" rIns="71836" bIns="71836" numCol="1" spcCol="1270" anchor="ctr" anchorCtr="0">
           <a:noAutofit/>
         </a:bodyPr>
         <a:lstStyle/>
         <a:p>
-          <a:pPr marL="0" lvl="0" indent="0" algn="l" defTabSz="844550">
+          <a:pPr marL="0" lvl="0" indent="0" algn="l" defTabSz="977900">
             <a:lnSpc>
               <a:spcPct val="90000"/>
             </a:lnSpc>
@@ -12522,15 +12539,15 @@
             <a:buNone/>
           </a:pPr>
           <a:r>
-            <a:rPr lang="cs-CZ" sz="1900" kern="1200"/>
+            <a:rPr lang="cs-CZ" sz="2200" kern="1200" dirty="0"/>
             <a:t>porovnání z hlediska teorie, praxe</a:t>
           </a:r>
-          <a:endParaRPr lang="en-US" sz="1900" kern="1200"/>
+          <a:endParaRPr lang="en-US" sz="2200" kern="1200" dirty="0"/>
         </a:p>
       </dsp:txBody>
       <dsp:txXfrm>
-        <a:off x="727681" y="1578026"/>
-        <a:ext cx="9330718" cy="630027"/>
+        <a:off x="783969" y="1700089"/>
+        <a:ext cx="9274430" cy="678761"/>
       </dsp:txXfrm>
     </dsp:sp>
     <dsp:sp modelId="{CDECCF5C-A456-403F-A37D-5AF66426DEF1}">
@@ -12540,8 +12557,8 @@
       </dsp:nvSpPr>
       <dsp:spPr>
         <a:xfrm>
-          <a:off x="0" y="2365560"/>
-          <a:ext cx="10058399" cy="630027"/>
+          <a:off x="0" y="2548541"/>
+          <a:ext cx="10058399" cy="678761"/>
         </a:xfrm>
         <a:prstGeom prst="roundRect">
           <a:avLst>
@@ -12582,8 +12599,8 @@
       </dsp:nvSpPr>
       <dsp:spPr>
         <a:xfrm>
-          <a:off x="190583" y="2507316"/>
-          <a:ext cx="346515" cy="346515"/>
+          <a:off x="205325" y="2701262"/>
+          <a:ext cx="373318" cy="373318"/>
         </a:xfrm>
         <a:prstGeom prst="rect">
           <a:avLst/>
@@ -12631,8 +12648,8 @@
       </dsp:nvSpPr>
       <dsp:spPr>
         <a:xfrm>
-          <a:off x="727681" y="2365560"/>
-          <a:ext cx="9330718" cy="630027"/>
+          <a:off x="783969" y="2548541"/>
+          <a:ext cx="9274430" cy="678761"/>
         </a:xfrm>
         <a:prstGeom prst="rect">
           <a:avLst/>
@@ -12656,12 +12673,12 @@
         <a:fontRef idx="minor"/>
       </dsp:style>
       <dsp:txBody>
-        <a:bodyPr spcFirstLastPara="0" vert="horz" wrap="square" lIns="66678" tIns="66678" rIns="66678" bIns="66678" numCol="1" spcCol="1270" anchor="ctr" anchorCtr="0">
+        <a:bodyPr spcFirstLastPara="0" vert="horz" wrap="square" lIns="71836" tIns="71836" rIns="71836" bIns="71836" numCol="1" spcCol="1270" anchor="ctr" anchorCtr="0">
           <a:noAutofit/>
         </a:bodyPr>
         <a:lstStyle/>
         <a:p>
-          <a:pPr marL="0" lvl="0" indent="0" algn="l" defTabSz="844550">
+          <a:pPr marL="0" lvl="0" indent="0" algn="l" defTabSz="977900">
             <a:lnSpc>
               <a:spcPct val="90000"/>
             </a:lnSpc>
@@ -12674,15 +12691,15 @@
             <a:buNone/>
           </a:pPr>
           <a:r>
-            <a:rPr lang="cs-CZ" sz="1900" kern="1200"/>
+            <a:rPr lang="cs-CZ" sz="2200" kern="1200" dirty="0"/>
             <a:t>přehled a usnadnění výběru nástroje</a:t>
           </a:r>
-          <a:endParaRPr lang="en-US" sz="1900" kern="1200"/>
+          <a:endParaRPr lang="en-US" sz="2200" kern="1200" dirty="0"/>
         </a:p>
       </dsp:txBody>
       <dsp:txXfrm>
-        <a:off x="727681" y="2365560"/>
-        <a:ext cx="9330718" cy="630027"/>
+        <a:off x="783969" y="2548541"/>
+        <a:ext cx="9274430" cy="678761"/>
       </dsp:txXfrm>
     </dsp:sp>
     <dsp:sp modelId="{070C413B-B23E-40B9-A795-6D827CADA2A5}">
@@ -12692,8 +12709,8 @@
       </dsp:nvSpPr>
       <dsp:spPr>
         <a:xfrm>
-          <a:off x="0" y="3153094"/>
-          <a:ext cx="10058399" cy="630027"/>
+          <a:off x="0" y="3396993"/>
+          <a:ext cx="10058399" cy="678761"/>
         </a:xfrm>
         <a:prstGeom prst="roundRect">
           <a:avLst>
@@ -12734,8 +12751,8 @@
       </dsp:nvSpPr>
       <dsp:spPr>
         <a:xfrm>
-          <a:off x="190583" y="3294850"/>
-          <a:ext cx="346515" cy="346515"/>
+          <a:off x="205325" y="3549714"/>
+          <a:ext cx="373318" cy="373318"/>
         </a:xfrm>
         <a:prstGeom prst="rect">
           <a:avLst/>
@@ -12783,8 +12800,8 @@
       </dsp:nvSpPr>
       <dsp:spPr>
         <a:xfrm>
-          <a:off x="727681" y="3153094"/>
-          <a:ext cx="9330718" cy="630027"/>
+          <a:off x="783969" y="3396993"/>
+          <a:ext cx="9274430" cy="678761"/>
         </a:xfrm>
         <a:prstGeom prst="rect">
           <a:avLst/>
@@ -12808,12 +12825,12 @@
         <a:fontRef idx="minor"/>
       </dsp:style>
       <dsp:txBody>
-        <a:bodyPr spcFirstLastPara="0" vert="horz" wrap="square" lIns="66678" tIns="66678" rIns="66678" bIns="66678" numCol="1" spcCol="1270" anchor="ctr" anchorCtr="0">
+        <a:bodyPr spcFirstLastPara="0" vert="horz" wrap="square" lIns="71836" tIns="71836" rIns="71836" bIns="71836" numCol="1" spcCol="1270" anchor="ctr" anchorCtr="0">
           <a:noAutofit/>
         </a:bodyPr>
         <a:lstStyle/>
         <a:p>
-          <a:pPr marL="0" lvl="0" indent="0" algn="l" defTabSz="844550">
+          <a:pPr marL="0" lvl="0" indent="0" algn="l" defTabSz="977900">
             <a:lnSpc>
               <a:spcPct val="90000"/>
             </a:lnSpc>
@@ -12826,15 +12843,15 @@
             <a:buNone/>
           </a:pPr>
           <a:r>
-            <a:rPr lang="cs-CZ" sz="1900" kern="1200"/>
+            <a:rPr lang="cs-CZ" sz="2200" kern="1200"/>
             <a:t>univerzální, nejlepší framework neexistuje</a:t>
           </a:r>
-          <a:endParaRPr lang="en-US" sz="1900" kern="1200"/>
+          <a:endParaRPr lang="en-US" sz="2200" kern="1200"/>
         </a:p>
       </dsp:txBody>
       <dsp:txXfrm>
-        <a:off x="727681" y="3153094"/>
-        <a:ext cx="9330718" cy="630027"/>
+        <a:off x="783969" y="3396993"/>
+        <a:ext cx="9274430" cy="678761"/>
       </dsp:txXfrm>
     </dsp:sp>
   </dsp:spTree>
@@ -22726,7 +22743,7 @@
           <a:p>
             <a:fld id="{BFD69B07-0B0A-4C05-A703-6676C3D2464B}" type="datetimeFigureOut">
               <a:rPr lang="cs-CZ" smtClean="0"/>
-              <a:t>14.04.2024</a:t>
+              <a:t>17.05.2024</a:t>
             </a:fld>
             <a:endParaRPr lang="cs-CZ"/>
           </a:p>
@@ -23303,7 +23320,7 @@
           <a:p>
             <a:fld id="{00931C66-D2AF-4486-9C9F-8FD9FF94E206}" type="datetimeFigureOut">
               <a:rPr lang="cs-CZ" smtClean="0"/>
-              <a:t>14.04.2024</a:t>
+              <a:t>17.05.2024</a:t>
             </a:fld>
             <a:endParaRPr lang="cs-CZ"/>
           </a:p>
@@ -23511,7 +23528,7 @@
           <a:p>
             <a:fld id="{00931C66-D2AF-4486-9C9F-8FD9FF94E206}" type="datetimeFigureOut">
               <a:rPr lang="cs-CZ" smtClean="0"/>
-              <a:t>14.04.2024</a:t>
+              <a:t>17.05.2024</a:t>
             </a:fld>
             <a:endParaRPr lang="cs-CZ"/>
           </a:p>
@@ -23767,7 +23784,7 @@
           <a:p>
             <a:fld id="{00931C66-D2AF-4486-9C9F-8FD9FF94E206}" type="datetimeFigureOut">
               <a:rPr lang="cs-CZ" smtClean="0"/>
-              <a:t>14.04.2024</a:t>
+              <a:t>17.05.2024</a:t>
             </a:fld>
             <a:endParaRPr lang="cs-CZ"/>
           </a:p>
@@ -23937,7 +23954,7 @@
           <a:p>
             <a:fld id="{00931C66-D2AF-4486-9C9F-8FD9FF94E206}" type="datetimeFigureOut">
               <a:rPr lang="cs-CZ" smtClean="0"/>
-              <a:t>14.04.2024</a:t>
+              <a:t>17.05.2024</a:t>
             </a:fld>
             <a:endParaRPr lang="cs-CZ"/>
           </a:p>
@@ -24280,7 +24297,7 @@
           <a:p>
             <a:fld id="{00931C66-D2AF-4486-9C9F-8FD9FF94E206}" type="datetimeFigureOut">
               <a:rPr lang="cs-CZ" smtClean="0"/>
-              <a:t>14.04.2024</a:t>
+              <a:t>17.05.2024</a:t>
             </a:fld>
             <a:endParaRPr lang="cs-CZ"/>
           </a:p>
@@ -24555,7 +24572,7 @@
           <a:p>
             <a:fld id="{00931C66-D2AF-4486-9C9F-8FD9FF94E206}" type="datetimeFigureOut">
               <a:rPr lang="cs-CZ" smtClean="0"/>
-              <a:t>14.04.2024</a:t>
+              <a:t>17.05.2024</a:t>
             </a:fld>
             <a:endParaRPr lang="cs-CZ"/>
           </a:p>
@@ -24934,7 +24951,7 @@
           <a:p>
             <a:fld id="{00931C66-D2AF-4486-9C9F-8FD9FF94E206}" type="datetimeFigureOut">
               <a:rPr lang="cs-CZ" smtClean="0"/>
-              <a:t>14.04.2024</a:t>
+              <a:t>17.05.2024</a:t>
             </a:fld>
             <a:endParaRPr lang="cs-CZ"/>
           </a:p>
@@ -25052,7 +25069,7 @@
           <a:p>
             <a:fld id="{00931C66-D2AF-4486-9C9F-8FD9FF94E206}" type="datetimeFigureOut">
               <a:rPr lang="cs-CZ" smtClean="0"/>
-              <a:t>14.04.2024</a:t>
+              <a:t>17.05.2024</a:t>
             </a:fld>
             <a:endParaRPr lang="cs-CZ"/>
           </a:p>
@@ -25223,7 +25240,7 @@
           <a:p>
             <a:fld id="{00931C66-D2AF-4486-9C9F-8FD9FF94E206}" type="datetimeFigureOut">
               <a:rPr lang="cs-CZ" smtClean="0"/>
-              <a:t>14.04.2024</a:t>
+              <a:t>17.05.2024</a:t>
             </a:fld>
             <a:endParaRPr lang="cs-CZ"/>
           </a:p>
@@ -25577,7 +25594,7 @@
           <a:p>
             <a:fld id="{00931C66-D2AF-4486-9C9F-8FD9FF94E206}" type="datetimeFigureOut">
               <a:rPr lang="cs-CZ" smtClean="0"/>
-              <a:t>14.04.2024</a:t>
+              <a:t>17.05.2024</a:t>
             </a:fld>
             <a:endParaRPr lang="cs-CZ"/>
           </a:p>
@@ -25954,7 +25971,7 @@
           <a:p>
             <a:fld id="{00931C66-D2AF-4486-9C9F-8FD9FF94E206}" type="datetimeFigureOut">
               <a:rPr lang="cs-CZ" smtClean="0"/>
-              <a:t>14.04.2024</a:t>
+              <a:t>17.05.2024</a:t>
             </a:fld>
             <a:endParaRPr lang="cs-CZ"/>
           </a:p>
@@ -26241,7 +26258,7 @@
           <a:p>
             <a:fld id="{00931C66-D2AF-4486-9C9F-8FD9FF94E206}" type="datetimeFigureOut">
               <a:rPr lang="cs-CZ" smtClean="0"/>
-              <a:t>14.04.2024</a:t>
+              <a:t>17.05.2024</a:t>
             </a:fld>
             <a:endParaRPr lang="cs-CZ"/>
           </a:p>
@@ -26831,8 +26848,13 @@
             </a:br>
             <a:r>
               <a:rPr lang="cs-CZ" sz="4000" dirty="0"/>
-              <a:t>Oponent: ––</a:t>
+              <a:t>Oponent: Mgr. Jan </a:t>
             </a:r>
+            <a:r>
+              <a:rPr lang="cs-CZ" sz="4000" dirty="0" err="1"/>
+              <a:t>Schreier</a:t>
+            </a:r>
+            <a:endParaRPr lang="cs-CZ" sz="4000" dirty="0"/>
           </a:p>
         </p:txBody>
       </p:sp>
@@ -26888,7 +26910,7 @@
             <a:pPr algn="ctr"/>
             <a:r>
               <a:rPr lang="cs-CZ" sz="2200" cap="none" dirty="0"/>
-              <a:t>10. dubna 2024</a:t>
+              <a:t>23. května 2024</a:t>
             </a:r>
           </a:p>
           <a:p>
@@ -27033,14 +27055,14 @@
             <p:ph idx="1"/>
             <p:extLst>
               <p:ext uri="{D42A27DB-BD31-4B8C-83A1-F6EECF244321}">
-                <p14:modId xmlns:p14="http://schemas.microsoft.com/office/powerpoint/2010/main" val="2310858011"/>
+                <p14:modId xmlns:p14="http://schemas.microsoft.com/office/powerpoint/2010/main" val="268352228"/>
               </p:ext>
             </p:extLst>
           </p:nvPr>
         </p:nvGraphicFramePr>
         <p:xfrm>
-          <a:off x="1097280" y="1845734"/>
-          <a:ext cx="10058400" cy="4023360"/>
+          <a:off x="1097280" y="1918446"/>
+          <a:ext cx="10058400" cy="4231341"/>
         </p:xfrm>
         <a:graphic>
           <a:graphicData uri="http://schemas.openxmlformats.org/drawingml/2006/diagram">
@@ -27108,19 +27130,17 @@
       </p:sp>
       <p:pic>
         <p:nvPicPr>
-          <p:cNvPr id="17" name="Zástupný obsah 16" descr="Obsah obrázku text, snímek obrazovky, software, Multimediální software&#10;&#10;Popis byl vytvořen automaticky">
+          <p:cNvPr id="6" name="Obrázek 5" descr="Obsah obrázku text, snímek obrazovky, software&#10;&#10;Popis byl vytvořen automaticky">
             <a:extLst>
               <a:ext uri="{FF2B5EF4-FFF2-40B4-BE49-F238E27FC236}">
-                <a16:creationId xmlns:a16="http://schemas.microsoft.com/office/drawing/2014/main" id="{81ACA02C-C24F-BB30-98EA-0FBD7681CA56}"/>
+                <a16:creationId xmlns:a16="http://schemas.microsoft.com/office/drawing/2014/main" id="{E97F242D-293A-01EF-2A1C-A7F6672F699A}"/>
               </a:ext>
             </a:extLst>
           </p:cNvPr>
           <p:cNvPicPr>
-            <a:picLocks noGrp="1" noChangeAspect="1"/>
+            <a:picLocks noChangeAspect="1"/>
           </p:cNvPicPr>
-          <p:nvPr>
-            <p:ph idx="1"/>
-          </p:nvPr>
+          <p:nvPr/>
         </p:nvPicPr>
         <p:blipFill>
           <a:blip r:embed="rId2">
@@ -27136,9 +27156,12 @@
         </p:blipFill>
         <p:spPr>
           <a:xfrm>
-            <a:off x="1047451" y="1855594"/>
-            <a:ext cx="10097098" cy="5011737"/>
+            <a:off x="0" y="1980000"/>
+            <a:ext cx="12192000" cy="4141557"/>
           </a:xfrm>
+          <a:prstGeom prst="rect">
+            <a:avLst/>
+          </a:prstGeom>
         </p:spPr>
       </p:pic>
     </p:spTree>
@@ -27201,19 +27224,17 @@
       </p:sp>
       <p:pic>
         <p:nvPicPr>
-          <p:cNvPr id="26" name="Zástupný obsah 25" descr="Obsah obrázku snímek obrazovky, text, software, Počítačová ikona&#10;&#10;Popis byl vytvořen automaticky">
+          <p:cNvPr id="8" name="Obrázek 7" descr="Obsah obrázku text, software, Počítačová ikona, Webová stránka&#10;&#10;Popis byl vytvořen automaticky">
             <a:extLst>
               <a:ext uri="{FF2B5EF4-FFF2-40B4-BE49-F238E27FC236}">
-                <a16:creationId xmlns:a16="http://schemas.microsoft.com/office/drawing/2014/main" id="{4FF5EF0E-8BB6-8E60-ACCC-5CEC8FEDD0AE}"/>
+                <a16:creationId xmlns:a16="http://schemas.microsoft.com/office/drawing/2014/main" id="{436B342A-3233-5AC4-D9A3-3731385EE0CC}"/>
               </a:ext>
             </a:extLst>
           </p:cNvPr>
           <p:cNvPicPr>
-            <a:picLocks noGrp="1" noChangeAspect="1"/>
+            <a:picLocks noChangeAspect="1"/>
           </p:cNvPicPr>
-          <p:nvPr>
-            <p:ph idx="1"/>
-          </p:nvPr>
+          <p:nvPr/>
         </p:nvPicPr>
         <p:blipFill>
           <a:blip r:embed="rId2">
@@ -27229,9 +27250,12 @@
         </p:blipFill>
         <p:spPr>
           <a:xfrm>
-            <a:off x="1047451" y="1855594"/>
-            <a:ext cx="10097098" cy="5011737"/>
+            <a:off x="0" y="1980000"/>
+            <a:ext cx="12192000" cy="4141557"/>
           </a:xfrm>
+          <a:prstGeom prst="rect">
+            <a:avLst/>
+          </a:prstGeom>
         </p:spPr>
       </p:pic>
     </p:spTree>
@@ -27294,19 +27318,17 @@
       </p:sp>
       <p:pic>
         <p:nvPicPr>
-          <p:cNvPr id="4" name="Zástupný obsah 3" descr="Obsah obrázku text, snímek obrazovky, software, Webová stránka&#10;&#10;Popis byl vytvořen automaticky">
+          <p:cNvPr id="7" name="Obrázek 6" descr="Obsah obrázku text, software, Písmo, snímek obrazovky&#10;&#10;Popis byl vytvořen automaticky">
             <a:extLst>
               <a:ext uri="{FF2B5EF4-FFF2-40B4-BE49-F238E27FC236}">
-                <a16:creationId xmlns:a16="http://schemas.microsoft.com/office/drawing/2014/main" id="{580F3D7C-4C4C-E7CF-AF68-F25CA7EA00AB}"/>
+                <a16:creationId xmlns:a16="http://schemas.microsoft.com/office/drawing/2014/main" id="{B54DE91A-8102-D604-5BD5-187129E8C842}"/>
               </a:ext>
             </a:extLst>
           </p:cNvPr>
           <p:cNvPicPr>
-            <a:picLocks noGrp="1" noChangeAspect="1"/>
+            <a:picLocks noChangeAspect="1"/>
           </p:cNvPicPr>
-          <p:nvPr>
-            <p:ph idx="1"/>
-          </p:nvPr>
+          <p:nvPr/>
         </p:nvPicPr>
         <p:blipFill>
           <a:blip r:embed="rId2">
@@ -27322,9 +27344,12 @@
         </p:blipFill>
         <p:spPr>
           <a:xfrm>
-            <a:off x="1047451" y="1855594"/>
-            <a:ext cx="10097098" cy="5011737"/>
+            <a:off x="0" y="1980000"/>
+            <a:ext cx="12192000" cy="4141557"/>
           </a:xfrm>
+          <a:prstGeom prst="rect">
+            <a:avLst/>
+          </a:prstGeom>
         </p:spPr>
       </p:pic>
     </p:spTree>
@@ -27387,19 +27412,17 @@
       </p:sp>
       <p:pic>
         <p:nvPicPr>
-          <p:cNvPr id="4" name="Zástupný obsah 3" descr="Obsah obrázku text, snímek obrazovky, software, Operační systém&#10;&#10;Popis byl vytvořen automaticky">
+          <p:cNvPr id="7" name="Obrázek 6" descr="Obsah obrázku text, software, Písmo, Webová stránka&#10;&#10;Popis byl vytvořen automaticky">
             <a:extLst>
               <a:ext uri="{FF2B5EF4-FFF2-40B4-BE49-F238E27FC236}">
-                <a16:creationId xmlns:a16="http://schemas.microsoft.com/office/drawing/2014/main" id="{D8D655E9-EBE6-749F-35DB-8691CFDA127C}"/>
+                <a16:creationId xmlns:a16="http://schemas.microsoft.com/office/drawing/2014/main" id="{3CDEA922-C853-8038-DED0-1993B894C6E6}"/>
               </a:ext>
             </a:extLst>
           </p:cNvPr>
           <p:cNvPicPr>
-            <a:picLocks noGrp="1" noChangeAspect="1"/>
+            <a:picLocks noChangeAspect="1"/>
           </p:cNvPicPr>
-          <p:nvPr>
-            <p:ph idx="1"/>
-          </p:nvPr>
+          <p:nvPr/>
         </p:nvPicPr>
         <p:blipFill>
           <a:blip r:embed="rId2">
@@ -27415,9 +27438,12 @@
         </p:blipFill>
         <p:spPr>
           <a:xfrm>
-            <a:off x="1047451" y="1855594"/>
-            <a:ext cx="10097098" cy="5011737"/>
+            <a:off x="0" y="1980000"/>
+            <a:ext cx="12192000" cy="4141557"/>
           </a:xfrm>
+          <a:prstGeom prst="rect">
+            <a:avLst/>
+          </a:prstGeom>
         </p:spPr>
       </p:pic>
     </p:spTree>
@@ -27480,19 +27506,17 @@
       </p:sp>
       <p:pic>
         <p:nvPicPr>
-          <p:cNvPr id="4" name="Zástupný obsah 3" descr="Obsah obrázku text, snímek obrazovky, software, displej&#10;&#10;Popis byl vytvořen automaticky">
+          <p:cNvPr id="5" name="Obrázek 4" descr="Obsah obrázku text, řada/pruh, Písmo, diagram&#10;&#10;Popis byl vytvořen automaticky">
             <a:extLst>
               <a:ext uri="{FF2B5EF4-FFF2-40B4-BE49-F238E27FC236}">
-                <a16:creationId xmlns:a16="http://schemas.microsoft.com/office/drawing/2014/main" id="{E7E2E65E-6E76-5C6F-766E-D3E08642E62D}"/>
+                <a16:creationId xmlns:a16="http://schemas.microsoft.com/office/drawing/2014/main" id="{D0E1F364-3204-D969-08F8-B2025B2B88D2}"/>
               </a:ext>
             </a:extLst>
           </p:cNvPr>
           <p:cNvPicPr>
-            <a:picLocks noGrp="1" noChangeAspect="1"/>
+            <a:picLocks noChangeAspect="1"/>
           </p:cNvPicPr>
-          <p:nvPr>
-            <p:ph idx="1"/>
-          </p:nvPr>
+          <p:nvPr/>
         </p:nvPicPr>
         <p:blipFill>
           <a:blip r:embed="rId2">
@@ -27508,9 +27532,12 @@
         </p:blipFill>
         <p:spPr>
           <a:xfrm>
-            <a:off x="1047451" y="1855594"/>
-            <a:ext cx="10097098" cy="5011737"/>
+            <a:off x="0" y="1980000"/>
+            <a:ext cx="12192000" cy="4141557"/>
           </a:xfrm>
+          <a:prstGeom prst="rect">
+            <a:avLst/>
+          </a:prstGeom>
         </p:spPr>
       </p:pic>
     </p:spTree>
@@ -28561,7 +28588,7 @@
             <p:ph idx="1"/>
             <p:extLst>
               <p:ext uri="{D42A27DB-BD31-4B8C-83A1-F6EECF244321}">
-                <p14:modId xmlns:p14="http://schemas.microsoft.com/office/powerpoint/2010/main" val="1165326889"/>
+                <p14:modId xmlns:p14="http://schemas.microsoft.com/office/powerpoint/2010/main" val="354144633"/>
               </p:ext>
             </p:extLst>
           </p:nvPr>
@@ -28665,14 +28692,14 @@
             <p:ph idx="1"/>
             <p:extLst>
               <p:ext uri="{D42A27DB-BD31-4B8C-83A1-F6EECF244321}">
-                <p14:modId xmlns:p14="http://schemas.microsoft.com/office/powerpoint/2010/main" val="4155666921"/>
+                <p14:modId xmlns:p14="http://schemas.microsoft.com/office/powerpoint/2010/main" val="2940502358"/>
               </p:ext>
             </p:extLst>
           </p:nvPr>
         </p:nvGraphicFramePr>
         <p:xfrm>
-          <a:off x="1096963" y="2098515"/>
-          <a:ext cx="10058400" cy="3786080"/>
+          <a:off x="1096963" y="1963270"/>
+          <a:ext cx="10058400" cy="4078941"/>
         </p:xfrm>
         <a:graphic>
           <a:graphicData uri="http://schemas.openxmlformats.org/drawingml/2006/diagram">
@@ -28774,27 +28801,17 @@
           <a:p>
             <a:pPr algn="ctr"/>
             <a:r>
-              <a:rPr lang="en-GB" sz="1400" dirty="0" err="1">
+              <a:rPr lang="en-GB" sz="1400">
                 <a:solidFill>
                   <a:schemeClr val="bg1">
                     <a:lumMod val="85000"/>
                   </a:schemeClr>
                 </a:solidFill>
               </a:rPr>
-              <a:t>Prezentace</a:t>
+              <a:t>Prezentace </a:t>
             </a:r>
             <a:r>
-              <a:rPr lang="en-GB" sz="1400" dirty="0">
-                <a:solidFill>
-                  <a:schemeClr val="bg1">
-                    <a:lumMod val="85000"/>
-                  </a:schemeClr>
-                </a:solidFill>
-              </a:rPr>
-              <a:t> </a:t>
-            </a:r>
-            <a:r>
-              <a:rPr lang="cs-CZ" sz="1400" dirty="0">
+              <a:rPr lang="cs-CZ" sz="1400">
                 <a:solidFill>
                   <a:schemeClr val="bg1">
                     <a:lumMod val="85000"/>
@@ -28803,6 +28820,172 @@
               </a:rPr>
               <a:t>byla vytvořena v PowerPointu, grafika pomocí integrovaného nástroje Designer.</a:t>
             </a:r>
+            <a:endParaRPr lang="cs-CZ" sz="1400" dirty="0">
+              <a:solidFill>
+                <a:schemeClr val="bg1">
+                  <a:lumMod val="85000"/>
+                </a:schemeClr>
+              </a:solidFill>
+            </a:endParaRPr>
+          </a:p>
+        </p:txBody>
+      </p:sp>
+      <p:pic>
+        <p:nvPicPr>
+          <p:cNvPr id="4" name="Grafický objekt 3">
+            <a:extLst>
+              <a:ext uri="{FF2B5EF4-FFF2-40B4-BE49-F238E27FC236}">
+                <a16:creationId xmlns:a16="http://schemas.microsoft.com/office/drawing/2014/main" id="{63C731C9-BB68-6869-26D5-E34EBB96A538}"/>
+              </a:ext>
+            </a:extLst>
+          </p:cNvPr>
+          <p:cNvPicPr>
+            <a:picLocks noChangeAspect="1"/>
+          </p:cNvPicPr>
+          <p:nvPr/>
+        </p:nvPicPr>
+        <p:blipFill>
+          <a:blip r:embed="rId2">
+            <a:extLst>
+              <a:ext uri="{28A0092B-C50C-407E-A947-70E740481C1C}">
+                <a14:useLocalDpi xmlns:a14="http://schemas.microsoft.com/office/drawing/2010/main" val="0"/>
+              </a:ext>
+              <a:ext uri="{96DAC541-7B7A-43D3-8B79-37D633B846F1}">
+                <asvg:svgBlip xmlns:asvg="http://schemas.microsoft.com/office/drawing/2016/SVG/main" r:embed="rId3"/>
+              </a:ext>
+            </a:extLst>
+          </a:blip>
+          <a:stretch>
+            <a:fillRect/>
+          </a:stretch>
+        </p:blipFill>
+        <p:spPr>
+          <a:xfrm>
+            <a:off x="1200032" y="1774676"/>
+            <a:ext cx="4038291" cy="4038291"/>
+          </a:xfrm>
+          <a:prstGeom prst="rect">
+            <a:avLst/>
+          </a:prstGeom>
+        </p:spPr>
+      </p:pic>
+      <p:pic>
+        <p:nvPicPr>
+          <p:cNvPr id="7" name="Grafický objekt 6">
+            <a:extLst>
+              <a:ext uri="{FF2B5EF4-FFF2-40B4-BE49-F238E27FC236}">
+                <a16:creationId xmlns:a16="http://schemas.microsoft.com/office/drawing/2014/main" id="{B96F1CB5-F577-CC23-7A46-FAB1B22FD16B}"/>
+              </a:ext>
+            </a:extLst>
+          </p:cNvPr>
+          <p:cNvPicPr>
+            <a:picLocks noChangeAspect="1"/>
+          </p:cNvPicPr>
+          <p:nvPr/>
+        </p:nvPicPr>
+        <p:blipFill>
+          <a:blip r:embed="rId4">
+            <a:extLst>
+              <a:ext uri="{28A0092B-C50C-407E-A947-70E740481C1C}">
+                <a14:useLocalDpi xmlns:a14="http://schemas.microsoft.com/office/drawing/2010/main" val="0"/>
+              </a:ext>
+              <a:ext uri="{96DAC541-7B7A-43D3-8B79-37D633B846F1}">
+                <asvg:svgBlip xmlns:asvg="http://schemas.microsoft.com/office/drawing/2016/SVG/main" r:embed="rId5"/>
+              </a:ext>
+            </a:extLst>
+          </a:blip>
+          <a:stretch>
+            <a:fillRect/>
+          </a:stretch>
+        </p:blipFill>
+        <p:spPr>
+          <a:xfrm>
+            <a:off x="7185322" y="1774676"/>
+            <a:ext cx="4038292" cy="4038292"/>
+          </a:xfrm>
+          <a:prstGeom prst="rect">
+            <a:avLst/>
+          </a:prstGeom>
+        </p:spPr>
+      </p:pic>
+      <p:sp>
+        <p:nvSpPr>
+          <p:cNvPr id="8" name="TextovéPole 7">
+            <a:extLst>
+              <a:ext uri="{FF2B5EF4-FFF2-40B4-BE49-F238E27FC236}">
+                <a16:creationId xmlns:a16="http://schemas.microsoft.com/office/drawing/2014/main" id="{85C9B8B2-3A68-3ADB-F5F5-8DA7AF2AD165}"/>
+              </a:ext>
+            </a:extLst>
+          </p:cNvPr>
+          <p:cNvSpPr txBox="1"/>
+          <p:nvPr/>
+        </p:nvSpPr>
+        <p:spPr>
+          <a:xfrm>
+            <a:off x="1200031" y="5743136"/>
+            <a:ext cx="4038292" cy="461665"/>
+          </a:xfrm>
+          <a:prstGeom prst="rect">
+            <a:avLst/>
+          </a:prstGeom>
+          <a:noFill/>
+        </p:spPr>
+        <p:txBody>
+          <a:bodyPr wrap="square" rtlCol="0">
+            <a:spAutoFit/>
+          </a:bodyPr>
+          <a:lstStyle/>
+          <a:p>
+            <a:pPr algn="ctr"/>
+            <a:r>
+              <a:rPr lang="cs-CZ" sz="2400" b="1" dirty="0"/>
+              <a:t>Text práce</a:t>
+            </a:r>
+          </a:p>
+        </p:txBody>
+      </p:sp>
+      <p:sp>
+        <p:nvSpPr>
+          <p:cNvPr id="9" name="TextovéPole 8">
+            <a:extLst>
+              <a:ext uri="{FF2B5EF4-FFF2-40B4-BE49-F238E27FC236}">
+                <a16:creationId xmlns:a16="http://schemas.microsoft.com/office/drawing/2014/main" id="{97A9E58D-6D5E-71C9-72E4-C8D0A594FF82}"/>
+              </a:ext>
+            </a:extLst>
+          </p:cNvPr>
+          <p:cNvSpPr txBox="1"/>
+          <p:nvPr/>
+        </p:nvSpPr>
+        <p:spPr>
+          <a:xfrm>
+            <a:off x="7185322" y="5743137"/>
+            <a:ext cx="4038291" cy="461665"/>
+          </a:xfrm>
+          <a:prstGeom prst="rect">
+            <a:avLst/>
+          </a:prstGeom>
+          <a:noFill/>
+        </p:spPr>
+        <p:txBody>
+          <a:bodyPr wrap="square" rtlCol="0">
+            <a:spAutoFit/>
+          </a:bodyPr>
+          <a:lstStyle/>
+          <a:p>
+            <a:pPr algn="ctr"/>
+            <a:r>
+              <a:rPr lang="cs-CZ" sz="2400" b="1" dirty="0" err="1"/>
+              <a:t>Github</a:t>
+            </a:r>
+            <a:r>
+              <a:rPr lang="cs-CZ" sz="2400" b="1" dirty="0"/>
+              <a:t> </a:t>
+            </a:r>
+            <a:r>
+              <a:rPr lang="cs-CZ" sz="2400" b="1" dirty="0" err="1"/>
+              <a:t>repozitář</a:t>
+            </a:r>
+            <a:endParaRPr lang="cs-CZ" sz="2400" b="1" dirty="0"/>
           </a:p>
         </p:txBody>
       </p:sp>
@@ -28895,14 +29078,14 @@
             <p:ph idx="1"/>
             <p:extLst>
               <p:ext uri="{D42A27DB-BD31-4B8C-83A1-F6EECF244321}">
-                <p14:modId xmlns:p14="http://schemas.microsoft.com/office/powerpoint/2010/main" val="407396099"/>
+                <p14:modId xmlns:p14="http://schemas.microsoft.com/office/powerpoint/2010/main" val="2762235530"/>
               </p:ext>
             </p:extLst>
           </p:nvPr>
         </p:nvGraphicFramePr>
         <p:xfrm>
-          <a:off x="1096963" y="2098515"/>
-          <a:ext cx="10058400" cy="3786080"/>
+          <a:off x="1096963" y="1945340"/>
+          <a:ext cx="10058400" cy="4150659"/>
         </p:xfrm>
         <a:graphic>
           <a:graphicData uri="http://schemas.openxmlformats.org/drawingml/2006/diagram">
@@ -28914,6 +29097,119 @@
     <p:extLst>
       <p:ext uri="{BB962C8B-B14F-4D97-AF65-F5344CB8AC3E}">
         <p14:creationId xmlns:p14="http://schemas.microsoft.com/office/powerpoint/2010/main" val="3257151273"/>
+      </p:ext>
+    </p:extLst>
+  </p:cSld>
+  <p:clrMapOvr>
+    <a:masterClrMapping/>
+  </p:clrMapOvr>
+</p:sld>
+</file>
+
+<file path=ppt/slides/slide20.xml><?xml version="1.0" encoding="utf-8"?>
+<p:sld xmlns:a="http://schemas.openxmlformats.org/drawingml/2006/main" xmlns:r="http://schemas.openxmlformats.org/officeDocument/2006/relationships" xmlns:p="http://schemas.openxmlformats.org/presentationml/2006/main">
+  <p:cSld>
+    <p:spTree>
+      <p:nvGrpSpPr>
+        <p:cNvPr id="1" name=""/>
+        <p:cNvGrpSpPr/>
+        <p:nvPr/>
+      </p:nvGrpSpPr>
+      <p:grpSpPr>
+        <a:xfrm>
+          <a:off x="0" y="0"/>
+          <a:ext cx="0" cy="0"/>
+          <a:chOff x="0" y="0"/>
+          <a:chExt cx="0" cy="0"/>
+        </a:xfrm>
+      </p:grpSpPr>
+      <p:sp>
+        <p:nvSpPr>
+          <p:cNvPr id="2" name="Nadpis 1">
+            <a:extLst>
+              <a:ext uri="{FF2B5EF4-FFF2-40B4-BE49-F238E27FC236}">
+                <a16:creationId xmlns:a16="http://schemas.microsoft.com/office/drawing/2014/main" id="{52E8184C-F942-BDA9-10EE-4A79584059A1}"/>
+              </a:ext>
+            </a:extLst>
+          </p:cNvPr>
+          <p:cNvSpPr>
+            <a:spLocks noGrp="1"/>
+          </p:cNvSpPr>
+          <p:nvPr>
+            <p:ph type="title"/>
+          </p:nvPr>
+        </p:nvSpPr>
+        <p:spPr/>
+        <p:txBody>
+          <a:bodyPr/>
+          <a:lstStyle/>
+          <a:p>
+            <a:r>
+              <a:rPr lang="cs-CZ"/>
+              <a:t>Otázky</a:t>
+            </a:r>
+            <a:endParaRPr lang="cs-CZ" dirty="0"/>
+          </a:p>
+        </p:txBody>
+      </p:sp>
+      <p:sp>
+        <p:nvSpPr>
+          <p:cNvPr id="3" name="Zástupný obsah 2">
+            <a:extLst>
+              <a:ext uri="{FF2B5EF4-FFF2-40B4-BE49-F238E27FC236}">
+                <a16:creationId xmlns:a16="http://schemas.microsoft.com/office/drawing/2014/main" id="{67DEFF6A-817C-28FA-9ED2-2772E0BB8AE9}"/>
+              </a:ext>
+            </a:extLst>
+          </p:cNvPr>
+          <p:cNvSpPr>
+            <a:spLocks noGrp="1"/>
+          </p:cNvSpPr>
+          <p:nvPr>
+            <p:ph idx="1"/>
+          </p:nvPr>
+        </p:nvSpPr>
+        <p:spPr/>
+        <p:txBody>
+          <a:bodyPr/>
+          <a:lstStyle/>
+          <a:p>
+            <a:r>
+              <a:rPr lang="cs-CZ" dirty="0"/>
+              <a:t>Na které frameworky, kromě těch, které jste v práci použil, jste při analýze dostupných řešení narazil a proč jste je vyřadil z užšího výběru?</a:t>
+            </a:r>
+          </a:p>
+          <a:p>
+            <a:r>
+              <a:rPr lang="cs-CZ" dirty="0"/>
+              <a:t>Dovedete odhadnout, jak náročné (časově a délka kódu) by bylo implementovat komponenty z Vaší práce, bez použití frameworku?</a:t>
+            </a:r>
+          </a:p>
+          <a:p>
+            <a:r>
+              <a:rPr lang="cs-CZ" dirty="0"/>
+              <a:t>Znáte i jiné frameworky pro vývoj </a:t>
+            </a:r>
+            <a:r>
+              <a:rPr lang="cs-CZ" dirty="0" err="1"/>
+              <a:t>frontendu</a:t>
+            </a:r>
+            <a:r>
+              <a:rPr lang="cs-CZ" dirty="0"/>
+              <a:t> webových aplikací?</a:t>
+            </a:r>
+          </a:p>
+          <a:p>
+            <a:r>
+              <a:rPr lang="cs-CZ" dirty="0"/>
+              <a:t>Kolik času vám přibližně zabral vývoj demonstrační aplikace?</a:t>
+            </a:r>
+          </a:p>
+        </p:txBody>
+      </p:sp>
+    </p:spTree>
+    <p:extLst>
+      <p:ext uri="{BB962C8B-B14F-4D97-AF65-F5344CB8AC3E}">
+        <p14:creationId xmlns:p14="http://schemas.microsoft.com/office/powerpoint/2010/main" val="2016646041"/>
       </p:ext>
     </p:extLst>
   </p:cSld>
@@ -28999,7 +29295,7 @@
             <p:ph idx="1"/>
             <p:extLst>
               <p:ext uri="{D42A27DB-BD31-4B8C-83A1-F6EECF244321}">
-                <p14:modId xmlns:p14="http://schemas.microsoft.com/office/powerpoint/2010/main" val="3849276483"/>
+                <p14:modId xmlns:p14="http://schemas.microsoft.com/office/powerpoint/2010/main" val="1148573636"/>
               </p:ext>
             </p:extLst>
           </p:nvPr>

</xml_diff>

<commit_message>
presentation: update presentation, add questions
</commit_message>
<xml_diff>
--- a/presentation/prezentace-sukenik.pptx
+++ b/presentation/prezentace-sukenik.pptx
@@ -5,7 +5,7 @@
     <p:sldMasterId id="2147483672" r:id="rId1"/>
   </p:sldMasterIdLst>
   <p:notesMasterIdLst>
-    <p:notesMasterId r:id="rId22"/>
+    <p:notesMasterId r:id="rId25"/>
   </p:notesMasterIdLst>
   <p:sldIdLst>
     <p:sldId id="256" r:id="rId2"/>
@@ -24,10 +24,13 @@
     <p:sldId id="275" r:id="rId15"/>
     <p:sldId id="276" r:id="rId16"/>
     <p:sldId id="277" r:id="rId17"/>
-    <p:sldId id="278" r:id="rId18"/>
-    <p:sldId id="262" r:id="rId19"/>
-    <p:sldId id="263" r:id="rId20"/>
-    <p:sldId id="279" r:id="rId21"/>
+    <p:sldId id="280" r:id="rId18"/>
+    <p:sldId id="281" r:id="rId19"/>
+    <p:sldId id="278" r:id="rId20"/>
+    <p:sldId id="262" r:id="rId21"/>
+    <p:sldId id="263" r:id="rId22"/>
+    <p:sldId id="279" r:id="rId23"/>
+    <p:sldId id="285" r:id="rId24"/>
   </p:sldIdLst>
   <p:sldSz cx="12192000" cy="6858000"/>
   <p:notesSz cx="6858000" cy="9144000"/>
@@ -22743,7 +22746,7 @@
           <a:p>
             <a:fld id="{BFD69B07-0B0A-4C05-A703-6676C3D2464B}" type="datetimeFigureOut">
               <a:rPr lang="cs-CZ" smtClean="0"/>
-              <a:t>17.05.2024</a:t>
+              <a:t>21.05.2024</a:t>
             </a:fld>
             <a:endParaRPr lang="cs-CZ"/>
           </a:p>
@@ -23320,7 +23323,7 @@
           <a:p>
             <a:fld id="{00931C66-D2AF-4486-9C9F-8FD9FF94E206}" type="datetimeFigureOut">
               <a:rPr lang="cs-CZ" smtClean="0"/>
-              <a:t>17.05.2024</a:t>
+              <a:t>21.05.2024</a:t>
             </a:fld>
             <a:endParaRPr lang="cs-CZ"/>
           </a:p>
@@ -23528,7 +23531,7 @@
           <a:p>
             <a:fld id="{00931C66-D2AF-4486-9C9F-8FD9FF94E206}" type="datetimeFigureOut">
               <a:rPr lang="cs-CZ" smtClean="0"/>
-              <a:t>17.05.2024</a:t>
+              <a:t>21.05.2024</a:t>
             </a:fld>
             <a:endParaRPr lang="cs-CZ"/>
           </a:p>
@@ -23784,7 +23787,7 @@
           <a:p>
             <a:fld id="{00931C66-D2AF-4486-9C9F-8FD9FF94E206}" type="datetimeFigureOut">
               <a:rPr lang="cs-CZ" smtClean="0"/>
-              <a:t>17.05.2024</a:t>
+              <a:t>21.05.2024</a:t>
             </a:fld>
             <a:endParaRPr lang="cs-CZ"/>
           </a:p>
@@ -23954,7 +23957,7 @@
           <a:p>
             <a:fld id="{00931C66-D2AF-4486-9C9F-8FD9FF94E206}" type="datetimeFigureOut">
               <a:rPr lang="cs-CZ" smtClean="0"/>
-              <a:t>17.05.2024</a:t>
+              <a:t>21.05.2024</a:t>
             </a:fld>
             <a:endParaRPr lang="cs-CZ"/>
           </a:p>
@@ -24297,7 +24300,7 @@
           <a:p>
             <a:fld id="{00931C66-D2AF-4486-9C9F-8FD9FF94E206}" type="datetimeFigureOut">
               <a:rPr lang="cs-CZ" smtClean="0"/>
-              <a:t>17.05.2024</a:t>
+              <a:t>21.05.2024</a:t>
             </a:fld>
             <a:endParaRPr lang="cs-CZ"/>
           </a:p>
@@ -24572,7 +24575,7 @@
           <a:p>
             <a:fld id="{00931C66-D2AF-4486-9C9F-8FD9FF94E206}" type="datetimeFigureOut">
               <a:rPr lang="cs-CZ" smtClean="0"/>
-              <a:t>17.05.2024</a:t>
+              <a:t>21.05.2024</a:t>
             </a:fld>
             <a:endParaRPr lang="cs-CZ"/>
           </a:p>
@@ -24951,7 +24954,7 @@
           <a:p>
             <a:fld id="{00931C66-D2AF-4486-9C9F-8FD9FF94E206}" type="datetimeFigureOut">
               <a:rPr lang="cs-CZ" smtClean="0"/>
-              <a:t>17.05.2024</a:t>
+              <a:t>21.05.2024</a:t>
             </a:fld>
             <a:endParaRPr lang="cs-CZ"/>
           </a:p>
@@ -25069,7 +25072,7 @@
           <a:p>
             <a:fld id="{00931C66-D2AF-4486-9C9F-8FD9FF94E206}" type="datetimeFigureOut">
               <a:rPr lang="cs-CZ" smtClean="0"/>
-              <a:t>17.05.2024</a:t>
+              <a:t>21.05.2024</a:t>
             </a:fld>
             <a:endParaRPr lang="cs-CZ"/>
           </a:p>
@@ -25240,7 +25243,7 @@
           <a:p>
             <a:fld id="{00931C66-D2AF-4486-9C9F-8FD9FF94E206}" type="datetimeFigureOut">
               <a:rPr lang="cs-CZ" smtClean="0"/>
-              <a:t>17.05.2024</a:t>
+              <a:t>21.05.2024</a:t>
             </a:fld>
             <a:endParaRPr lang="cs-CZ"/>
           </a:p>
@@ -25594,7 +25597,7 @@
           <a:p>
             <a:fld id="{00931C66-D2AF-4486-9C9F-8FD9FF94E206}" type="datetimeFigureOut">
               <a:rPr lang="cs-CZ" smtClean="0"/>
-              <a:t>17.05.2024</a:t>
+              <a:t>21.05.2024</a:t>
             </a:fld>
             <a:endParaRPr lang="cs-CZ"/>
           </a:p>
@@ -25971,7 +25974,7 @@
           <a:p>
             <a:fld id="{00931C66-D2AF-4486-9C9F-8FD9FF94E206}" type="datetimeFigureOut">
               <a:rPr lang="cs-CZ" smtClean="0"/>
-              <a:t>17.05.2024</a:t>
+              <a:t>21.05.2024</a:t>
             </a:fld>
             <a:endParaRPr lang="cs-CZ"/>
           </a:p>
@@ -26258,7 +26261,7 @@
           <a:p>
             <a:fld id="{00931C66-D2AF-4486-9C9F-8FD9FF94E206}" type="datetimeFigureOut">
               <a:rPr lang="cs-CZ" smtClean="0"/>
-              <a:t>17.05.2024</a:t>
+              <a:t>21.05.2024</a:t>
             </a:fld>
             <a:endParaRPr lang="cs-CZ"/>
           </a:p>
@@ -26848,13 +26851,8 @@
             </a:br>
             <a:r>
               <a:rPr lang="cs-CZ" sz="4000" dirty="0"/>
-              <a:t>Oponent: Mgr. Jan </a:t>
+              <a:t>Oponent: Mgr. Jan Schreier</a:t>
             </a:r>
-            <a:r>
-              <a:rPr lang="cs-CZ" sz="4000" dirty="0" err="1"/>
-              <a:t>Schreier</a:t>
-            </a:r>
-            <a:endParaRPr lang="cs-CZ" sz="4000" dirty="0"/>
           </a:p>
         </p:txBody>
       </p:sp>
@@ -27613,14 +27611,14 @@
           <p:nvPr>
             <p:extLst>
               <p:ext uri="{D42A27DB-BD31-4B8C-83A1-F6EECF244321}">
-                <p14:modId xmlns:p14="http://schemas.microsoft.com/office/powerpoint/2010/main" val="2442676244"/>
+                <p14:modId xmlns:p14="http://schemas.microsoft.com/office/powerpoint/2010/main" val="3616807694"/>
               </p:ext>
             </p:extLst>
           </p:nvPr>
         </p:nvGraphicFramePr>
         <p:xfrm>
-          <a:off x="44577" y="2227257"/>
-          <a:ext cx="3948922" cy="4601842"/>
+          <a:off x="1097280" y="2564088"/>
+          <a:ext cx="10058400" cy="4278123"/>
         </p:xfrm>
         <a:graphic>
           <a:graphicData uri="http://schemas.openxmlformats.org/drawingml/2006/table">
@@ -27629,14 +27627,14 @@
                 <a:tableStyleId>{5C22544A-7EE6-4342-B048-85BDC9FD1C3A}</a:tableStyleId>
               </a:tblPr>
               <a:tblGrid>
-                <a:gridCol w="1974461">
+                <a:gridCol w="5029200">
                   <a:extLst>
                     <a:ext uri="{9D8B030D-6E8A-4147-A177-3AD203B41FA5}">
                       <a16:colId xmlns:a16="http://schemas.microsoft.com/office/drawing/2014/main" val="3536352215"/>
                     </a:ext>
                   </a:extLst>
                 </a:gridCol>
-                <a:gridCol w="1974461">
+                <a:gridCol w="5029200">
                   <a:extLst>
                     <a:ext uri="{9D8B030D-6E8A-4147-A177-3AD203B41FA5}">
                       <a16:colId xmlns:a16="http://schemas.microsoft.com/office/drawing/2014/main" val="2505896258"/>
@@ -27644,14 +27642,14 @@
                   </a:extLst>
                 </a:gridCol>
               </a:tblGrid>
-              <a:tr h="400450">
+              <a:tr h="367091">
                 <a:tc>
                   <a:txBody>
                     <a:bodyPr/>
                     <a:lstStyle/>
                     <a:p>
                       <a:r>
-                        <a:rPr lang="cs-CZ" sz="1700" dirty="0"/>
+                        <a:rPr lang="cs-CZ" sz="2200" dirty="0"/>
                         <a:t>Přednosti</a:t>
                       </a:r>
                     </a:p>
@@ -27664,7 +27662,7 @@
                     <a:lstStyle/>
                     <a:p>
                       <a:r>
-                        <a:rPr lang="cs-CZ" sz="1700" dirty="0"/>
+                        <a:rPr lang="cs-CZ" sz="2200" dirty="0"/>
                         <a:t>Slabiny</a:t>
                       </a:r>
                     </a:p>
@@ -27677,14 +27675,14 @@
                   </a:ext>
                 </a:extLst>
               </a:tr>
-              <a:tr h="834868">
+              <a:tr h="765321">
                 <a:tc>
                   <a:txBody>
                     <a:bodyPr/>
                     <a:lstStyle/>
                     <a:p>
                       <a:r>
-                        <a:rPr lang="cs-CZ" sz="1700" dirty="0"/>
+                        <a:rPr lang="cs-CZ" sz="2200" dirty="0"/>
                         <a:t>Modularita, robustnost aplikace</a:t>
                       </a:r>
                     </a:p>
@@ -27697,7 +27695,7 @@
                     <a:lstStyle/>
                     <a:p>
                       <a:r>
-                        <a:rPr lang="cs-CZ" sz="1700" dirty="0"/>
+                        <a:rPr lang="cs-CZ" sz="2200" dirty="0"/>
                         <a:t>Robustní, spíše pro větší projekty</a:t>
                       </a:r>
                     </a:p>
@@ -27710,14 +27708,14 @@
                   </a:ext>
                 </a:extLst>
               </a:tr>
-              <a:tr h="913280">
+              <a:tr h="837201">
                 <a:tc>
                   <a:txBody>
                     <a:bodyPr/>
                     <a:lstStyle/>
                     <a:p>
                       <a:r>
-                        <a:rPr lang="cs-CZ" sz="1700" dirty="0"/>
+                        <a:rPr lang="cs-CZ" sz="2200" dirty="0"/>
                         <a:t>Mnoho nativních balíčků</a:t>
                       </a:r>
                     </a:p>
@@ -27730,7 +27728,7 @@
                     <a:lstStyle/>
                     <a:p>
                       <a:r>
-                        <a:rPr lang="cs-CZ" sz="1700" dirty="0"/>
+                        <a:rPr lang="cs-CZ" sz="2200" dirty="0"/>
                         <a:t>Náročnější křivka učení</a:t>
                       </a:r>
                     </a:p>
@@ -27743,14 +27741,14 @@
                   </a:ext>
                 </a:extLst>
               </a:tr>
-              <a:tr h="870096">
+              <a:tr h="797614">
                 <a:tc>
                   <a:txBody>
                     <a:bodyPr/>
                     <a:lstStyle/>
                     <a:p>
                       <a:r>
-                        <a:rPr lang="cs-CZ" sz="1700" dirty="0"/>
+                        <a:rPr lang="cs-CZ" sz="2200" dirty="0"/>
                         <a:t>Spoustu funkcí frameworku</a:t>
                       </a:r>
                     </a:p>
@@ -27763,15 +27761,15 @@
                     <a:lstStyle/>
                     <a:p>
                       <a:r>
-                        <a:rPr lang="cs-CZ" sz="1700" dirty="0"/>
+                        <a:rPr lang="cs-CZ" sz="2200" dirty="0"/>
                         <a:t>Velké množství </a:t>
                       </a:r>
                       <a:r>
-                        <a:rPr lang="cs-CZ" sz="1700" dirty="0" err="1"/>
+                        <a:rPr lang="cs-CZ" sz="2200" dirty="0" err="1"/>
                         <a:t>boilerplate</a:t>
                       </a:r>
                       <a:r>
-                        <a:rPr lang="cs-CZ" sz="1700" dirty="0"/>
+                        <a:rPr lang="cs-CZ" sz="2200" dirty="0"/>
                         <a:t> a konfigurací</a:t>
                       </a:r>
                     </a:p>
@@ -27784,14 +27782,14 @@
                   </a:ext>
                 </a:extLst>
               </a:tr>
-              <a:tr h="713052">
+              <a:tr h="653653">
                 <a:tc>
                   <a:txBody>
                     <a:bodyPr/>
                     <a:lstStyle/>
                     <a:p>
                       <a:r>
-                        <a:rPr lang="cs-CZ" sz="1700" dirty="0"/>
+                        <a:rPr lang="cs-CZ" sz="2200" dirty="0"/>
                         <a:t>Podpora TypeScript již v základu</a:t>
                       </a:r>
                     </a:p>
@@ -27804,7 +27802,7 @@
                     <a:lstStyle/>
                     <a:p>
                       <a:r>
-                        <a:rPr lang="cs-CZ" sz="1700" dirty="0"/>
+                        <a:rPr lang="cs-CZ" sz="2200" dirty="0"/>
                         <a:t>Složité předávání více vlastností</a:t>
                       </a:r>
                     </a:p>
@@ -27817,18 +27815,18 @@
                   </a:ext>
                 </a:extLst>
               </a:tr>
-              <a:tr h="870096">
+              <a:tr h="797614">
                 <a:tc>
                   <a:txBody>
                     <a:bodyPr/>
                     <a:lstStyle/>
                     <a:p>
                       <a:r>
-                        <a:rPr lang="cs-CZ" sz="1700" dirty="0" err="1"/>
+                        <a:rPr lang="cs-CZ" sz="2200" dirty="0" err="1"/>
                         <a:t>Angular</a:t>
                       </a:r>
                       <a:r>
-                        <a:rPr lang="cs-CZ" sz="1700" dirty="0"/>
+                        <a:rPr lang="cs-CZ" sz="2200" dirty="0"/>
                         <a:t> CLI</a:t>
                       </a:r>
                     </a:p>
@@ -27841,542 +27839,12 @@
                     <a:lstStyle/>
                     <a:p>
                       <a:r>
-                        <a:rPr lang="cs-CZ" sz="1700" dirty="0"/>
+                        <a:rPr lang="cs-CZ" sz="2200" dirty="0"/>
                         <a:t>Generuje elementy komponent v DOM</a:t>
                       </a:r>
                     </a:p>
                     <a:p>
-                      <a:endParaRPr lang="cs-CZ" sz="1700" dirty="0"/>
-                    </a:p>
-                  </a:txBody>
-                  <a:tcPr/>
-                </a:tc>
-                <a:extLst>
-                  <a:ext uri="{0D108BD9-81ED-4DB2-BD59-A6C34878D82A}">
-                    <a16:rowId xmlns:a16="http://schemas.microsoft.com/office/drawing/2014/main" val="2135821235"/>
-                  </a:ext>
-                </a:extLst>
-              </a:tr>
-            </a:tbl>
-          </a:graphicData>
-        </a:graphic>
-      </p:graphicFrame>
-      <p:graphicFrame>
-        <p:nvGraphicFramePr>
-          <p:cNvPr id="7" name="Tabulka 6">
-            <a:extLst>
-              <a:ext uri="{FF2B5EF4-FFF2-40B4-BE49-F238E27FC236}">
-                <a16:creationId xmlns:a16="http://schemas.microsoft.com/office/drawing/2014/main" id="{631EBFD6-F77F-2AFC-30E9-E3394E7D3FE0}"/>
-              </a:ext>
-            </a:extLst>
-          </p:cNvPr>
-          <p:cNvGraphicFramePr>
-            <a:graphicFrameLocks noGrp="1"/>
-          </p:cNvGraphicFramePr>
-          <p:nvPr>
-            <p:extLst>
-              <p:ext uri="{D42A27DB-BD31-4B8C-83A1-F6EECF244321}">
-                <p14:modId xmlns:p14="http://schemas.microsoft.com/office/powerpoint/2010/main" val="1564756149"/>
-              </p:ext>
-            </p:extLst>
-          </p:nvPr>
-        </p:nvGraphicFramePr>
-        <p:xfrm>
-          <a:off x="4121539" y="2227258"/>
-          <a:ext cx="3948922" cy="4601843"/>
-        </p:xfrm>
-        <a:graphic>
-          <a:graphicData uri="http://schemas.openxmlformats.org/drawingml/2006/table">
-            <a:tbl>
-              <a:tblPr firstRow="1" bandRow="1">
-                <a:tableStyleId>{5C22544A-7EE6-4342-B048-85BDC9FD1C3A}</a:tableStyleId>
-              </a:tblPr>
-              <a:tblGrid>
-                <a:gridCol w="1974461">
-                  <a:extLst>
-                    <a:ext uri="{9D8B030D-6E8A-4147-A177-3AD203B41FA5}">
-                      <a16:colId xmlns:a16="http://schemas.microsoft.com/office/drawing/2014/main" val="3536352215"/>
-                    </a:ext>
-                  </a:extLst>
-                </a:gridCol>
-                <a:gridCol w="1974461">
-                  <a:extLst>
-                    <a:ext uri="{9D8B030D-6E8A-4147-A177-3AD203B41FA5}">
-                      <a16:colId xmlns:a16="http://schemas.microsoft.com/office/drawing/2014/main" val="2505896258"/>
-                    </a:ext>
-                  </a:extLst>
-                </a:gridCol>
-              </a:tblGrid>
-              <a:tr h="413220">
-                <a:tc>
-                  <a:txBody>
-                    <a:bodyPr/>
-                    <a:lstStyle/>
-                    <a:p>
-                      <a:r>
-                        <a:rPr lang="cs-CZ" sz="1700" dirty="0"/>
-                        <a:t>Přednosti</a:t>
-                      </a:r>
-                    </a:p>
-                  </a:txBody>
-                  <a:tcPr/>
-                </a:tc>
-                <a:tc>
-                  <a:txBody>
-                    <a:bodyPr/>
-                    <a:lstStyle/>
-                    <a:p>
-                      <a:r>
-                        <a:rPr lang="cs-CZ" sz="1700" dirty="0"/>
-                        <a:t>Slabiny</a:t>
-                      </a:r>
-                    </a:p>
-                  </a:txBody>
-                  <a:tcPr/>
-                </a:tc>
-                <a:extLst>
-                  <a:ext uri="{0D108BD9-81ED-4DB2-BD59-A6C34878D82A}">
-                    <a16:rowId xmlns:a16="http://schemas.microsoft.com/office/drawing/2014/main" val="2062353870"/>
-                  </a:ext>
-                </a:extLst>
-              </a:tr>
-              <a:tr h="845633">
-                <a:tc>
-                  <a:txBody>
-                    <a:bodyPr/>
-                    <a:lstStyle/>
-                    <a:p>
-                      <a:r>
-                        <a:rPr lang="cs-CZ" sz="1700" dirty="0"/>
-                        <a:t>Silný ekosystém a propracované balíky</a:t>
-                      </a:r>
-                    </a:p>
-                  </a:txBody>
-                  <a:tcPr/>
-                </a:tc>
-                <a:tc>
-                  <a:txBody>
-                    <a:bodyPr/>
-                    <a:lstStyle/>
-                    <a:p>
-                      <a:r>
-                        <a:rPr lang="cs-CZ" sz="1700" dirty="0"/>
-                        <a:t>Špatné techniky vedou k chybám</a:t>
-                      </a:r>
-                    </a:p>
-                  </a:txBody>
-                  <a:tcPr/>
-                </a:tc>
-                <a:extLst>
-                  <a:ext uri="{0D108BD9-81ED-4DB2-BD59-A6C34878D82A}">
-                    <a16:rowId xmlns:a16="http://schemas.microsoft.com/office/drawing/2014/main" val="492398440"/>
-                  </a:ext>
-                </a:extLst>
-              </a:tr>
-              <a:tr h="930446">
-                <a:tc>
-                  <a:txBody>
-                    <a:bodyPr/>
-                    <a:lstStyle/>
-                    <a:p>
-                      <a:r>
-                        <a:rPr lang="cs-CZ" sz="1700" dirty="0"/>
-                        <a:t>Kvalitní dokumentace, chybové hlášky</a:t>
-                      </a:r>
-                    </a:p>
-                  </a:txBody>
-                  <a:tcPr/>
-                </a:tc>
-                <a:tc>
-                  <a:txBody>
-                    <a:bodyPr/>
-                    <a:lstStyle/>
-                    <a:p>
-                      <a:r>
-                        <a:rPr lang="cs-CZ" sz="1700" dirty="0"/>
-                        <a:t>Neintuitivní kontrola živ. cyklu</a:t>
-                      </a:r>
-                    </a:p>
-                  </a:txBody>
-                  <a:tcPr/>
-                </a:tc>
-                <a:extLst>
-                  <a:ext uri="{0D108BD9-81ED-4DB2-BD59-A6C34878D82A}">
-                    <a16:rowId xmlns:a16="http://schemas.microsoft.com/office/drawing/2014/main" val="78007109"/>
-                  </a:ext>
-                </a:extLst>
-              </a:tr>
-              <a:tr h="846706">
-                <a:tc>
-                  <a:txBody>
-                    <a:bodyPr/>
-                    <a:lstStyle/>
-                    <a:p>
-                      <a:r>
-                        <a:rPr lang="cs-CZ" sz="1700" dirty="0"/>
-                        <a:t>Typy pro atributy HTML elementů</a:t>
-                      </a:r>
-                    </a:p>
-                  </a:txBody>
-                  <a:tcPr/>
-                </a:tc>
-                <a:tc>
-                  <a:txBody>
-                    <a:bodyPr/>
-                    <a:lstStyle/>
-                    <a:p>
-                      <a:r>
-                        <a:rPr lang="cs-CZ" sz="1700" dirty="0"/>
-                        <a:t>Asynchronní aktualizace stavů</a:t>
-                      </a:r>
-                    </a:p>
-                  </a:txBody>
-                  <a:tcPr/>
-                </a:tc>
-                <a:extLst>
-                  <a:ext uri="{0D108BD9-81ED-4DB2-BD59-A6C34878D82A}">
-                    <a16:rowId xmlns:a16="http://schemas.microsoft.com/office/drawing/2014/main" val="1819840584"/>
-                  </a:ext>
-                </a:extLst>
-              </a:tr>
-              <a:tr h="677281">
-                <a:tc>
-                  <a:txBody>
-                    <a:bodyPr/>
-                    <a:lstStyle/>
-                    <a:p>
-                      <a:r>
-                        <a:rPr lang="cs-CZ" sz="1700" dirty="0"/>
-                        <a:t>Práce se vstupními vlastnostmi</a:t>
-                      </a:r>
-                    </a:p>
-                  </a:txBody>
-                  <a:tcPr/>
-                </a:tc>
-                <a:tc>
-                  <a:txBody>
-                    <a:bodyPr/>
-                    <a:lstStyle/>
-                    <a:p>
-                      <a:r>
-                        <a:rPr lang="cs-CZ" sz="1700" dirty="0"/>
-                        <a:t>Složitější předávání vlastnosti rodiči</a:t>
-                      </a:r>
-                    </a:p>
-                  </a:txBody>
-                  <a:tcPr/>
-                </a:tc>
-                <a:extLst>
-                  <a:ext uri="{0D108BD9-81ED-4DB2-BD59-A6C34878D82A}">
-                    <a16:rowId xmlns:a16="http://schemas.microsoft.com/office/drawing/2014/main" val="2233078519"/>
-                  </a:ext>
-                </a:extLst>
-              </a:tr>
-              <a:tr h="888557">
-                <a:tc>
-                  <a:txBody>
-                    <a:bodyPr/>
-                    <a:lstStyle/>
-                    <a:p>
-                      <a:r>
-                        <a:rPr lang="cs-CZ" sz="1700" dirty="0"/>
-                        <a:t>Modularita pomocí vlastních </a:t>
-                      </a:r>
-                      <a:r>
-                        <a:rPr lang="cs-CZ" sz="1700" dirty="0" err="1"/>
-                        <a:t>hooků</a:t>
-                      </a:r>
-                      <a:endParaRPr lang="cs-CZ" sz="1700" dirty="0"/>
-                    </a:p>
-                    <a:p>
-                      <a:endParaRPr lang="cs-CZ" sz="1700" dirty="0"/>
-                    </a:p>
-                  </a:txBody>
-                  <a:tcPr/>
-                </a:tc>
-                <a:tc>
-                  <a:txBody>
-                    <a:bodyPr/>
-                    <a:lstStyle/>
-                    <a:p>
-                      <a:r>
-                        <a:rPr lang="cs-CZ" sz="1700" dirty="0"/>
-                        <a:t>Pole závislostí v </a:t>
-                      </a:r>
-                      <a:r>
-                        <a:rPr lang="cs-CZ" sz="1700" dirty="0" err="1"/>
-                        <a:t>useEffect</a:t>
-                      </a:r>
-                      <a:r>
-                        <a:rPr lang="cs-CZ" sz="1700" dirty="0"/>
-                        <a:t> </a:t>
-                      </a:r>
-                      <a:r>
-                        <a:rPr lang="cs-CZ" sz="1700" dirty="0" err="1"/>
-                        <a:t>hooku</a:t>
-                      </a:r>
-                      <a:endParaRPr lang="cs-CZ" sz="1700" dirty="0"/>
-                    </a:p>
-                  </a:txBody>
-                  <a:tcPr/>
-                </a:tc>
-                <a:extLst>
-                  <a:ext uri="{0D108BD9-81ED-4DB2-BD59-A6C34878D82A}">
-                    <a16:rowId xmlns:a16="http://schemas.microsoft.com/office/drawing/2014/main" val="2135821235"/>
-                  </a:ext>
-                </a:extLst>
-              </a:tr>
-            </a:tbl>
-          </a:graphicData>
-        </a:graphic>
-      </p:graphicFrame>
-      <p:graphicFrame>
-        <p:nvGraphicFramePr>
-          <p:cNvPr id="8" name="Tabulka 7">
-            <a:extLst>
-              <a:ext uri="{FF2B5EF4-FFF2-40B4-BE49-F238E27FC236}">
-                <a16:creationId xmlns:a16="http://schemas.microsoft.com/office/drawing/2014/main" id="{5E8B40D5-2883-0F50-E0FC-38D8C821DC41}"/>
-              </a:ext>
-            </a:extLst>
-          </p:cNvPr>
-          <p:cNvGraphicFramePr>
-            <a:graphicFrameLocks noGrp="1"/>
-          </p:cNvGraphicFramePr>
-          <p:nvPr>
-            <p:extLst>
-              <p:ext uri="{D42A27DB-BD31-4B8C-83A1-F6EECF244321}">
-                <p14:modId xmlns:p14="http://schemas.microsoft.com/office/powerpoint/2010/main" val="2247232451"/>
-              </p:ext>
-            </p:extLst>
-          </p:nvPr>
-        </p:nvGraphicFramePr>
-        <p:xfrm>
-          <a:off x="8207832" y="2227257"/>
-          <a:ext cx="3948922" cy="4601844"/>
-        </p:xfrm>
-        <a:graphic>
-          <a:graphicData uri="http://schemas.openxmlformats.org/drawingml/2006/table">
-            <a:tbl>
-              <a:tblPr firstRow="1" bandRow="1">
-                <a:tableStyleId>{5C22544A-7EE6-4342-B048-85BDC9FD1C3A}</a:tableStyleId>
-              </a:tblPr>
-              <a:tblGrid>
-                <a:gridCol w="1974461">
-                  <a:extLst>
-                    <a:ext uri="{9D8B030D-6E8A-4147-A177-3AD203B41FA5}">
-                      <a16:colId xmlns:a16="http://schemas.microsoft.com/office/drawing/2014/main" val="3536352215"/>
-                    </a:ext>
-                  </a:extLst>
-                </a:gridCol>
-                <a:gridCol w="1974461">
-                  <a:extLst>
-                    <a:ext uri="{9D8B030D-6E8A-4147-A177-3AD203B41FA5}">
-                      <a16:colId xmlns:a16="http://schemas.microsoft.com/office/drawing/2014/main" val="2505896258"/>
-                    </a:ext>
-                  </a:extLst>
-                </a:gridCol>
-              </a:tblGrid>
-              <a:tr h="409030">
-                <a:tc>
-                  <a:txBody>
-                    <a:bodyPr/>
-                    <a:lstStyle/>
-                    <a:p>
-                      <a:r>
-                        <a:rPr lang="cs-CZ" sz="1700" dirty="0"/>
-                        <a:t>Přednosti</a:t>
-                      </a:r>
-                    </a:p>
-                  </a:txBody>
-                  <a:tcPr/>
-                </a:tc>
-                <a:tc>
-                  <a:txBody>
-                    <a:bodyPr/>
-                    <a:lstStyle/>
-                    <a:p>
-                      <a:r>
-                        <a:rPr lang="cs-CZ" sz="1700" dirty="0"/>
-                        <a:t>Slabiny</a:t>
-                      </a:r>
-                    </a:p>
-                  </a:txBody>
-                  <a:tcPr/>
-                </a:tc>
-                <a:extLst>
-                  <a:ext uri="{0D108BD9-81ED-4DB2-BD59-A6C34878D82A}">
-                    <a16:rowId xmlns:a16="http://schemas.microsoft.com/office/drawing/2014/main" val="2062353870"/>
-                  </a:ext>
-                </a:extLst>
-              </a:tr>
-              <a:tr h="868639">
-                <a:tc>
-                  <a:txBody>
-                    <a:bodyPr/>
-                    <a:lstStyle/>
-                    <a:p>
-                      <a:r>
-                        <a:rPr lang="cs-CZ" sz="1700" dirty="0"/>
-                        <a:t>Jednoduchost, přímočarost, rychlost</a:t>
-                      </a:r>
-                    </a:p>
-                  </a:txBody>
-                  <a:tcPr/>
-                </a:tc>
-                <a:tc>
-                  <a:txBody>
-                    <a:bodyPr/>
-                    <a:lstStyle/>
-                    <a:p>
-                      <a:r>
-                        <a:rPr lang="cs-CZ" sz="1700" dirty="0"/>
-                        <a:t>Menší ekosystém    a komunita</a:t>
-                      </a:r>
-                    </a:p>
-                  </a:txBody>
-                  <a:tcPr/>
-                </a:tc>
-                <a:extLst>
-                  <a:ext uri="{0D108BD9-81ED-4DB2-BD59-A6C34878D82A}">
-                    <a16:rowId xmlns:a16="http://schemas.microsoft.com/office/drawing/2014/main" val="492398440"/>
-                  </a:ext>
-                </a:extLst>
-              </a:tr>
-              <a:tr h="927074">
-                <a:tc>
-                  <a:txBody>
-                    <a:bodyPr/>
-                    <a:lstStyle/>
-                    <a:p>
-                      <a:r>
-                        <a:rPr lang="cs-CZ" sz="1700" dirty="0"/>
-                        <a:t>Čitelná syntax bez </a:t>
-                      </a:r>
-                      <a:r>
-                        <a:rPr lang="cs-CZ" sz="1700" dirty="0" err="1"/>
-                        <a:t>boilerplate</a:t>
-                      </a:r>
-                      <a:r>
-                        <a:rPr lang="cs-CZ" sz="1700" dirty="0"/>
-                        <a:t> kódu</a:t>
-                      </a:r>
-                    </a:p>
-                  </a:txBody>
-                  <a:tcPr/>
-                </a:tc>
-                <a:tc>
-                  <a:txBody>
-                    <a:bodyPr/>
-                    <a:lstStyle/>
-                    <a:p>
-                      <a:r>
-                        <a:rPr lang="cs-CZ" sz="1700" dirty="0"/>
-                        <a:t>Proměnná syntax u podmínek</a:t>
-                      </a:r>
-                    </a:p>
-                  </a:txBody>
-                  <a:tcPr/>
-                </a:tc>
-                <a:extLst>
-                  <a:ext uri="{0D108BD9-81ED-4DB2-BD59-A6C34878D82A}">
-                    <a16:rowId xmlns:a16="http://schemas.microsoft.com/office/drawing/2014/main" val="78007109"/>
-                  </a:ext>
-                </a:extLst>
-              </a:tr>
-              <a:tr h="839755">
-                <a:tc>
-                  <a:txBody>
-                    <a:bodyPr/>
-                    <a:lstStyle/>
-                    <a:p>
-                      <a:r>
-                        <a:rPr lang="cs-CZ" sz="1700" dirty="0"/>
-                        <a:t>Elegantní předávání vlastností</a:t>
-                      </a:r>
-                    </a:p>
-                  </a:txBody>
-                  <a:tcPr/>
-                </a:tc>
-                <a:tc>
-                  <a:txBody>
-                    <a:bodyPr/>
-                    <a:lstStyle/>
-                    <a:p>
-                      <a:r>
-                        <a:rPr lang="cs-CZ" sz="1700" dirty="0"/>
-                        <a:t>Potřeba reaktivity u měnících se vstupů</a:t>
-                      </a:r>
-                    </a:p>
-                  </a:txBody>
-                  <a:tcPr/>
-                </a:tc>
-                <a:extLst>
-                  <a:ext uri="{0D108BD9-81ED-4DB2-BD59-A6C34878D82A}">
-                    <a16:rowId xmlns:a16="http://schemas.microsoft.com/office/drawing/2014/main" val="1819840584"/>
-                  </a:ext>
-                </a:extLst>
-              </a:tr>
-              <a:tr h="688625">
-                <a:tc>
-                  <a:txBody>
-                    <a:bodyPr/>
-                    <a:lstStyle/>
-                    <a:p>
-                      <a:r>
-                        <a:rPr lang="cs-CZ" sz="1700" dirty="0"/>
-                        <a:t>Jednoduchá kontrola </a:t>
-                      </a:r>
-                      <a:r>
-                        <a:rPr lang="cs-CZ" sz="1700" dirty="0" err="1"/>
-                        <a:t>lifecycle</a:t>
-                      </a:r>
-                      <a:endParaRPr lang="cs-CZ" sz="1700" dirty="0"/>
-                    </a:p>
-                  </a:txBody>
-                  <a:tcPr/>
-                </a:tc>
-                <a:tc>
-                  <a:txBody>
-                    <a:bodyPr/>
-                    <a:lstStyle/>
-                    <a:p>
-                      <a:r>
-                        <a:rPr lang="cs-CZ" sz="1700" dirty="0"/>
-                        <a:t>Hůře otypované události</a:t>
-                      </a:r>
-                    </a:p>
-                  </a:txBody>
-                  <a:tcPr/>
-                </a:tc>
-                <a:extLst>
-                  <a:ext uri="{0D108BD9-81ED-4DB2-BD59-A6C34878D82A}">
-                    <a16:rowId xmlns:a16="http://schemas.microsoft.com/office/drawing/2014/main" val="2233078519"/>
-                  </a:ext>
-                </a:extLst>
-              </a:tr>
-              <a:tr h="868639">
-                <a:tc>
-                  <a:txBody>
-                    <a:bodyPr/>
-                    <a:lstStyle/>
-                    <a:p>
-                      <a:r>
-                        <a:rPr lang="cs-CZ" sz="1700" dirty="0"/>
-                        <a:t>Modifikace DOM</a:t>
-                      </a:r>
-                    </a:p>
-                  </a:txBody>
-                  <a:tcPr/>
-                </a:tc>
-                <a:tc>
-                  <a:txBody>
-                    <a:bodyPr/>
-                    <a:lstStyle/>
-                    <a:p>
-                      <a:r>
-                        <a:rPr lang="cs-CZ" sz="1700" dirty="0"/>
-                        <a:t>Import typů vyžaduje klíčové slovo navíc</a:t>
-                      </a:r>
+                      <a:endParaRPr lang="cs-CZ" sz="2200" dirty="0"/>
                     </a:p>
                   </a:txBody>
                   <a:tcPr/>
@@ -28405,8 +27873,8 @@
         </p:nvSpPr>
         <p:spPr>
           <a:xfrm>
-            <a:off x="1440995" y="1737360"/>
-            <a:ext cx="1156086" cy="461665"/>
+            <a:off x="1097280" y="1888192"/>
+            <a:ext cx="9997440" cy="492443"/>
           </a:xfrm>
           <a:prstGeom prst="rect">
             <a:avLst/>
@@ -28414,88 +27882,16 @@
           <a:noFill/>
         </p:spPr>
         <p:txBody>
-          <a:bodyPr wrap="none" rtlCol="0">
+          <a:bodyPr wrap="square" rtlCol="0">
             <a:spAutoFit/>
           </a:bodyPr>
           <a:lstStyle/>
           <a:p>
             <a:r>
-              <a:rPr lang="cs-CZ" sz="2400" dirty="0" err="1"/>
+              <a:rPr lang="cs-CZ" sz="2600" dirty="0" err="1"/>
               <a:t>Angular</a:t>
             </a:r>
-            <a:endParaRPr lang="cs-CZ" dirty="0"/>
-          </a:p>
-        </p:txBody>
-      </p:sp>
-      <p:sp>
-        <p:nvSpPr>
-          <p:cNvPr id="10" name="TextovéPole 9">
-            <a:extLst>
-              <a:ext uri="{FF2B5EF4-FFF2-40B4-BE49-F238E27FC236}">
-                <a16:creationId xmlns:a16="http://schemas.microsoft.com/office/drawing/2014/main" id="{0D05DD29-D001-91F7-E50B-8AF4DAF2C62D}"/>
-              </a:ext>
-            </a:extLst>
-          </p:cNvPr>
-          <p:cNvSpPr txBox="1"/>
-          <p:nvPr/>
-        </p:nvSpPr>
-        <p:spPr>
-          <a:xfrm>
-            <a:off x="5656103" y="1748557"/>
-            <a:ext cx="879793" cy="461665"/>
-          </a:xfrm>
-          <a:prstGeom prst="rect">
-            <a:avLst/>
-          </a:prstGeom>
-          <a:noFill/>
-        </p:spPr>
-        <p:txBody>
-          <a:bodyPr wrap="none" rtlCol="0">
-            <a:spAutoFit/>
-          </a:bodyPr>
-          <a:lstStyle/>
-          <a:p>
-            <a:r>
-              <a:rPr lang="cs-CZ" sz="2400" dirty="0" err="1"/>
-              <a:t>React</a:t>
-            </a:r>
-            <a:endParaRPr lang="cs-CZ" dirty="0"/>
-          </a:p>
-        </p:txBody>
-      </p:sp>
-      <p:sp>
-        <p:nvSpPr>
-          <p:cNvPr id="11" name="TextovéPole 10">
-            <a:extLst>
-              <a:ext uri="{FF2B5EF4-FFF2-40B4-BE49-F238E27FC236}">
-                <a16:creationId xmlns:a16="http://schemas.microsoft.com/office/drawing/2014/main" id="{6120C4EC-96E0-F95A-AA9D-9D62DD9ACEC1}"/>
-              </a:ext>
-            </a:extLst>
-          </p:cNvPr>
-          <p:cNvSpPr txBox="1"/>
-          <p:nvPr/>
-        </p:nvSpPr>
-        <p:spPr>
-          <a:xfrm>
-            <a:off x="9714152" y="1737360"/>
-            <a:ext cx="936282" cy="461665"/>
-          </a:xfrm>
-          <a:prstGeom prst="rect">
-            <a:avLst/>
-          </a:prstGeom>
-          <a:noFill/>
-        </p:spPr>
-        <p:txBody>
-          <a:bodyPr wrap="none" rtlCol="0">
-            <a:spAutoFit/>
-          </a:bodyPr>
-          <a:lstStyle/>
-          <a:p>
-            <a:r>
-              <a:rPr lang="cs-CZ" sz="2400" dirty="0" err="1"/>
-              <a:t>Svelte</a:t>
-            </a:r>
-            <a:endParaRPr lang="cs-CZ" dirty="0"/>
+            <a:endParaRPr lang="cs-CZ" sz="2600" dirty="0"/>
           </a:p>
         </p:txBody>
       </p:sp>
@@ -28513,6 +27909,724 @@
 </file>
 
 <file path=ppt/slides/slide17.xml><?xml version="1.0" encoding="utf-8"?>
+<p:sld xmlns:a="http://schemas.openxmlformats.org/drawingml/2006/main" xmlns:r="http://schemas.openxmlformats.org/officeDocument/2006/relationships" xmlns:p="http://schemas.openxmlformats.org/presentationml/2006/main">
+  <p:cSld>
+    <p:spTree>
+      <p:nvGrpSpPr>
+        <p:cNvPr id="1" name=""/>
+        <p:cNvGrpSpPr/>
+        <p:nvPr/>
+      </p:nvGrpSpPr>
+      <p:grpSpPr>
+        <a:xfrm>
+          <a:off x="0" y="0"/>
+          <a:ext cx="0" cy="0"/>
+          <a:chOff x="0" y="0"/>
+          <a:chExt cx="0" cy="0"/>
+        </a:xfrm>
+      </p:grpSpPr>
+      <p:sp>
+        <p:nvSpPr>
+          <p:cNvPr id="2" name="Nadpis 1">
+            <a:extLst>
+              <a:ext uri="{FF2B5EF4-FFF2-40B4-BE49-F238E27FC236}">
+                <a16:creationId xmlns:a16="http://schemas.microsoft.com/office/drawing/2014/main" id="{1F27CAE6-FE23-AF36-73A9-D79E1678AC4B}"/>
+              </a:ext>
+            </a:extLst>
+          </p:cNvPr>
+          <p:cNvSpPr>
+            <a:spLocks noGrp="1"/>
+          </p:cNvSpPr>
+          <p:nvPr>
+            <p:ph type="title"/>
+          </p:nvPr>
+        </p:nvSpPr>
+        <p:spPr/>
+        <p:txBody>
+          <a:bodyPr/>
+          <a:lstStyle/>
+          <a:p>
+            <a:r>
+              <a:rPr lang="cs-CZ" dirty="0"/>
+              <a:t>Testování frameworků – srovnání</a:t>
+            </a:r>
+          </a:p>
+        </p:txBody>
+      </p:sp>
+      <p:graphicFrame>
+        <p:nvGraphicFramePr>
+          <p:cNvPr id="7" name="Tabulka 6">
+            <a:extLst>
+              <a:ext uri="{FF2B5EF4-FFF2-40B4-BE49-F238E27FC236}">
+                <a16:creationId xmlns:a16="http://schemas.microsoft.com/office/drawing/2014/main" id="{631EBFD6-F77F-2AFC-30E9-E3394E7D3FE0}"/>
+              </a:ext>
+            </a:extLst>
+          </p:cNvPr>
+          <p:cNvGraphicFramePr>
+            <a:graphicFrameLocks noGrp="1"/>
+          </p:cNvGraphicFramePr>
+          <p:nvPr>
+            <p:extLst>
+              <p:ext uri="{D42A27DB-BD31-4B8C-83A1-F6EECF244321}">
+                <p14:modId xmlns:p14="http://schemas.microsoft.com/office/powerpoint/2010/main" val="4127846909"/>
+              </p:ext>
+            </p:extLst>
+          </p:nvPr>
+        </p:nvGraphicFramePr>
+        <p:xfrm>
+          <a:off x="1097279" y="2564089"/>
+          <a:ext cx="10058400" cy="4266412"/>
+        </p:xfrm>
+        <a:graphic>
+          <a:graphicData uri="http://schemas.openxmlformats.org/drawingml/2006/table">
+            <a:tbl>
+              <a:tblPr firstRow="1" bandRow="1">
+                <a:tableStyleId>{5C22544A-7EE6-4342-B048-85BDC9FD1C3A}</a:tableStyleId>
+              </a:tblPr>
+              <a:tblGrid>
+                <a:gridCol w="5029200">
+                  <a:extLst>
+                    <a:ext uri="{9D8B030D-6E8A-4147-A177-3AD203B41FA5}">
+                      <a16:colId xmlns:a16="http://schemas.microsoft.com/office/drawing/2014/main" val="3536352215"/>
+                    </a:ext>
+                  </a:extLst>
+                </a:gridCol>
+                <a:gridCol w="5029200">
+                  <a:extLst>
+                    <a:ext uri="{9D8B030D-6E8A-4147-A177-3AD203B41FA5}">
+                      <a16:colId xmlns:a16="http://schemas.microsoft.com/office/drawing/2014/main" val="2505896258"/>
+                    </a:ext>
+                  </a:extLst>
+                </a:gridCol>
+              </a:tblGrid>
+              <a:tr h="378797">
+                <a:tc>
+                  <a:txBody>
+                    <a:bodyPr/>
+                    <a:lstStyle/>
+                    <a:p>
+                      <a:r>
+                        <a:rPr lang="cs-CZ" sz="2200" dirty="0"/>
+                        <a:t>Přednosti</a:t>
+                      </a:r>
+                    </a:p>
+                  </a:txBody>
+                  <a:tcPr/>
+                </a:tc>
+                <a:tc>
+                  <a:txBody>
+                    <a:bodyPr/>
+                    <a:lstStyle/>
+                    <a:p>
+                      <a:r>
+                        <a:rPr lang="cs-CZ" sz="2200" dirty="0"/>
+                        <a:t>Slabiny</a:t>
+                      </a:r>
+                    </a:p>
+                  </a:txBody>
+                  <a:tcPr/>
+                </a:tc>
+                <a:extLst>
+                  <a:ext uri="{0D108BD9-81ED-4DB2-BD59-A6C34878D82A}">
+                    <a16:rowId xmlns:a16="http://schemas.microsoft.com/office/drawing/2014/main" val="2062353870"/>
+                  </a:ext>
+                </a:extLst>
+              </a:tr>
+              <a:tr h="775188">
+                <a:tc>
+                  <a:txBody>
+                    <a:bodyPr/>
+                    <a:lstStyle/>
+                    <a:p>
+                      <a:r>
+                        <a:rPr lang="cs-CZ" sz="2200" dirty="0"/>
+                        <a:t>Silný ekosystém a propracované balíky</a:t>
+                      </a:r>
+                    </a:p>
+                  </a:txBody>
+                  <a:tcPr/>
+                </a:tc>
+                <a:tc>
+                  <a:txBody>
+                    <a:bodyPr/>
+                    <a:lstStyle/>
+                    <a:p>
+                      <a:r>
+                        <a:rPr lang="cs-CZ" sz="2200" dirty="0"/>
+                        <a:t>Špatné techniky vedou k chybám</a:t>
+                      </a:r>
+                    </a:p>
+                  </a:txBody>
+                  <a:tcPr/>
+                </a:tc>
+                <a:extLst>
+                  <a:ext uri="{0D108BD9-81ED-4DB2-BD59-A6C34878D82A}">
+                    <a16:rowId xmlns:a16="http://schemas.microsoft.com/office/drawing/2014/main" val="492398440"/>
+                  </a:ext>
+                </a:extLst>
+              </a:tr>
+              <a:tr h="852936">
+                <a:tc>
+                  <a:txBody>
+                    <a:bodyPr/>
+                    <a:lstStyle/>
+                    <a:p>
+                      <a:r>
+                        <a:rPr lang="cs-CZ" sz="2200" dirty="0"/>
+                        <a:t>Kvalitní dokumentace, chybové hlášky</a:t>
+                      </a:r>
+                    </a:p>
+                  </a:txBody>
+                  <a:tcPr/>
+                </a:tc>
+                <a:tc>
+                  <a:txBody>
+                    <a:bodyPr/>
+                    <a:lstStyle/>
+                    <a:p>
+                      <a:r>
+                        <a:rPr lang="cs-CZ" sz="2200" dirty="0"/>
+                        <a:t>Neintuitivní kontrola živ. cyklu</a:t>
+                      </a:r>
+                    </a:p>
+                  </a:txBody>
+                  <a:tcPr/>
+                </a:tc>
+                <a:extLst>
+                  <a:ext uri="{0D108BD9-81ED-4DB2-BD59-A6C34878D82A}">
+                    <a16:rowId xmlns:a16="http://schemas.microsoft.com/office/drawing/2014/main" val="78007109"/>
+                  </a:ext>
+                </a:extLst>
+              </a:tr>
+              <a:tr h="776171">
+                <a:tc>
+                  <a:txBody>
+                    <a:bodyPr/>
+                    <a:lstStyle/>
+                    <a:p>
+                      <a:r>
+                        <a:rPr lang="cs-CZ" sz="2200" dirty="0"/>
+                        <a:t>Typy pro atributy HTML elementů</a:t>
+                      </a:r>
+                    </a:p>
+                  </a:txBody>
+                  <a:tcPr/>
+                </a:tc>
+                <a:tc>
+                  <a:txBody>
+                    <a:bodyPr/>
+                    <a:lstStyle/>
+                    <a:p>
+                      <a:r>
+                        <a:rPr lang="cs-CZ" sz="2200" dirty="0"/>
+                        <a:t>Asynchronní aktualizace stavů</a:t>
+                      </a:r>
+                    </a:p>
+                  </a:txBody>
+                  <a:tcPr/>
+                </a:tc>
+                <a:extLst>
+                  <a:ext uri="{0D108BD9-81ED-4DB2-BD59-A6C34878D82A}">
+                    <a16:rowId xmlns:a16="http://schemas.microsoft.com/office/drawing/2014/main" val="1819840584"/>
+                  </a:ext>
+                </a:extLst>
+              </a:tr>
+              <a:tr h="620860">
+                <a:tc>
+                  <a:txBody>
+                    <a:bodyPr/>
+                    <a:lstStyle/>
+                    <a:p>
+                      <a:r>
+                        <a:rPr lang="cs-CZ" sz="2200" dirty="0"/>
+                        <a:t>Práce se vstupními vlastnostmi</a:t>
+                      </a:r>
+                    </a:p>
+                  </a:txBody>
+                  <a:tcPr/>
+                </a:tc>
+                <a:tc>
+                  <a:txBody>
+                    <a:bodyPr/>
+                    <a:lstStyle/>
+                    <a:p>
+                      <a:r>
+                        <a:rPr lang="cs-CZ" sz="2200" dirty="0"/>
+                        <a:t>Složitější předávání vlastnosti rodiči</a:t>
+                      </a:r>
+                    </a:p>
+                  </a:txBody>
+                  <a:tcPr/>
+                </a:tc>
+                <a:extLst>
+                  <a:ext uri="{0D108BD9-81ED-4DB2-BD59-A6C34878D82A}">
+                    <a16:rowId xmlns:a16="http://schemas.microsoft.com/office/drawing/2014/main" val="2233078519"/>
+                  </a:ext>
+                </a:extLst>
+              </a:tr>
+              <a:tr h="814537">
+                <a:tc>
+                  <a:txBody>
+                    <a:bodyPr/>
+                    <a:lstStyle/>
+                    <a:p>
+                      <a:r>
+                        <a:rPr lang="cs-CZ" sz="2200" dirty="0"/>
+                        <a:t>Modularita pomocí vlastních </a:t>
+                      </a:r>
+                      <a:r>
+                        <a:rPr lang="cs-CZ" sz="2200" dirty="0" err="1"/>
+                        <a:t>hooků</a:t>
+                      </a:r>
+                      <a:endParaRPr lang="cs-CZ" sz="2200" dirty="0"/>
+                    </a:p>
+                    <a:p>
+                      <a:endParaRPr lang="cs-CZ" sz="2200" dirty="0"/>
+                    </a:p>
+                  </a:txBody>
+                  <a:tcPr/>
+                </a:tc>
+                <a:tc>
+                  <a:txBody>
+                    <a:bodyPr/>
+                    <a:lstStyle/>
+                    <a:p>
+                      <a:r>
+                        <a:rPr lang="cs-CZ" sz="2200" dirty="0"/>
+                        <a:t>Pole závislostí v </a:t>
+                      </a:r>
+                      <a:r>
+                        <a:rPr lang="cs-CZ" sz="2200" dirty="0" err="1"/>
+                        <a:t>useEffect</a:t>
+                      </a:r>
+                      <a:r>
+                        <a:rPr lang="cs-CZ" sz="2200" dirty="0"/>
+                        <a:t> </a:t>
+                      </a:r>
+                      <a:r>
+                        <a:rPr lang="cs-CZ" sz="2200" dirty="0" err="1"/>
+                        <a:t>hooku</a:t>
+                      </a:r>
+                      <a:endParaRPr lang="cs-CZ" sz="2200" dirty="0"/>
+                    </a:p>
+                  </a:txBody>
+                  <a:tcPr/>
+                </a:tc>
+                <a:extLst>
+                  <a:ext uri="{0D108BD9-81ED-4DB2-BD59-A6C34878D82A}">
+                    <a16:rowId xmlns:a16="http://schemas.microsoft.com/office/drawing/2014/main" val="2135821235"/>
+                  </a:ext>
+                </a:extLst>
+              </a:tr>
+            </a:tbl>
+          </a:graphicData>
+        </a:graphic>
+      </p:graphicFrame>
+      <p:sp>
+        <p:nvSpPr>
+          <p:cNvPr id="10" name="TextovéPole 9">
+            <a:extLst>
+              <a:ext uri="{FF2B5EF4-FFF2-40B4-BE49-F238E27FC236}">
+                <a16:creationId xmlns:a16="http://schemas.microsoft.com/office/drawing/2014/main" id="{0D05DD29-D001-91F7-E50B-8AF4DAF2C62D}"/>
+              </a:ext>
+            </a:extLst>
+          </p:cNvPr>
+          <p:cNvSpPr txBox="1"/>
+          <p:nvPr/>
+        </p:nvSpPr>
+        <p:spPr>
+          <a:xfrm>
+            <a:off x="1097279" y="1899389"/>
+            <a:ext cx="5438617" cy="492443"/>
+          </a:xfrm>
+          <a:prstGeom prst="rect">
+            <a:avLst/>
+          </a:prstGeom>
+          <a:noFill/>
+        </p:spPr>
+        <p:txBody>
+          <a:bodyPr wrap="square" rtlCol="0">
+            <a:spAutoFit/>
+          </a:bodyPr>
+          <a:lstStyle/>
+          <a:p>
+            <a:r>
+              <a:rPr lang="cs-CZ" sz="2600" dirty="0" err="1"/>
+              <a:t>React</a:t>
+            </a:r>
+            <a:endParaRPr lang="cs-CZ" sz="2600" dirty="0"/>
+          </a:p>
+        </p:txBody>
+      </p:sp>
+    </p:spTree>
+    <p:extLst>
+      <p:ext uri="{BB962C8B-B14F-4D97-AF65-F5344CB8AC3E}">
+        <p14:creationId xmlns:p14="http://schemas.microsoft.com/office/powerpoint/2010/main" val="4019036964"/>
+      </p:ext>
+    </p:extLst>
+  </p:cSld>
+  <p:clrMapOvr>
+    <a:masterClrMapping/>
+  </p:clrMapOvr>
+</p:sld>
+</file>
+
+<file path=ppt/slides/slide18.xml><?xml version="1.0" encoding="utf-8"?>
+<p:sld xmlns:a="http://schemas.openxmlformats.org/drawingml/2006/main" xmlns:r="http://schemas.openxmlformats.org/officeDocument/2006/relationships" xmlns:p="http://schemas.openxmlformats.org/presentationml/2006/main">
+  <p:cSld>
+    <p:spTree>
+      <p:nvGrpSpPr>
+        <p:cNvPr id="1" name=""/>
+        <p:cNvGrpSpPr/>
+        <p:nvPr/>
+      </p:nvGrpSpPr>
+      <p:grpSpPr>
+        <a:xfrm>
+          <a:off x="0" y="0"/>
+          <a:ext cx="0" cy="0"/>
+          <a:chOff x="0" y="0"/>
+          <a:chExt cx="0" cy="0"/>
+        </a:xfrm>
+      </p:grpSpPr>
+      <p:sp>
+        <p:nvSpPr>
+          <p:cNvPr id="2" name="Nadpis 1">
+            <a:extLst>
+              <a:ext uri="{FF2B5EF4-FFF2-40B4-BE49-F238E27FC236}">
+                <a16:creationId xmlns:a16="http://schemas.microsoft.com/office/drawing/2014/main" id="{1F27CAE6-FE23-AF36-73A9-D79E1678AC4B}"/>
+              </a:ext>
+            </a:extLst>
+          </p:cNvPr>
+          <p:cNvSpPr>
+            <a:spLocks noGrp="1"/>
+          </p:cNvSpPr>
+          <p:nvPr>
+            <p:ph type="title"/>
+          </p:nvPr>
+        </p:nvSpPr>
+        <p:spPr/>
+        <p:txBody>
+          <a:bodyPr/>
+          <a:lstStyle/>
+          <a:p>
+            <a:r>
+              <a:rPr lang="cs-CZ" dirty="0"/>
+              <a:t>Testování frameworků – srovnání</a:t>
+            </a:r>
+          </a:p>
+        </p:txBody>
+      </p:sp>
+      <p:graphicFrame>
+        <p:nvGraphicFramePr>
+          <p:cNvPr id="8" name="Tabulka 7">
+            <a:extLst>
+              <a:ext uri="{FF2B5EF4-FFF2-40B4-BE49-F238E27FC236}">
+                <a16:creationId xmlns:a16="http://schemas.microsoft.com/office/drawing/2014/main" id="{5E8B40D5-2883-0F50-E0FC-38D8C821DC41}"/>
+              </a:ext>
+            </a:extLst>
+          </p:cNvPr>
+          <p:cNvGraphicFramePr>
+            <a:graphicFrameLocks noGrp="1"/>
+          </p:cNvGraphicFramePr>
+          <p:nvPr>
+            <p:extLst>
+              <p:ext uri="{D42A27DB-BD31-4B8C-83A1-F6EECF244321}">
+                <p14:modId xmlns:p14="http://schemas.microsoft.com/office/powerpoint/2010/main" val="1601336639"/>
+              </p:ext>
+            </p:extLst>
+          </p:nvPr>
+        </p:nvGraphicFramePr>
+        <p:xfrm>
+          <a:off x="1097280" y="2564089"/>
+          <a:ext cx="10058400" cy="4270254"/>
+        </p:xfrm>
+        <a:graphic>
+          <a:graphicData uri="http://schemas.openxmlformats.org/drawingml/2006/table">
+            <a:tbl>
+              <a:tblPr firstRow="1" bandRow="1">
+                <a:tableStyleId>{5C22544A-7EE6-4342-B048-85BDC9FD1C3A}</a:tableStyleId>
+              </a:tblPr>
+              <a:tblGrid>
+                <a:gridCol w="5029200">
+                  <a:extLst>
+                    <a:ext uri="{9D8B030D-6E8A-4147-A177-3AD203B41FA5}">
+                      <a16:colId xmlns:a16="http://schemas.microsoft.com/office/drawing/2014/main" val="3536352215"/>
+                    </a:ext>
+                  </a:extLst>
+                </a:gridCol>
+                <a:gridCol w="5029200">
+                  <a:extLst>
+                    <a:ext uri="{9D8B030D-6E8A-4147-A177-3AD203B41FA5}">
+                      <a16:colId xmlns:a16="http://schemas.microsoft.com/office/drawing/2014/main" val="2505896258"/>
+                    </a:ext>
+                  </a:extLst>
+                </a:gridCol>
+              </a:tblGrid>
+              <a:tr h="374964">
+                <a:tc>
+                  <a:txBody>
+                    <a:bodyPr/>
+                    <a:lstStyle/>
+                    <a:p>
+                      <a:r>
+                        <a:rPr lang="cs-CZ" sz="2200" dirty="0"/>
+                        <a:t>Přednosti</a:t>
+                      </a:r>
+                    </a:p>
+                  </a:txBody>
+                  <a:tcPr/>
+                </a:tc>
+                <a:tc>
+                  <a:txBody>
+                    <a:bodyPr/>
+                    <a:lstStyle/>
+                    <a:p>
+                      <a:r>
+                        <a:rPr lang="cs-CZ" sz="2200" dirty="0"/>
+                        <a:t>Slabiny</a:t>
+                      </a:r>
+                    </a:p>
+                  </a:txBody>
+                  <a:tcPr/>
+                </a:tc>
+                <a:extLst>
+                  <a:ext uri="{0D108BD9-81ED-4DB2-BD59-A6C34878D82A}">
+                    <a16:rowId xmlns:a16="http://schemas.microsoft.com/office/drawing/2014/main" val="2062353870"/>
+                  </a:ext>
+                </a:extLst>
+              </a:tr>
+              <a:tr h="796293">
+                <a:tc>
+                  <a:txBody>
+                    <a:bodyPr/>
+                    <a:lstStyle/>
+                    <a:p>
+                      <a:r>
+                        <a:rPr lang="cs-CZ" sz="2200" dirty="0"/>
+                        <a:t>Jednoduchost, přímočarost, rychlost</a:t>
+                      </a:r>
+                    </a:p>
+                  </a:txBody>
+                  <a:tcPr/>
+                </a:tc>
+                <a:tc>
+                  <a:txBody>
+                    <a:bodyPr/>
+                    <a:lstStyle/>
+                    <a:p>
+                      <a:r>
+                        <a:rPr lang="cs-CZ" sz="2200" dirty="0"/>
+                        <a:t>Menší ekosystém a komunita</a:t>
+                      </a:r>
+                    </a:p>
+                  </a:txBody>
+                  <a:tcPr/>
+                </a:tc>
+                <a:extLst>
+                  <a:ext uri="{0D108BD9-81ED-4DB2-BD59-A6C34878D82A}">
+                    <a16:rowId xmlns:a16="http://schemas.microsoft.com/office/drawing/2014/main" val="492398440"/>
+                  </a:ext>
+                </a:extLst>
+              </a:tr>
+              <a:tr h="849860">
+                <a:tc>
+                  <a:txBody>
+                    <a:bodyPr/>
+                    <a:lstStyle/>
+                    <a:p>
+                      <a:r>
+                        <a:rPr lang="cs-CZ" sz="2200" dirty="0"/>
+                        <a:t>Čitelná syntax bez </a:t>
+                      </a:r>
+                      <a:r>
+                        <a:rPr lang="cs-CZ" sz="2200" dirty="0" err="1"/>
+                        <a:t>boilerplate</a:t>
+                      </a:r>
+                      <a:r>
+                        <a:rPr lang="cs-CZ" sz="2200" dirty="0"/>
+                        <a:t> kódu</a:t>
+                      </a:r>
+                    </a:p>
+                  </a:txBody>
+                  <a:tcPr/>
+                </a:tc>
+                <a:tc>
+                  <a:txBody>
+                    <a:bodyPr/>
+                    <a:lstStyle/>
+                    <a:p>
+                      <a:r>
+                        <a:rPr lang="cs-CZ" sz="2200" dirty="0"/>
+                        <a:t>Proměnná syntax u podmínek</a:t>
+                      </a:r>
+                    </a:p>
+                  </a:txBody>
+                  <a:tcPr/>
+                </a:tc>
+                <a:extLst>
+                  <a:ext uri="{0D108BD9-81ED-4DB2-BD59-A6C34878D82A}">
+                    <a16:rowId xmlns:a16="http://schemas.microsoft.com/office/drawing/2014/main" val="78007109"/>
+                  </a:ext>
+                </a:extLst>
+              </a:tr>
+              <a:tr h="769816">
+                <a:tc>
+                  <a:txBody>
+                    <a:bodyPr/>
+                    <a:lstStyle/>
+                    <a:p>
+                      <a:r>
+                        <a:rPr lang="cs-CZ" sz="2200" dirty="0"/>
+                        <a:t>Elegantní předávání vlastností</a:t>
+                      </a:r>
+                    </a:p>
+                  </a:txBody>
+                  <a:tcPr/>
+                </a:tc>
+                <a:tc>
+                  <a:txBody>
+                    <a:bodyPr/>
+                    <a:lstStyle/>
+                    <a:p>
+                      <a:r>
+                        <a:rPr lang="cs-CZ" sz="2200" dirty="0"/>
+                        <a:t>Potřeba reaktivity u měnících se vstupů</a:t>
+                      </a:r>
+                    </a:p>
+                  </a:txBody>
+                  <a:tcPr/>
+                </a:tc>
+                <a:extLst>
+                  <a:ext uri="{0D108BD9-81ED-4DB2-BD59-A6C34878D82A}">
+                    <a16:rowId xmlns:a16="http://schemas.microsoft.com/office/drawing/2014/main" val="1819840584"/>
+                  </a:ext>
+                </a:extLst>
+              </a:tr>
+              <a:tr h="631272">
+                <a:tc>
+                  <a:txBody>
+                    <a:bodyPr/>
+                    <a:lstStyle/>
+                    <a:p>
+                      <a:r>
+                        <a:rPr lang="cs-CZ" sz="2200" dirty="0"/>
+                        <a:t>Jednoduchá kontrola </a:t>
+                      </a:r>
+                      <a:r>
+                        <a:rPr lang="cs-CZ" sz="2200" dirty="0" err="1"/>
+                        <a:t>lifecycle</a:t>
+                      </a:r>
+                      <a:endParaRPr lang="cs-CZ" sz="2200" dirty="0"/>
+                    </a:p>
+                  </a:txBody>
+                  <a:tcPr/>
+                </a:tc>
+                <a:tc>
+                  <a:txBody>
+                    <a:bodyPr/>
+                    <a:lstStyle/>
+                    <a:p>
+                      <a:r>
+                        <a:rPr lang="cs-CZ" sz="2200" dirty="0"/>
+                        <a:t>Hůře otypované události</a:t>
+                      </a:r>
+                    </a:p>
+                  </a:txBody>
+                  <a:tcPr/>
+                </a:tc>
+                <a:extLst>
+                  <a:ext uri="{0D108BD9-81ED-4DB2-BD59-A6C34878D82A}">
+                    <a16:rowId xmlns:a16="http://schemas.microsoft.com/office/drawing/2014/main" val="2233078519"/>
+                  </a:ext>
+                </a:extLst>
+              </a:tr>
+              <a:tr h="796293">
+                <a:tc>
+                  <a:txBody>
+                    <a:bodyPr/>
+                    <a:lstStyle/>
+                    <a:p>
+                      <a:r>
+                        <a:rPr lang="cs-CZ" sz="2200" dirty="0"/>
+                        <a:t>Modifikace DOM</a:t>
+                      </a:r>
+                    </a:p>
+                  </a:txBody>
+                  <a:tcPr/>
+                </a:tc>
+                <a:tc>
+                  <a:txBody>
+                    <a:bodyPr/>
+                    <a:lstStyle/>
+                    <a:p>
+                      <a:r>
+                        <a:rPr lang="cs-CZ" sz="2200" dirty="0"/>
+                        <a:t>Import typů vyžaduje klíčové slovo navíc</a:t>
+                      </a:r>
+                    </a:p>
+                  </a:txBody>
+                  <a:tcPr/>
+                </a:tc>
+                <a:extLst>
+                  <a:ext uri="{0D108BD9-81ED-4DB2-BD59-A6C34878D82A}">
+                    <a16:rowId xmlns:a16="http://schemas.microsoft.com/office/drawing/2014/main" val="2135821235"/>
+                  </a:ext>
+                </a:extLst>
+              </a:tr>
+            </a:tbl>
+          </a:graphicData>
+        </a:graphic>
+      </p:graphicFrame>
+      <p:sp>
+        <p:nvSpPr>
+          <p:cNvPr id="11" name="TextovéPole 10">
+            <a:extLst>
+              <a:ext uri="{FF2B5EF4-FFF2-40B4-BE49-F238E27FC236}">
+                <a16:creationId xmlns:a16="http://schemas.microsoft.com/office/drawing/2014/main" id="{6120C4EC-96E0-F95A-AA9D-9D62DD9ACEC1}"/>
+              </a:ext>
+            </a:extLst>
+          </p:cNvPr>
+          <p:cNvSpPr txBox="1"/>
+          <p:nvPr/>
+        </p:nvSpPr>
+        <p:spPr>
+          <a:xfrm>
+            <a:off x="1097280" y="1888192"/>
+            <a:ext cx="9553154" cy="492443"/>
+          </a:xfrm>
+          <a:prstGeom prst="rect">
+            <a:avLst/>
+          </a:prstGeom>
+          <a:noFill/>
+        </p:spPr>
+        <p:txBody>
+          <a:bodyPr wrap="square" rtlCol="0">
+            <a:spAutoFit/>
+          </a:bodyPr>
+          <a:lstStyle/>
+          <a:p>
+            <a:r>
+              <a:rPr lang="cs-CZ" sz="2600" dirty="0" err="1"/>
+              <a:t>Svelte</a:t>
+            </a:r>
+            <a:endParaRPr lang="cs-CZ" sz="2600" dirty="0"/>
+          </a:p>
+        </p:txBody>
+      </p:sp>
+    </p:spTree>
+    <p:extLst>
+      <p:ext uri="{BB962C8B-B14F-4D97-AF65-F5344CB8AC3E}">
+        <p14:creationId xmlns:p14="http://schemas.microsoft.com/office/powerpoint/2010/main" val="917042818"/>
+      </p:ext>
+    </p:extLst>
+  </p:cSld>
+  <p:clrMapOvr>
+    <a:masterClrMapping/>
+  </p:clrMapOvr>
+</p:sld>
+</file>
+
+<file path=ppt/slides/slide19.xml><?xml version="1.0" encoding="utf-8"?>
 <p:sld xmlns:a="http://schemas.openxmlformats.org/drawingml/2006/main" xmlns:r="http://schemas.openxmlformats.org/officeDocument/2006/relationships" xmlns:p="http://schemas.openxmlformats.org/presentationml/2006/main">
   <p:cSld>
     <p:bg>
@@ -28616,7 +28730,111 @@
 </p:sld>
 </file>
 
-<file path=ppt/slides/slide18.xml><?xml version="1.0" encoding="utf-8"?>
+<file path=ppt/slides/slide2.xml><?xml version="1.0" encoding="utf-8"?>
+<p:sld xmlns:a="http://schemas.openxmlformats.org/drawingml/2006/main" xmlns:r="http://schemas.openxmlformats.org/officeDocument/2006/relationships" xmlns:p="http://schemas.openxmlformats.org/presentationml/2006/main">
+  <p:cSld>
+    <p:bg>
+      <p:bgPr>
+        <a:solidFill>
+          <a:schemeClr val="bg1"/>
+        </a:solidFill>
+        <a:effectLst/>
+      </p:bgPr>
+    </p:bg>
+    <p:spTree>
+      <p:nvGrpSpPr>
+        <p:cNvPr id="1" name=""/>
+        <p:cNvGrpSpPr/>
+        <p:nvPr/>
+      </p:nvGrpSpPr>
+      <p:grpSpPr>
+        <a:xfrm>
+          <a:off x="0" y="0"/>
+          <a:ext cx="0" cy="0"/>
+          <a:chOff x="0" y="0"/>
+          <a:chExt cx="0" cy="0"/>
+        </a:xfrm>
+      </p:grpSpPr>
+      <p:sp>
+        <p:nvSpPr>
+          <p:cNvPr id="2" name="Nadpis 1">
+            <a:extLst>
+              <a:ext uri="{FF2B5EF4-FFF2-40B4-BE49-F238E27FC236}">
+                <a16:creationId xmlns:a16="http://schemas.microsoft.com/office/drawing/2014/main" id="{715DB643-4C47-44C5-555A-5ACF848892AF}"/>
+              </a:ext>
+            </a:extLst>
+          </p:cNvPr>
+          <p:cNvSpPr>
+            <a:spLocks noGrp="1"/>
+          </p:cNvSpPr>
+          <p:nvPr>
+            <p:ph type="title"/>
+          </p:nvPr>
+        </p:nvSpPr>
+        <p:spPr>
+          <a:xfrm>
+            <a:off x="1097280" y="286603"/>
+            <a:ext cx="10058400" cy="1450757"/>
+          </a:xfrm>
+        </p:spPr>
+        <p:txBody>
+          <a:bodyPr>
+            <a:normAutofit/>
+          </a:bodyPr>
+          <a:lstStyle/>
+          <a:p>
+            <a:r>
+              <a:rPr lang="cs-CZ" dirty="0"/>
+              <a:t>Cíle práce</a:t>
+            </a:r>
+          </a:p>
+        </p:txBody>
+      </p:sp>
+      <p:graphicFrame>
+        <p:nvGraphicFramePr>
+          <p:cNvPr id="6" name="Zástupný obsah 2">
+            <a:extLst>
+              <a:ext uri="{FF2B5EF4-FFF2-40B4-BE49-F238E27FC236}">
+                <a16:creationId xmlns:a16="http://schemas.microsoft.com/office/drawing/2014/main" id="{71AF4493-77FD-078A-2D58-E192981E2ADF}"/>
+              </a:ext>
+            </a:extLst>
+          </p:cNvPr>
+          <p:cNvGraphicFramePr>
+            <a:graphicFrameLocks noGrp="1"/>
+          </p:cNvGraphicFramePr>
+          <p:nvPr>
+            <p:ph idx="1"/>
+            <p:extLst>
+              <p:ext uri="{D42A27DB-BD31-4B8C-83A1-F6EECF244321}">
+                <p14:modId xmlns:p14="http://schemas.microsoft.com/office/powerpoint/2010/main" val="2762235530"/>
+              </p:ext>
+            </p:extLst>
+          </p:nvPr>
+        </p:nvGraphicFramePr>
+        <p:xfrm>
+          <a:off x="1096963" y="1945340"/>
+          <a:ext cx="10058400" cy="4150659"/>
+        </p:xfrm>
+        <a:graphic>
+          <a:graphicData uri="http://schemas.openxmlformats.org/drawingml/2006/diagram">
+            <dgm:relIds xmlns:dgm="http://schemas.openxmlformats.org/drawingml/2006/diagram" xmlns:r="http://schemas.openxmlformats.org/officeDocument/2006/relationships" r:dm="rId2" r:lo="rId3" r:qs="rId4" r:cs="rId5"/>
+          </a:graphicData>
+        </a:graphic>
+      </p:graphicFrame>
+    </p:spTree>
+    <p:extLst>
+      <p:ext uri="{BB962C8B-B14F-4D97-AF65-F5344CB8AC3E}">
+        <p14:creationId xmlns:p14="http://schemas.microsoft.com/office/powerpoint/2010/main" val="3257151273"/>
+      </p:ext>
+    </p:extLst>
+  </p:cSld>
+  <p:clrMapOvr>
+    <a:masterClrMapping/>
+  </p:clrMapOvr>
+</p:sld>
+</file>
+
+<file path=ppt/slides/slide20.xml><?xml version="1.0" encoding="utf-8"?>
 <p:sld xmlns:a="http://schemas.openxmlformats.org/drawingml/2006/main" xmlns:r="http://schemas.openxmlformats.org/officeDocument/2006/relationships" xmlns:p="http://schemas.openxmlformats.org/presentationml/2006/main">
   <p:cSld>
     <p:bg>
@@ -28720,7 +28938,7 @@
 </p:sld>
 </file>
 
-<file path=ppt/slides/slide19.xml><?xml version="1.0" encoding="utf-8"?>
+<file path=ppt/slides/slide21.xml><?xml version="1.0" encoding="utf-8"?>
 <p:sld xmlns:a="http://schemas.openxmlformats.org/drawingml/2006/main" xmlns:r="http://schemas.openxmlformats.org/officeDocument/2006/relationships" xmlns:p="http://schemas.openxmlformats.org/presentationml/2006/main">
   <p:cSld>
     <p:spTree>
@@ -29002,111 +29220,7 @@
 </p:sld>
 </file>
 
-<file path=ppt/slides/slide2.xml><?xml version="1.0" encoding="utf-8"?>
-<p:sld xmlns:a="http://schemas.openxmlformats.org/drawingml/2006/main" xmlns:r="http://schemas.openxmlformats.org/officeDocument/2006/relationships" xmlns:p="http://schemas.openxmlformats.org/presentationml/2006/main">
-  <p:cSld>
-    <p:bg>
-      <p:bgPr>
-        <a:solidFill>
-          <a:schemeClr val="bg1"/>
-        </a:solidFill>
-        <a:effectLst/>
-      </p:bgPr>
-    </p:bg>
-    <p:spTree>
-      <p:nvGrpSpPr>
-        <p:cNvPr id="1" name=""/>
-        <p:cNvGrpSpPr/>
-        <p:nvPr/>
-      </p:nvGrpSpPr>
-      <p:grpSpPr>
-        <a:xfrm>
-          <a:off x="0" y="0"/>
-          <a:ext cx="0" cy="0"/>
-          <a:chOff x="0" y="0"/>
-          <a:chExt cx="0" cy="0"/>
-        </a:xfrm>
-      </p:grpSpPr>
-      <p:sp>
-        <p:nvSpPr>
-          <p:cNvPr id="2" name="Nadpis 1">
-            <a:extLst>
-              <a:ext uri="{FF2B5EF4-FFF2-40B4-BE49-F238E27FC236}">
-                <a16:creationId xmlns:a16="http://schemas.microsoft.com/office/drawing/2014/main" id="{715DB643-4C47-44C5-555A-5ACF848892AF}"/>
-              </a:ext>
-            </a:extLst>
-          </p:cNvPr>
-          <p:cNvSpPr>
-            <a:spLocks noGrp="1"/>
-          </p:cNvSpPr>
-          <p:nvPr>
-            <p:ph type="title"/>
-          </p:nvPr>
-        </p:nvSpPr>
-        <p:spPr>
-          <a:xfrm>
-            <a:off x="1097280" y="286603"/>
-            <a:ext cx="10058400" cy="1450757"/>
-          </a:xfrm>
-        </p:spPr>
-        <p:txBody>
-          <a:bodyPr>
-            <a:normAutofit/>
-          </a:bodyPr>
-          <a:lstStyle/>
-          <a:p>
-            <a:r>
-              <a:rPr lang="cs-CZ" dirty="0"/>
-              <a:t>Cíle práce</a:t>
-            </a:r>
-          </a:p>
-        </p:txBody>
-      </p:sp>
-      <p:graphicFrame>
-        <p:nvGraphicFramePr>
-          <p:cNvPr id="6" name="Zástupný obsah 2">
-            <a:extLst>
-              <a:ext uri="{FF2B5EF4-FFF2-40B4-BE49-F238E27FC236}">
-                <a16:creationId xmlns:a16="http://schemas.microsoft.com/office/drawing/2014/main" id="{71AF4493-77FD-078A-2D58-E192981E2ADF}"/>
-              </a:ext>
-            </a:extLst>
-          </p:cNvPr>
-          <p:cNvGraphicFramePr>
-            <a:graphicFrameLocks noGrp="1"/>
-          </p:cNvGraphicFramePr>
-          <p:nvPr>
-            <p:ph idx="1"/>
-            <p:extLst>
-              <p:ext uri="{D42A27DB-BD31-4B8C-83A1-F6EECF244321}">
-                <p14:modId xmlns:p14="http://schemas.microsoft.com/office/powerpoint/2010/main" val="2762235530"/>
-              </p:ext>
-            </p:extLst>
-          </p:nvPr>
-        </p:nvGraphicFramePr>
-        <p:xfrm>
-          <a:off x="1096963" y="1945340"/>
-          <a:ext cx="10058400" cy="4150659"/>
-        </p:xfrm>
-        <a:graphic>
-          <a:graphicData uri="http://schemas.openxmlformats.org/drawingml/2006/diagram">
-            <dgm:relIds xmlns:dgm="http://schemas.openxmlformats.org/drawingml/2006/diagram" xmlns:r="http://schemas.openxmlformats.org/officeDocument/2006/relationships" r:dm="rId2" r:lo="rId3" r:qs="rId4" r:cs="rId5"/>
-          </a:graphicData>
-        </a:graphic>
-      </p:graphicFrame>
-    </p:spTree>
-    <p:extLst>
-      <p:ext uri="{BB962C8B-B14F-4D97-AF65-F5344CB8AC3E}">
-        <p14:creationId xmlns:p14="http://schemas.microsoft.com/office/powerpoint/2010/main" val="3257151273"/>
-      </p:ext>
-    </p:extLst>
-  </p:cSld>
-  <p:clrMapOvr>
-    <a:masterClrMapping/>
-  </p:clrMapOvr>
-</p:sld>
-</file>
-
-<file path=ppt/slides/slide20.xml><?xml version="1.0" encoding="utf-8"?>
+<file path=ppt/slides/slide22.xml><?xml version="1.0" encoding="utf-8"?>
 <p:sld xmlns:a="http://schemas.openxmlformats.org/drawingml/2006/main" xmlns:r="http://schemas.openxmlformats.org/officeDocument/2006/relationships" xmlns:p="http://schemas.openxmlformats.org/presentationml/2006/main">
   <p:cSld>
     <p:spTree>
@@ -29145,10 +29259,9 @@
           <a:lstStyle/>
           <a:p>
             <a:r>
-              <a:rPr lang="cs-CZ"/>
+              <a:rPr lang="cs-CZ" dirty="0"/>
               <a:t>Otázky</a:t>
             </a:r>
-            <a:endParaRPr lang="cs-CZ" dirty="0"/>
           </a:p>
         </p:txBody>
       </p:sp>
@@ -29170,38 +29283,40 @@
         </p:nvSpPr>
         <p:spPr/>
         <p:txBody>
-          <a:bodyPr/>
+          <a:bodyPr>
+            <a:normAutofit/>
+          </a:bodyPr>
           <a:lstStyle/>
           <a:p>
             <a:r>
-              <a:rPr lang="cs-CZ" dirty="0"/>
-              <a:t>Na které frameworky, kromě těch, které jste v práci použil, jste při analýze dostupných řešení narazil a proč jste je vyřadil z užšího výběru?</a:t>
+              <a:rPr lang="cs-CZ" sz="2200" dirty="0"/>
+              <a:t>1. Na které frameworky, kromě těch, které jste v práci použil, jste při analýze dostupných řešení narazil a proč jste je vyřadil z užšího výběru?</a:t>
             </a:r>
           </a:p>
           <a:p>
             <a:r>
-              <a:rPr lang="cs-CZ" dirty="0"/>
-              <a:t>Dovedete odhadnout, jak náročné (časově a délka kódu) by bylo implementovat komponenty z Vaší práce, bez použití frameworku?</a:t>
+              <a:rPr lang="cs-CZ" sz="2200" dirty="0"/>
+              <a:t>2. Dovedete odhadnout, jak náročné (časově a délka kódu) by bylo implementovat komponenty z Vaší práce, bez použití frameworku?</a:t>
             </a:r>
           </a:p>
           <a:p>
             <a:r>
-              <a:rPr lang="cs-CZ" dirty="0"/>
-              <a:t>Znáte i jiné frameworky pro vývoj </a:t>
+              <a:rPr lang="cs-CZ" sz="2200" dirty="0"/>
+              <a:t>3. Znáte i jiné frameworky pro vývoj </a:t>
             </a:r>
             <a:r>
-              <a:rPr lang="cs-CZ" dirty="0" err="1"/>
+              <a:rPr lang="cs-CZ" sz="2200" dirty="0" err="1"/>
               <a:t>frontendu</a:t>
             </a:r>
             <a:r>
-              <a:rPr lang="cs-CZ" dirty="0"/>
+              <a:rPr lang="cs-CZ" sz="2200" dirty="0"/>
               <a:t> webových aplikací?</a:t>
             </a:r>
           </a:p>
           <a:p>
             <a:r>
-              <a:rPr lang="cs-CZ" dirty="0"/>
-              <a:t>Kolik času vám přibližně zabral vývoj demonstrační aplikace?</a:t>
+              <a:rPr lang="cs-CZ" sz="2200" dirty="0"/>
+              <a:t>4. Kolik času vám přibližně zabral vývoj demonstrační aplikace?</a:t>
             </a:r>
           </a:p>
         </p:txBody>
@@ -29210,6 +29325,299 @@
     <p:extLst>
       <p:ext uri="{BB962C8B-B14F-4D97-AF65-F5344CB8AC3E}">
         <p14:creationId xmlns:p14="http://schemas.microsoft.com/office/powerpoint/2010/main" val="2016646041"/>
+      </p:ext>
+    </p:extLst>
+  </p:cSld>
+  <p:clrMapOvr>
+    <a:masterClrMapping/>
+  </p:clrMapOvr>
+</p:sld>
+</file>
+
+<file path=ppt/slides/slide23.xml><?xml version="1.0" encoding="utf-8"?>
+<p:sld xmlns:a="http://schemas.openxmlformats.org/drawingml/2006/main" xmlns:r="http://schemas.openxmlformats.org/officeDocument/2006/relationships" xmlns:p="http://schemas.openxmlformats.org/presentationml/2006/main">
+  <p:cSld>
+    <p:spTree>
+      <p:nvGrpSpPr>
+        <p:cNvPr id="1" name=""/>
+        <p:cNvGrpSpPr/>
+        <p:nvPr/>
+      </p:nvGrpSpPr>
+      <p:grpSpPr>
+        <a:xfrm>
+          <a:off x="0" y="0"/>
+          <a:ext cx="0" cy="0"/>
+          <a:chOff x="0" y="0"/>
+          <a:chExt cx="0" cy="0"/>
+        </a:xfrm>
+      </p:grpSpPr>
+      <p:sp>
+        <p:nvSpPr>
+          <p:cNvPr id="2" name="Nadpis 1">
+            <a:extLst>
+              <a:ext uri="{FF2B5EF4-FFF2-40B4-BE49-F238E27FC236}">
+                <a16:creationId xmlns:a16="http://schemas.microsoft.com/office/drawing/2014/main" id="{52E8184C-F942-BDA9-10EE-4A79584059A1}"/>
+              </a:ext>
+            </a:extLst>
+          </p:cNvPr>
+          <p:cNvSpPr>
+            <a:spLocks noGrp="1"/>
+          </p:cNvSpPr>
+          <p:nvPr>
+            <p:ph type="title"/>
+          </p:nvPr>
+        </p:nvSpPr>
+        <p:spPr/>
+        <p:txBody>
+          <a:bodyPr/>
+          <a:lstStyle/>
+          <a:p>
+            <a:r>
+              <a:rPr lang="cs-CZ" dirty="0"/>
+              <a:t>Otázky - frameworky</a:t>
+            </a:r>
+          </a:p>
+        </p:txBody>
+      </p:sp>
+      <p:pic>
+        <p:nvPicPr>
+          <p:cNvPr id="1026" name="Picture 2" descr="Next.js 13: A Beginner's Guide. Next.js is a React framework used to… | by  Guilherme Pompilio | Medium">
+            <a:extLst>
+              <a:ext uri="{FF2B5EF4-FFF2-40B4-BE49-F238E27FC236}">
+                <a16:creationId xmlns:a16="http://schemas.microsoft.com/office/drawing/2014/main" id="{07DF6F4C-3BB5-98B5-A53C-79B8BA313D68}"/>
+              </a:ext>
+            </a:extLst>
+          </p:cNvPr>
+          <p:cNvPicPr>
+            <a:picLocks noChangeAspect="1" noChangeArrowheads="1"/>
+          </p:cNvPicPr>
+          <p:nvPr/>
+        </p:nvPicPr>
+        <p:blipFill>
+          <a:blip r:embed="rId2">
+            <a:extLst>
+              <a:ext uri="{28A0092B-C50C-407E-A947-70E740481C1C}">
+                <a14:useLocalDpi xmlns:a14="http://schemas.microsoft.com/office/drawing/2010/main" val="0"/>
+              </a:ext>
+            </a:extLst>
+          </a:blip>
+          <a:srcRect/>
+          <a:stretch>
+            <a:fillRect/>
+          </a:stretch>
+        </p:blipFill>
+        <p:spPr bwMode="auto">
+          <a:xfrm>
+            <a:off x="371132" y="2073427"/>
+            <a:ext cx="3489650" cy="2093790"/>
+          </a:xfrm>
+          <a:prstGeom prst="rect">
+            <a:avLst/>
+          </a:prstGeom>
+          <a:noFill/>
+          <a:extLst>
+            <a:ext uri="{909E8E84-426E-40DD-AFC4-6F175D3DCCD1}">
+              <a14:hiddenFill xmlns:a14="http://schemas.microsoft.com/office/drawing/2010/main">
+                <a:solidFill>
+                  <a:srgbClr val="FFFFFF"/>
+                </a:solidFill>
+              </a14:hiddenFill>
+            </a:ext>
+          </a:extLst>
+        </p:spPr>
+      </p:pic>
+      <p:pic>
+        <p:nvPicPr>
+          <p:cNvPr id="1028" name="Picture 4" descr="From ReactJS to SolidJS. Start using SolidJS in production today | by  Vladislav Lipatov | Medium">
+            <a:extLst>
+              <a:ext uri="{FF2B5EF4-FFF2-40B4-BE49-F238E27FC236}">
+                <a16:creationId xmlns:a16="http://schemas.microsoft.com/office/drawing/2014/main" id="{A6109DD1-0E78-6FE9-B953-92088862E088}"/>
+              </a:ext>
+            </a:extLst>
+          </p:cNvPr>
+          <p:cNvPicPr>
+            <a:picLocks noChangeAspect="1" noChangeArrowheads="1"/>
+          </p:cNvPicPr>
+          <p:nvPr/>
+        </p:nvPicPr>
+        <p:blipFill>
+          <a:blip r:embed="rId3">
+            <a:extLst>
+              <a:ext uri="{28A0092B-C50C-407E-A947-70E740481C1C}">
+                <a14:useLocalDpi xmlns:a14="http://schemas.microsoft.com/office/drawing/2010/main" val="0"/>
+              </a:ext>
+            </a:extLst>
+          </a:blip>
+          <a:srcRect/>
+          <a:stretch>
+            <a:fillRect/>
+          </a:stretch>
+        </p:blipFill>
+        <p:spPr bwMode="auto">
+          <a:xfrm>
+            <a:off x="1267719" y="4641493"/>
+            <a:ext cx="4461276" cy="825452"/>
+          </a:xfrm>
+          <a:prstGeom prst="rect">
+            <a:avLst/>
+          </a:prstGeom>
+          <a:noFill/>
+          <a:extLst>
+            <a:ext uri="{909E8E84-426E-40DD-AFC4-6F175D3DCCD1}">
+              <a14:hiddenFill xmlns:a14="http://schemas.microsoft.com/office/drawing/2010/main">
+                <a:solidFill>
+                  <a:srgbClr val="FFFFFF"/>
+                </a:solidFill>
+              </a14:hiddenFill>
+            </a:ext>
+          </a:extLst>
+        </p:spPr>
+      </p:pic>
+      <p:pic>
+        <p:nvPicPr>
+          <p:cNvPr id="1030" name="Picture 6" descr="GitHub - QwikDev/qwik: Instant-loading web apps, without effort">
+            <a:extLst>
+              <a:ext uri="{FF2B5EF4-FFF2-40B4-BE49-F238E27FC236}">
+                <a16:creationId xmlns:a16="http://schemas.microsoft.com/office/drawing/2014/main" id="{039D7C02-4E94-30F7-CF26-BA88919D1963}"/>
+              </a:ext>
+            </a:extLst>
+          </p:cNvPr>
+          <p:cNvPicPr>
+            <a:picLocks noChangeAspect="1" noChangeArrowheads="1"/>
+          </p:cNvPicPr>
+          <p:nvPr/>
+        </p:nvPicPr>
+        <p:blipFill>
+          <a:blip r:embed="rId4">
+            <a:extLst>
+              <a:ext uri="{28A0092B-C50C-407E-A947-70E740481C1C}">
+                <a14:useLocalDpi xmlns:a14="http://schemas.microsoft.com/office/drawing/2010/main" val="0"/>
+              </a:ext>
+            </a:extLst>
+          </a:blip>
+          <a:srcRect/>
+          <a:stretch>
+            <a:fillRect/>
+          </a:stretch>
+        </p:blipFill>
+        <p:spPr bwMode="auto">
+          <a:xfrm>
+            <a:off x="8335194" y="2525008"/>
+            <a:ext cx="3848100" cy="1190625"/>
+          </a:xfrm>
+          <a:prstGeom prst="rect">
+            <a:avLst/>
+          </a:prstGeom>
+          <a:noFill/>
+          <a:extLst>
+            <a:ext uri="{909E8E84-426E-40DD-AFC4-6F175D3DCCD1}">
+              <a14:hiddenFill xmlns:a14="http://schemas.microsoft.com/office/drawing/2010/main">
+                <a:solidFill>
+                  <a:srgbClr val="FFFFFF"/>
+                </a:solidFill>
+              </a14:hiddenFill>
+            </a:ext>
+          </a:extLst>
+        </p:spPr>
+      </p:pic>
+      <p:pic>
+        <p:nvPicPr>
+          <p:cNvPr id="1032" name="Picture 8" descr="Vue.js history. Vue.js is an easy-to-use web app… | by MadhushaPrasad |  Medium">
+            <a:extLst>
+              <a:ext uri="{FF2B5EF4-FFF2-40B4-BE49-F238E27FC236}">
+                <a16:creationId xmlns:a16="http://schemas.microsoft.com/office/drawing/2014/main" id="{E061C4F0-D675-8048-B3E1-A379CC6E738A}"/>
+              </a:ext>
+            </a:extLst>
+          </p:cNvPr>
+          <p:cNvPicPr>
+            <a:picLocks noChangeAspect="1" noChangeArrowheads="1"/>
+          </p:cNvPicPr>
+          <p:nvPr/>
+        </p:nvPicPr>
+        <p:blipFill>
+          <a:blip r:embed="rId5">
+            <a:extLst>
+              <a:ext uri="{28A0092B-C50C-407E-A947-70E740481C1C}">
+                <a14:useLocalDpi xmlns:a14="http://schemas.microsoft.com/office/drawing/2010/main" val="0"/>
+              </a:ext>
+            </a:extLst>
+          </a:blip>
+          <a:srcRect/>
+          <a:stretch>
+            <a:fillRect/>
+          </a:stretch>
+        </p:blipFill>
+        <p:spPr bwMode="auto">
+          <a:xfrm>
+            <a:off x="3882798" y="1841987"/>
+            <a:ext cx="4261115" cy="2556669"/>
+          </a:xfrm>
+          <a:prstGeom prst="rect">
+            <a:avLst/>
+          </a:prstGeom>
+          <a:noFill/>
+          <a:extLst>
+            <a:ext uri="{909E8E84-426E-40DD-AFC4-6F175D3DCCD1}">
+              <a14:hiddenFill xmlns:a14="http://schemas.microsoft.com/office/drawing/2010/main">
+                <a:solidFill>
+                  <a:srgbClr val="FFFFFF"/>
+                </a:solidFill>
+              </a14:hiddenFill>
+            </a:ext>
+          </a:extLst>
+        </p:spPr>
+      </p:pic>
+      <p:pic>
+        <p:nvPicPr>
+          <p:cNvPr id="1034" name="Picture 10" descr="Preact | Fandom Developers Wiki | Fandom">
+            <a:extLst>
+              <a:ext uri="{FF2B5EF4-FFF2-40B4-BE49-F238E27FC236}">
+                <a16:creationId xmlns:a16="http://schemas.microsoft.com/office/drawing/2014/main" id="{E0BBDA56-59F3-9848-B078-1105C5458F98}"/>
+              </a:ext>
+            </a:extLst>
+          </p:cNvPr>
+          <p:cNvPicPr>
+            <a:picLocks noChangeAspect="1" noChangeArrowheads="1"/>
+          </p:cNvPicPr>
+          <p:nvPr/>
+        </p:nvPicPr>
+        <p:blipFill>
+          <a:blip r:embed="rId6">
+            <a:extLst>
+              <a:ext uri="{28A0092B-C50C-407E-A947-70E740481C1C}">
+                <a14:useLocalDpi xmlns:a14="http://schemas.microsoft.com/office/drawing/2010/main" val="0"/>
+              </a:ext>
+            </a:extLst>
+          </a:blip>
+          <a:srcRect/>
+          <a:stretch>
+            <a:fillRect/>
+          </a:stretch>
+        </p:blipFill>
+        <p:spPr bwMode="auto">
+          <a:xfrm>
+            <a:off x="6737947" y="4398656"/>
+            <a:ext cx="4200162" cy="1264424"/>
+          </a:xfrm>
+          <a:prstGeom prst="rect">
+            <a:avLst/>
+          </a:prstGeom>
+          <a:noFill/>
+          <a:extLst>
+            <a:ext uri="{909E8E84-426E-40DD-AFC4-6F175D3DCCD1}">
+              <a14:hiddenFill xmlns:a14="http://schemas.microsoft.com/office/drawing/2010/main">
+                <a:solidFill>
+                  <a:srgbClr val="FFFFFF"/>
+                </a:solidFill>
+              </a14:hiddenFill>
+            </a:ext>
+          </a:extLst>
+        </p:spPr>
+      </p:pic>
+    </p:spTree>
+    <p:extLst>
+      <p:ext uri="{BB962C8B-B14F-4D97-AF65-F5344CB8AC3E}">
+        <p14:creationId xmlns:p14="http://schemas.microsoft.com/office/powerpoint/2010/main" val="1974950332"/>
       </p:ext>
     </p:extLst>
   </p:cSld>

</xml_diff>